<commit_message>
Top-K, VGRAM Slides added
</commit_message>
<xml_diff>
--- a/Final Paper/presentation.pptx
+++ b/Final Paper/presentation.pptx
@@ -8,20 +8,22 @@
     <p:sldId id="257" r:id="rId2"/>
     <p:sldId id="258" r:id="rId3"/>
     <p:sldId id="259" r:id="rId4"/>
-    <p:sldId id="263" r:id="rId5"/>
-    <p:sldId id="264" r:id="rId6"/>
-    <p:sldId id="265" r:id="rId7"/>
-    <p:sldId id="266" r:id="rId8"/>
-    <p:sldId id="267" r:id="rId9"/>
-    <p:sldId id="268" r:id="rId10"/>
-    <p:sldId id="269" r:id="rId11"/>
-    <p:sldId id="270" r:id="rId12"/>
-    <p:sldId id="271" r:id="rId13"/>
-    <p:sldId id="272" r:id="rId14"/>
-    <p:sldId id="260" r:id="rId15"/>
-    <p:sldId id="261" r:id="rId16"/>
-    <p:sldId id="273" r:id="rId17"/>
-    <p:sldId id="262" r:id="rId18"/>
+    <p:sldId id="274" r:id="rId5"/>
+    <p:sldId id="263" r:id="rId6"/>
+    <p:sldId id="264" r:id="rId7"/>
+    <p:sldId id="275" r:id="rId8"/>
+    <p:sldId id="265" r:id="rId9"/>
+    <p:sldId id="266" r:id="rId10"/>
+    <p:sldId id="267" r:id="rId11"/>
+    <p:sldId id="268" r:id="rId12"/>
+    <p:sldId id="269" r:id="rId13"/>
+    <p:sldId id="270" r:id="rId14"/>
+    <p:sldId id="271" r:id="rId15"/>
+    <p:sldId id="272" r:id="rId16"/>
+    <p:sldId id="260" r:id="rId17"/>
+    <p:sldId id="261" r:id="rId18"/>
+    <p:sldId id="273" r:id="rId19"/>
+    <p:sldId id="262" r:id="rId20"/>
   </p:sldIdLst>
   <p:sldSz cx="12192000" cy="6858000"/>
   <p:notesSz cx="6858000" cy="9144000"/>
@@ -120,6 +122,11 @@
       </a:defRPr>
     </a:lvl9pPr>
   </p:defaultTextStyle>
+  <p:extLst>
+    <p:ext uri="{EFAFB233-063F-42B5-8137-9DF3F51BA10A}">
+      <p15:sldGuideLst xmlns:p15="http://schemas.microsoft.com/office/powerpoint/2012/main"/>
+    </p:ext>
+  </p:extLst>
 </p:presentation>
 </file>
 
@@ -261,7 +268,7 @@
                 </a:solidFill>
               </a:rPr>
               <a:pPr/>
-              <a:t>5/4/2014</a:t>
+              <a:t>5/5/2014</a:t>
             </a:fld>
             <a:endParaRPr lang="en-US">
               <a:solidFill>
@@ -463,7 +470,7 @@
                 </a:solidFill>
               </a:rPr>
               <a:pPr/>
-              <a:t>5/4/2014</a:t>
+              <a:t>5/5/2014</a:t>
             </a:fld>
             <a:endParaRPr lang="en-US">
               <a:solidFill>
@@ -675,7 +682,7 @@
                 </a:solidFill>
               </a:rPr>
               <a:pPr/>
-              <a:t>5/4/2014</a:t>
+              <a:t>5/5/2014</a:t>
             </a:fld>
             <a:endParaRPr lang="en-US">
               <a:solidFill>
@@ -877,7 +884,7 @@
                 </a:solidFill>
               </a:rPr>
               <a:pPr/>
-              <a:t>5/4/2014</a:t>
+              <a:t>5/5/2014</a:t>
             </a:fld>
             <a:endParaRPr lang="en-US">
               <a:solidFill>
@@ -1155,7 +1162,7 @@
                 </a:solidFill>
               </a:rPr>
               <a:pPr/>
-              <a:t>5/4/2014</a:t>
+              <a:t>5/5/2014</a:t>
             </a:fld>
             <a:endParaRPr lang="en-US">
               <a:solidFill>
@@ -1419,7 +1426,7 @@
                 </a:solidFill>
               </a:rPr>
               <a:pPr/>
-              <a:t>5/4/2014</a:t>
+              <a:t>5/5/2014</a:t>
             </a:fld>
             <a:endParaRPr lang="en-US">
               <a:solidFill>
@@ -1818,7 +1825,7 @@
                 </a:solidFill>
               </a:rPr>
               <a:pPr/>
-              <a:t>5/4/2014</a:t>
+              <a:t>5/5/2014</a:t>
             </a:fld>
             <a:endParaRPr lang="en-US">
               <a:solidFill>
@@ -1968,7 +1975,7 @@
                 </a:solidFill>
               </a:rPr>
               <a:pPr/>
-              <a:t>5/4/2014</a:t>
+              <a:t>5/5/2014</a:t>
             </a:fld>
             <a:endParaRPr lang="en-US">
               <a:solidFill>
@@ -2095,7 +2102,7 @@
                 </a:solidFill>
               </a:rPr>
               <a:pPr/>
-              <a:t>5/4/2014</a:t>
+              <a:t>5/5/2014</a:t>
             </a:fld>
             <a:endParaRPr lang="en-US">
               <a:solidFill>
@@ -2404,7 +2411,7 @@
                 </a:solidFill>
               </a:rPr>
               <a:pPr/>
-              <a:t>5/4/2014</a:t>
+              <a:t>5/5/2014</a:t>
             </a:fld>
             <a:endParaRPr lang="en-US">
               <a:solidFill>
@@ -2689,7 +2696,7 @@
                 </a:solidFill>
               </a:rPr>
               <a:pPr/>
-              <a:t>5/4/2014</a:t>
+              <a:t>5/5/2014</a:t>
             </a:fld>
             <a:endParaRPr lang="en-US">
               <a:solidFill>
@@ -2956,7 +2963,7 @@
                 </a:solidFill>
               </a:rPr>
               <a:pPr/>
-              <a:t>5/4/2014</a:t>
+              <a:t>5/5/2014</a:t>
             </a:fld>
             <a:endParaRPr lang="en-US">
               <a:solidFill>
@@ -3439,9 +3446,6 @@
               </a:rPr>
               <a:t>Kyle Patterson, James Fitzpatrick</a:t>
             </a:r>
-            <a:endParaRPr lang="en-US" dirty="0" smtClean="0">
-              <a:latin typeface="+mj-lt"/>
-            </a:endParaRPr>
           </a:p>
           <a:p>
             <a:endParaRPr lang="en-US" dirty="0" smtClean="0"/>
@@ -3506,12 +3510,8 @@
           <a:lstStyle/>
           <a:p>
             <a:r>
-              <a:rPr lang="en-US" dirty="0" err="1" smtClean="0"/>
-              <a:t>InvertedList</a:t>
-            </a:r>
-            <a:r>
-              <a:rPr lang="en-US" dirty="0" smtClean="0"/>
-              <a:t> Implementation</a:t>
+              <a:rPr lang="en-US" dirty="0" smtClean="0"/>
+              <a:t>Initial attempts at clustering</a:t>
             </a:r>
             <a:endParaRPr lang="en-US" dirty="0"/>
           </a:p>
@@ -3539,7 +3539,7 @@
     </p:spTree>
     <p:extLst>
       <p:ext uri="{BB962C8B-B14F-4D97-AF65-F5344CB8AC3E}">
-        <p14:creationId xmlns:p14="http://schemas.microsoft.com/office/powerpoint/2010/main" val="1647062735"/>
+        <p14:creationId xmlns:p14="http://schemas.microsoft.com/office/powerpoint/2010/main" val="3355904925"/>
       </p:ext>
     </p:extLst>
   </p:cSld>
@@ -3582,8 +3582,12 @@
           <a:lstStyle/>
           <a:p>
             <a:r>
-              <a:rPr lang="en-US" dirty="0" smtClean="0"/>
-              <a:t>Experimental Setup</a:t>
+              <a:rPr lang="en-US" dirty="0" err="1" smtClean="0"/>
+              <a:t>InvertedList</a:t>
+            </a:r>
+            <a:r>
+              <a:rPr lang="en-US" dirty="0" smtClean="0"/>
+              <a:t> concepts</a:t>
             </a:r>
             <a:endParaRPr lang="en-US" dirty="0"/>
           </a:p>
@@ -3611,7 +3615,7 @@
     </p:spTree>
     <p:extLst>
       <p:ext uri="{BB962C8B-B14F-4D97-AF65-F5344CB8AC3E}">
-        <p14:creationId xmlns:p14="http://schemas.microsoft.com/office/powerpoint/2010/main" val="661005115"/>
+        <p14:creationId xmlns:p14="http://schemas.microsoft.com/office/powerpoint/2010/main" val="2797137805"/>
       </p:ext>
     </p:extLst>
   </p:cSld>
@@ -3654,8 +3658,12 @@
           <a:lstStyle/>
           <a:p>
             <a:r>
-              <a:rPr lang="en-US" dirty="0" smtClean="0"/>
-              <a:t>Testing and Evaluation</a:t>
+              <a:rPr lang="en-US" dirty="0" err="1" smtClean="0"/>
+              <a:t>InvertedList</a:t>
+            </a:r>
+            <a:r>
+              <a:rPr lang="en-US" dirty="0" smtClean="0"/>
+              <a:t> Implementation</a:t>
             </a:r>
             <a:endParaRPr lang="en-US" dirty="0"/>
           </a:p>
@@ -3683,7 +3691,7 @@
     </p:spTree>
     <p:extLst>
       <p:ext uri="{BB962C8B-B14F-4D97-AF65-F5344CB8AC3E}">
-        <p14:creationId xmlns:p14="http://schemas.microsoft.com/office/powerpoint/2010/main" val="2981725681"/>
+        <p14:creationId xmlns:p14="http://schemas.microsoft.com/office/powerpoint/2010/main" val="1647062735"/>
       </p:ext>
     </p:extLst>
   </p:cSld>
@@ -3727,6 +3735,154 @@
           <a:p>
             <a:r>
               <a:rPr lang="en-US" dirty="0" smtClean="0"/>
+              <a:t>Experimental Setup</a:t>
+            </a:r>
+            <a:endParaRPr lang="en-US" dirty="0"/>
+          </a:p>
+        </p:txBody>
+      </p:sp>
+      <p:sp>
+        <p:nvSpPr>
+          <p:cNvPr id="3" name="Content Placeholder 2"/>
+          <p:cNvSpPr>
+            <a:spLocks noGrp="1"/>
+          </p:cNvSpPr>
+          <p:nvPr>
+            <p:ph idx="1"/>
+          </p:nvPr>
+        </p:nvSpPr>
+        <p:spPr/>
+        <p:txBody>
+          <a:bodyPr/>
+          <a:lstStyle/>
+          <a:p>
+            <a:r>
+              <a:rPr lang="en-US" dirty="0" smtClean="0"/>
+              <a:t>C# to encode both Search Algorithms</a:t>
+            </a:r>
+            <a:endParaRPr lang="en-US" dirty="0"/>
+          </a:p>
+        </p:txBody>
+      </p:sp>
+    </p:spTree>
+    <p:extLst>
+      <p:ext uri="{BB962C8B-B14F-4D97-AF65-F5344CB8AC3E}">
+        <p14:creationId xmlns:p14="http://schemas.microsoft.com/office/powerpoint/2010/main" val="661005115"/>
+      </p:ext>
+    </p:extLst>
+  </p:cSld>
+  <p:clrMapOvr>
+    <a:masterClrMapping/>
+  </p:clrMapOvr>
+</p:sld>
+</file>
+
+<file path=ppt/slides/slide14.xml><?xml version="1.0" encoding="utf-8"?>
+<p:sld xmlns:a="http://schemas.openxmlformats.org/drawingml/2006/main" xmlns:r="http://schemas.openxmlformats.org/officeDocument/2006/relationships" xmlns:p="http://schemas.openxmlformats.org/presentationml/2006/main">
+  <p:cSld>
+    <p:spTree>
+      <p:nvGrpSpPr>
+        <p:cNvPr id="1" name=""/>
+        <p:cNvGrpSpPr/>
+        <p:nvPr/>
+      </p:nvGrpSpPr>
+      <p:grpSpPr>
+        <a:xfrm>
+          <a:off x="0" y="0"/>
+          <a:ext cx="0" cy="0"/>
+          <a:chOff x="0" y="0"/>
+          <a:chExt cx="0" cy="0"/>
+        </a:xfrm>
+      </p:grpSpPr>
+      <p:sp>
+        <p:nvSpPr>
+          <p:cNvPr id="2" name="Title 1"/>
+          <p:cNvSpPr>
+            <a:spLocks noGrp="1"/>
+          </p:cNvSpPr>
+          <p:nvPr>
+            <p:ph type="title"/>
+          </p:nvPr>
+        </p:nvSpPr>
+        <p:spPr/>
+        <p:txBody>
+          <a:bodyPr/>
+          <a:lstStyle/>
+          <a:p>
+            <a:r>
+              <a:rPr lang="en-US" dirty="0" smtClean="0"/>
+              <a:t>Testing and Evaluation</a:t>
+            </a:r>
+            <a:endParaRPr lang="en-US" dirty="0"/>
+          </a:p>
+        </p:txBody>
+      </p:sp>
+      <p:sp>
+        <p:nvSpPr>
+          <p:cNvPr id="3" name="Content Placeholder 2"/>
+          <p:cNvSpPr>
+            <a:spLocks noGrp="1"/>
+          </p:cNvSpPr>
+          <p:nvPr>
+            <p:ph idx="1"/>
+          </p:nvPr>
+        </p:nvSpPr>
+        <p:spPr/>
+        <p:txBody>
+          <a:bodyPr/>
+          <a:lstStyle/>
+          <a:p>
+            <a:endParaRPr lang="en-US"/>
+          </a:p>
+        </p:txBody>
+      </p:sp>
+    </p:spTree>
+    <p:extLst>
+      <p:ext uri="{BB962C8B-B14F-4D97-AF65-F5344CB8AC3E}">
+        <p14:creationId xmlns:p14="http://schemas.microsoft.com/office/powerpoint/2010/main" val="2981725681"/>
+      </p:ext>
+    </p:extLst>
+  </p:cSld>
+  <p:clrMapOvr>
+    <a:masterClrMapping/>
+  </p:clrMapOvr>
+</p:sld>
+</file>
+
+<file path=ppt/slides/slide15.xml><?xml version="1.0" encoding="utf-8"?>
+<p:sld xmlns:a="http://schemas.openxmlformats.org/drawingml/2006/main" xmlns:r="http://schemas.openxmlformats.org/officeDocument/2006/relationships" xmlns:p="http://schemas.openxmlformats.org/presentationml/2006/main">
+  <p:cSld>
+    <p:spTree>
+      <p:nvGrpSpPr>
+        <p:cNvPr id="1" name=""/>
+        <p:cNvGrpSpPr/>
+        <p:nvPr/>
+      </p:nvGrpSpPr>
+      <p:grpSpPr>
+        <a:xfrm>
+          <a:off x="0" y="0"/>
+          <a:ext cx="0" cy="0"/>
+          <a:chOff x="0" y="0"/>
+          <a:chExt cx="0" cy="0"/>
+        </a:xfrm>
+      </p:grpSpPr>
+      <p:sp>
+        <p:nvSpPr>
+          <p:cNvPr id="2" name="Title 1"/>
+          <p:cNvSpPr>
+            <a:spLocks noGrp="1"/>
+          </p:cNvSpPr>
+          <p:nvPr>
+            <p:ph type="title"/>
+          </p:nvPr>
+        </p:nvSpPr>
+        <p:spPr/>
+        <p:txBody>
+          <a:bodyPr/>
+          <a:lstStyle/>
+          <a:p>
+            <a:r>
+              <a:rPr lang="en-US" dirty="0" smtClean="0"/>
               <a:t>Results</a:t>
             </a:r>
             <a:endParaRPr lang="en-US" dirty="0"/>
@@ -3765,7 +3921,7 @@
 </p:sld>
 </file>
 
-<file path=ppt/slides/slide14.xml><?xml version="1.0" encoding="utf-8"?>
+<file path=ppt/slides/slide16.xml><?xml version="1.0" encoding="utf-8"?>
 <p:sld xmlns:a="http://schemas.openxmlformats.org/drawingml/2006/main" xmlns:r="http://schemas.openxmlformats.org/officeDocument/2006/relationships" xmlns:p="http://schemas.openxmlformats.org/presentationml/2006/main">
   <p:cSld>
     <p:spTree>
@@ -3881,7 +4037,7 @@
 </p:sld>
 </file>
 
-<file path=ppt/slides/slide15.xml><?xml version="1.0" encoding="utf-8"?>
+<file path=ppt/slides/slide17.xml><?xml version="1.0" encoding="utf-8"?>
 <p:sld xmlns:a="http://schemas.openxmlformats.org/drawingml/2006/main" xmlns:r="http://schemas.openxmlformats.org/officeDocument/2006/relationships" xmlns:p="http://schemas.openxmlformats.org/presentationml/2006/main">
   <p:cSld>
     <p:spTree>
@@ -3993,7 +4149,7 @@
 </p:sld>
 </file>
 
-<file path=ppt/slides/slide16.xml><?xml version="1.0" encoding="utf-8"?>
+<file path=ppt/slides/slide18.xml><?xml version="1.0" encoding="utf-8"?>
 <p:sld xmlns:a="http://schemas.openxmlformats.org/drawingml/2006/main" xmlns:r="http://schemas.openxmlformats.org/officeDocument/2006/relationships" xmlns:p="http://schemas.openxmlformats.org/presentationml/2006/main">
   <p:cSld>
     <p:spTree>
@@ -4069,7 +4225,7 @@
 </p:sld>
 </file>
 
-<file path=ppt/slides/slide17.xml><?xml version="1.0" encoding="utf-8"?>
+<file path=ppt/slides/slide19.xml><?xml version="1.0" encoding="utf-8"?>
 <p:sld xmlns:a="http://schemas.openxmlformats.org/drawingml/2006/main" xmlns:r="http://schemas.openxmlformats.org/officeDocument/2006/relationships" xmlns:p="http://schemas.openxmlformats.org/presentationml/2006/main">
   <p:cSld>
     <p:spTree>
@@ -4388,7 +4544,7 @@
           <a:p>
             <a:r>
               <a:rPr lang="en-US" dirty="0" smtClean="0"/>
-              <a:t>Top-K Concepts</a:t>
+              <a:t>String Similarity</a:t>
             </a:r>
             <a:endParaRPr lang="en-US" dirty="0"/>
           </a:p>
@@ -4409,14 +4565,76 @@
           <a:bodyPr/>
           <a:lstStyle/>
           <a:p>
-            <a:endParaRPr lang="en-US"/>
+            <a:r>
+              <a:rPr lang="en-US" dirty="0" smtClean="0"/>
+              <a:t>Many Different Approaches</a:t>
+            </a:r>
+          </a:p>
+          <a:p>
+            <a:r>
+              <a:rPr lang="en-US" dirty="0" smtClean="0"/>
+              <a:t>Utilize Edit Distance Comparisons</a:t>
+            </a:r>
+          </a:p>
+          <a:p>
+            <a:pPr lvl="1"/>
+            <a:r>
+              <a:rPr lang="en-US" dirty="0" smtClean="0"/>
+              <a:t>Each operation that leads from string </a:t>
+            </a:r>
+            <a:r>
+              <a:rPr lang="en-US" i="1" dirty="0" smtClean="0"/>
+              <a:t>s</a:t>
+            </a:r>
+            <a:r>
+              <a:rPr lang="en-US" dirty="0" smtClean="0"/>
+              <a:t> to query string </a:t>
+            </a:r>
+            <a:r>
+              <a:rPr lang="en-US" i="1" dirty="0" smtClean="0"/>
+              <a:t>q </a:t>
+            </a:r>
+            <a:r>
+              <a:rPr lang="en-US" dirty="0" smtClean="0"/>
+              <a:t>increased ED by 1</a:t>
+            </a:r>
+          </a:p>
+          <a:p>
+            <a:pPr lvl="2"/>
+            <a:r>
+              <a:rPr lang="en-US" dirty="0" smtClean="0"/>
+              <a:t>Insertion</a:t>
+            </a:r>
+          </a:p>
+          <a:p>
+            <a:pPr lvl="2"/>
+            <a:r>
+              <a:rPr lang="en-US" dirty="0" smtClean="0"/>
+              <a:t>Deletion</a:t>
+            </a:r>
+          </a:p>
+          <a:p>
+            <a:pPr lvl="2"/>
+            <a:r>
+              <a:rPr lang="en-US" dirty="0" smtClean="0"/>
+              <a:t>Substitution</a:t>
+            </a:r>
+          </a:p>
+          <a:p>
+            <a:r>
+              <a:rPr lang="en-US" dirty="0" smtClean="0"/>
+              <a:t>Top-K and VGRAM both use tries to reduce search space</a:t>
+            </a:r>
+          </a:p>
+          <a:p>
+            <a:endParaRPr lang="en-US" dirty="0"/>
           </a:p>
         </p:txBody>
       </p:sp>
     </p:spTree>
     <p:extLst>
       <p:ext uri="{BB962C8B-B14F-4D97-AF65-F5344CB8AC3E}">
-        <p14:creationId xmlns:p14="http://schemas.microsoft.com/office/powerpoint/2010/main" val="2214295265"/>
+        <p14:creationId xmlns:p14="http://schemas.microsoft.com/office/powerpoint/2010/main" val="2558603131"/>
       </p:ext>
     </p:extLst>
   </p:cSld>
@@ -4460,7 +4678,7 @@
           <a:p>
             <a:r>
               <a:rPr lang="en-US" dirty="0" smtClean="0"/>
-              <a:t>VGRAM Concepts</a:t>
+              <a:t>Top-K Concepts</a:t>
             </a:r>
             <a:endParaRPr lang="en-US" dirty="0"/>
           </a:p>
@@ -4473,22 +4691,89 @@
             <a:spLocks noGrp="1"/>
           </p:cNvSpPr>
           <p:nvPr>
-            <p:ph idx="1"/>
-          </p:nvPr>
-        </p:nvSpPr>
-        <p:spPr/>
-        <p:txBody>
-          <a:bodyPr/>
-          <a:lstStyle/>
-          <a:p>
-            <a:endParaRPr lang="en-US"/>
-          </a:p>
-        </p:txBody>
-      </p:sp>
+            <p:ph sz="half" idx="1"/>
+          </p:nvPr>
+        </p:nvSpPr>
+        <p:spPr/>
+        <p:txBody>
+          <a:bodyPr>
+            <a:normAutofit fontScale="92500"/>
+          </a:bodyPr>
+          <a:lstStyle/>
+          <a:p>
+            <a:r>
+              <a:rPr lang="en-US" dirty="0" smtClean="0"/>
+              <a:t>Pivotal Top-K Search</a:t>
+            </a:r>
+          </a:p>
+          <a:p>
+            <a:r>
+              <a:rPr lang="en-US" dirty="0" smtClean="0"/>
+              <a:t>Split each string into individual characters</a:t>
+            </a:r>
+          </a:p>
+          <a:p>
+            <a:r>
+              <a:rPr lang="en-US" dirty="0" smtClean="0"/>
+              <a:t>Add each string to a master </a:t>
+            </a:r>
+            <a:r>
+              <a:rPr lang="en-US" dirty="0" err="1" smtClean="0"/>
+              <a:t>trie</a:t>
+            </a:r>
+            <a:endParaRPr lang="en-US" dirty="0" smtClean="0"/>
+          </a:p>
+          <a:p>
+            <a:r>
+              <a:rPr lang="en-US" dirty="0" smtClean="0"/>
+              <a:t>Similar prefixed strings descend from same parents</a:t>
+            </a:r>
+          </a:p>
+          <a:p>
+            <a:r>
+              <a:rPr lang="en-US" dirty="0" smtClean="0"/>
+              <a:t>Works well for many short strings that have similar prefixes/suffixes</a:t>
+            </a:r>
+          </a:p>
+          <a:p>
+            <a:r>
+              <a:rPr lang="en-US" dirty="0" smtClean="0"/>
+              <a:t>Experimentally: Does not work well for long, unique strings</a:t>
+            </a:r>
+            <a:endParaRPr lang="en-US" dirty="0"/>
+          </a:p>
+        </p:txBody>
+      </p:sp>
+      <p:pic>
+        <p:nvPicPr>
+          <p:cNvPr id="6" name="Content Placeholder 5"/>
+          <p:cNvPicPr>
+            <a:picLocks noGrp="1" noChangeAspect="1"/>
+          </p:cNvPicPr>
+          <p:nvPr>
+            <p:ph sz="half" idx="2"/>
+          </p:nvPr>
+        </p:nvPicPr>
+        <p:blipFill>
+          <a:blip r:embed="rId2"/>
+          <a:stretch>
+            <a:fillRect/>
+          </a:stretch>
+        </p:blipFill>
+        <p:spPr>
+          <a:xfrm>
+            <a:off x="6172200" y="1878509"/>
+            <a:ext cx="5181600" cy="4245569"/>
+          </a:xfrm>
+          <a:prstGeom prst="rect">
+            <a:avLst/>
+          </a:prstGeom>
+        </p:spPr>
+      </p:pic>
     </p:spTree>
     <p:extLst>
       <p:ext uri="{BB962C8B-B14F-4D97-AF65-F5344CB8AC3E}">
-        <p14:creationId xmlns:p14="http://schemas.microsoft.com/office/powerpoint/2010/main" val="1659944096"/>
+        <p14:creationId xmlns:p14="http://schemas.microsoft.com/office/powerpoint/2010/main" val="2214295265"/>
       </p:ext>
     </p:extLst>
   </p:cSld>
@@ -4532,7 +4817,7 @@
           <a:p>
             <a:r>
               <a:rPr lang="en-US" dirty="0" smtClean="0"/>
-              <a:t>Clustering Concepts</a:t>
+              <a:t>VGRAM Concepts</a:t>
             </a:r>
             <a:endParaRPr lang="en-US" dirty="0"/>
           </a:p>
@@ -4540,27 +4825,79 @@
       </p:sp>
       <p:sp>
         <p:nvSpPr>
-          <p:cNvPr id="3" name="Content Placeholder 2"/>
-          <p:cNvSpPr>
-            <a:spLocks noGrp="1"/>
-          </p:cNvSpPr>
-          <p:nvPr>
-            <p:ph idx="1"/>
-          </p:nvPr>
-        </p:nvSpPr>
-        <p:spPr/>
-        <p:txBody>
-          <a:bodyPr/>
-          <a:lstStyle/>
-          <a:p>
-            <a:endParaRPr lang="en-US"/>
-          </a:p>
-        </p:txBody>
-      </p:sp>
+          <p:cNvPr id="4" name="Content Placeholder 3"/>
+          <p:cNvSpPr>
+            <a:spLocks noGrp="1"/>
+          </p:cNvSpPr>
+          <p:nvPr>
+            <p:ph sz="half" idx="1"/>
+          </p:nvPr>
+        </p:nvSpPr>
+        <p:spPr/>
+        <p:txBody>
+          <a:bodyPr/>
+          <a:lstStyle/>
+          <a:p>
+            <a:r>
+              <a:rPr lang="en-US" dirty="0" smtClean="0"/>
+              <a:t>Divide each string into grams of variable length [min, max]</a:t>
+            </a:r>
+          </a:p>
+          <a:p>
+            <a:r>
+              <a:rPr lang="en-US" dirty="0" smtClean="0"/>
+              <a:t>Associate each string with its VGRAMS</a:t>
+            </a:r>
+          </a:p>
+          <a:p>
+            <a:r>
+              <a:rPr lang="en-US" dirty="0" smtClean="0"/>
+              <a:t>When searching, divide query into its longest length v-grams</a:t>
+            </a:r>
+          </a:p>
+          <a:p>
+            <a:r>
+              <a:rPr lang="en-US" dirty="0" smtClean="0"/>
+              <a:t>Terms that share more v-grams are more similar to </a:t>
+            </a:r>
+            <a:r>
+              <a:rPr lang="en-US" i="1" dirty="0" smtClean="0"/>
+              <a:t>q</a:t>
+            </a:r>
+            <a:endParaRPr lang="en-US" dirty="0"/>
+          </a:p>
+        </p:txBody>
+      </p:sp>
+      <p:pic>
+        <p:nvPicPr>
+          <p:cNvPr id="7" name="Content Placeholder 6"/>
+          <p:cNvPicPr>
+            <a:picLocks noGrp="1" noChangeAspect="1"/>
+          </p:cNvPicPr>
+          <p:nvPr>
+            <p:ph sz="half" idx="2"/>
+          </p:nvPr>
+        </p:nvPicPr>
+        <p:blipFill>
+          <a:blip r:embed="rId2"/>
+          <a:stretch>
+            <a:fillRect/>
+          </a:stretch>
+        </p:blipFill>
+        <p:spPr>
+          <a:xfrm>
+            <a:off x="6172200" y="2606248"/>
+            <a:ext cx="5181600" cy="2790092"/>
+          </a:xfrm>
+          <a:prstGeom prst="rect">
+            <a:avLst/>
+          </a:prstGeom>
+        </p:spPr>
+      </p:pic>
     </p:spTree>
     <p:extLst>
       <p:ext uri="{BB962C8B-B14F-4D97-AF65-F5344CB8AC3E}">
-        <p14:creationId xmlns:p14="http://schemas.microsoft.com/office/powerpoint/2010/main" val="1549522563"/>
+        <p14:creationId xmlns:p14="http://schemas.microsoft.com/office/powerpoint/2010/main" val="1659944096"/>
       </p:ext>
     </p:extLst>
   </p:cSld>
@@ -4589,7 +4926,7 @@
       </p:grpSpPr>
       <p:sp>
         <p:nvSpPr>
-          <p:cNvPr id="2" name="Title 1"/>
+          <p:cNvPr id="5" name="Title 4"/>
           <p:cNvSpPr>
             <a:spLocks noGrp="1"/>
           </p:cNvSpPr>
@@ -4604,7 +4941,7 @@
           <a:p>
             <a:r>
               <a:rPr lang="en-US" dirty="0" smtClean="0"/>
-              <a:t>Difference Matrix</a:t>
+              <a:t>VGRAM Concepts</a:t>
             </a:r>
             <a:endParaRPr lang="en-US" dirty="0"/>
           </a:p>
@@ -4612,7 +4949,7 @@
       </p:sp>
       <p:sp>
         <p:nvSpPr>
-          <p:cNvPr id="3" name="Content Placeholder 2"/>
+          <p:cNvPr id="6" name="Content Placeholder 5"/>
           <p:cNvSpPr>
             <a:spLocks noGrp="1"/>
           </p:cNvSpPr>
@@ -4625,14 +4962,65 @@
           <a:bodyPr/>
           <a:lstStyle/>
           <a:p>
-            <a:endParaRPr lang="en-US" dirty="0"/>
+            <a:r>
+              <a:rPr lang="en-US" dirty="0" smtClean="0"/>
+              <a:t>Positional VGRAM</a:t>
+            </a:r>
+          </a:p>
+          <a:p>
+            <a:pPr lvl="1"/>
+            <a:r>
+              <a:rPr lang="en-US" dirty="0" smtClean="0"/>
+              <a:t>Variation on VGRAM</a:t>
+            </a:r>
+          </a:p>
+          <a:p>
+            <a:pPr lvl="1"/>
+            <a:r>
+              <a:rPr lang="en-US" dirty="0" smtClean="0"/>
+              <a:t>Utilizes positional data to distinguish the VGRAMs more</a:t>
+            </a:r>
+          </a:p>
+          <a:p>
+            <a:pPr lvl="1"/>
+            <a:r>
+              <a:rPr lang="en-US" dirty="0" smtClean="0"/>
+              <a:t>Location of grams may be a distinguishing feature of datasets</a:t>
+            </a:r>
+          </a:p>
+          <a:p>
+            <a:r>
+              <a:rPr lang="en-US" dirty="0" smtClean="0"/>
+              <a:t>Pruning</a:t>
+            </a:r>
+          </a:p>
+          <a:p>
+            <a:pPr lvl="1"/>
+            <a:r>
+              <a:rPr lang="en-US" dirty="0" smtClean="0"/>
+              <a:t>Reduce the search space further by removing inconsequential VGRAMS</a:t>
+            </a:r>
+          </a:p>
+          <a:p>
+            <a:pPr lvl="2"/>
+            <a:r>
+              <a:rPr lang="en-US" dirty="0" smtClean="0"/>
+              <a:t>Reduce long unique VGRAMs to shorter equally significant ones</a:t>
+            </a:r>
+          </a:p>
+          <a:p>
+            <a:pPr lvl="2"/>
+            <a:r>
+              <a:rPr lang="en-US" dirty="0" smtClean="0"/>
+              <a:t>Remove long and frequent VGRAMs, but keep most unique substrings</a:t>
+            </a:r>
           </a:p>
         </p:txBody>
       </p:sp>
     </p:spTree>
     <p:extLst>
       <p:ext uri="{BB962C8B-B14F-4D97-AF65-F5344CB8AC3E}">
-        <p14:creationId xmlns:p14="http://schemas.microsoft.com/office/powerpoint/2010/main" val="4242424418"/>
+        <p14:creationId xmlns:p14="http://schemas.microsoft.com/office/powerpoint/2010/main" val="2180046272"/>
       </p:ext>
     </p:extLst>
   </p:cSld>
@@ -4676,7 +5064,7 @@
           <a:p>
             <a:r>
               <a:rPr lang="en-US" dirty="0" smtClean="0"/>
-              <a:t>Initial attempts at clustering</a:t>
+              <a:t>Clustering Concepts</a:t>
             </a:r>
             <a:endParaRPr lang="en-US" dirty="0"/>
           </a:p>
@@ -4704,7 +5092,7 @@
     </p:spTree>
     <p:extLst>
       <p:ext uri="{BB962C8B-B14F-4D97-AF65-F5344CB8AC3E}">
-        <p14:creationId xmlns:p14="http://schemas.microsoft.com/office/powerpoint/2010/main" val="3355904925"/>
+        <p14:creationId xmlns:p14="http://schemas.microsoft.com/office/powerpoint/2010/main" val="1549522563"/>
       </p:ext>
     </p:extLst>
   </p:cSld>
@@ -4747,12 +5135,8 @@
           <a:lstStyle/>
           <a:p>
             <a:r>
-              <a:rPr lang="en-US" dirty="0" err="1" smtClean="0"/>
-              <a:t>InvertedList</a:t>
-            </a:r>
-            <a:r>
-              <a:rPr lang="en-US" dirty="0" smtClean="0"/>
-              <a:t> concepts</a:t>
+              <a:rPr lang="en-US" dirty="0" smtClean="0"/>
+              <a:t>Difference Matrix</a:t>
             </a:r>
             <a:endParaRPr lang="en-US" dirty="0"/>
           </a:p>
@@ -4773,14 +5157,14 @@
           <a:bodyPr/>
           <a:lstStyle/>
           <a:p>
-            <a:endParaRPr lang="en-US"/>
+            <a:endParaRPr lang="en-US" dirty="0"/>
           </a:p>
         </p:txBody>
       </p:sp>
     </p:spTree>
     <p:extLst>
       <p:ext uri="{BB962C8B-B14F-4D97-AF65-F5344CB8AC3E}">
-        <p14:creationId xmlns:p14="http://schemas.microsoft.com/office/powerpoint/2010/main" val="2797137805"/>
+        <p14:creationId xmlns:p14="http://schemas.microsoft.com/office/powerpoint/2010/main" val="4242424418"/>
       </p:ext>
     </p:extLst>
   </p:cSld>

</xml_diff>

<commit_message>
Slides for Clustering, Indexing, Experimental setup
still need to do results
</commit_message>
<xml_diff>
--- a/Final Paper/presentation.pptx
+++ b/Final Paper/presentation.pptx
@@ -13,17 +13,19 @@
     <p:sldId id="264" r:id="rId7"/>
     <p:sldId id="275" r:id="rId8"/>
     <p:sldId id="265" r:id="rId9"/>
-    <p:sldId id="266" r:id="rId10"/>
-    <p:sldId id="267" r:id="rId11"/>
-    <p:sldId id="268" r:id="rId12"/>
-    <p:sldId id="269" r:id="rId13"/>
-    <p:sldId id="270" r:id="rId14"/>
-    <p:sldId id="271" r:id="rId15"/>
-    <p:sldId id="272" r:id="rId16"/>
-    <p:sldId id="260" r:id="rId17"/>
-    <p:sldId id="261" r:id="rId18"/>
-    <p:sldId id="273" r:id="rId19"/>
-    <p:sldId id="262" r:id="rId20"/>
+    <p:sldId id="276" r:id="rId10"/>
+    <p:sldId id="277" r:id="rId11"/>
+    <p:sldId id="266" r:id="rId12"/>
+    <p:sldId id="278" r:id="rId13"/>
+    <p:sldId id="268" r:id="rId14"/>
+    <p:sldId id="279" r:id="rId15"/>
+    <p:sldId id="270" r:id="rId16"/>
+    <p:sldId id="271" r:id="rId17"/>
+    <p:sldId id="272" r:id="rId18"/>
+    <p:sldId id="260" r:id="rId19"/>
+    <p:sldId id="261" r:id="rId20"/>
+    <p:sldId id="273" r:id="rId21"/>
+    <p:sldId id="262" r:id="rId22"/>
   </p:sldIdLst>
   <p:sldSz cx="12192000" cy="6858000"/>
   <p:notesSz cx="6858000" cy="9144000"/>
@@ -3504,14 +3506,19 @@
             <p:ph type="title"/>
           </p:nvPr>
         </p:nvSpPr>
-        <p:spPr/>
+        <p:spPr>
+          <a:xfrm>
+            <a:off x="7946266" y="500061"/>
+            <a:ext cx="3407535" cy="1325563"/>
+          </a:xfrm>
+        </p:spPr>
         <p:txBody>
           <a:bodyPr/>
           <a:lstStyle/>
           <a:p>
             <a:r>
               <a:rPr lang="en-US" dirty="0" smtClean="0"/>
-              <a:t>Initial attempts at clustering</a:t>
+              <a:t>CF - Tree</a:t>
             </a:r>
             <a:endParaRPr lang="en-US" dirty="0"/>
           </a:p>
@@ -3527,19 +3534,277 @@
             <p:ph idx="1"/>
           </p:nvPr>
         </p:nvSpPr>
-        <p:spPr/>
-        <p:txBody>
-          <a:bodyPr/>
+        <p:spPr>
+          <a:xfrm>
+            <a:off x="838200" y="1825625"/>
+            <a:ext cx="4596685" cy="4351338"/>
+          </a:xfrm>
+        </p:spPr>
+        <p:txBody>
+          <a:bodyPr>
+            <a:normAutofit lnSpcReduction="10000"/>
+          </a:bodyPr>
           <a:lstStyle/>
           <a:p>
-            <a:endParaRPr lang="en-US"/>
+            <a:pPr marL="677863" indent="-527050">
+              <a:lnSpc>
+                <a:spcPct val="80000"/>
+              </a:lnSpc>
+              <a:spcAft>
+                <a:spcPts val="2200"/>
+              </a:spcAft>
+              <a:buSzPct val="38000"/>
+              <a:buBlip>
+                <a:blip r:embed="rId2"/>
+              </a:buBlip>
+              <a:tabLst>
+                <a:tab pos="1016000" algn="l"/>
+              </a:tabLst>
+              <a:defRPr/>
+            </a:pPr>
+            <a:r>
+              <a:rPr lang="en-US" altLang="zh-CN" kern="0" dirty="0"/>
+              <a:t>Each non-leaf node has at most </a:t>
+            </a:r>
+            <a:r>
+              <a:rPr lang="en-US" altLang="zh-CN" b="1" kern="0" dirty="0"/>
+              <a:t>B</a:t>
+            </a:r>
+            <a:r>
+              <a:rPr lang="en-US" altLang="zh-CN" kern="0" dirty="0"/>
+              <a:t> entries</a:t>
+            </a:r>
+          </a:p>
+          <a:p>
+            <a:pPr marL="677863" indent="-527050">
+              <a:lnSpc>
+                <a:spcPct val="80000"/>
+              </a:lnSpc>
+              <a:spcAft>
+                <a:spcPts val="2200"/>
+              </a:spcAft>
+              <a:buSzPct val="38000"/>
+              <a:buBlip>
+                <a:blip r:embed="rId2"/>
+              </a:buBlip>
+              <a:tabLst>
+                <a:tab pos="1016000" algn="l"/>
+              </a:tabLst>
+              <a:defRPr/>
+            </a:pPr>
+            <a:r>
+              <a:rPr lang="en-US" altLang="zh-CN" kern="0" dirty="0"/>
+              <a:t>Each leaf node has at most </a:t>
+            </a:r>
+            <a:r>
+              <a:rPr lang="en-US" altLang="zh-CN" b="1" kern="0" dirty="0"/>
+              <a:t>L</a:t>
+            </a:r>
+            <a:r>
+              <a:rPr lang="en-US" altLang="zh-CN" kern="0" dirty="0"/>
+              <a:t> CF entries, each of which satisfies threshold </a:t>
+            </a:r>
+            <a:r>
+              <a:rPr lang="en-US" altLang="zh-CN" b="1" kern="0" dirty="0"/>
+              <a:t>T</a:t>
+            </a:r>
+          </a:p>
+          <a:p>
+            <a:pPr marL="677863" indent="-527050">
+              <a:lnSpc>
+                <a:spcPct val="80000"/>
+              </a:lnSpc>
+              <a:spcAft>
+                <a:spcPts val="2200"/>
+              </a:spcAft>
+              <a:buSzPct val="38000"/>
+              <a:buBlip>
+                <a:blip r:embed="rId2"/>
+              </a:buBlip>
+              <a:tabLst>
+                <a:tab pos="1016000" algn="l"/>
+              </a:tabLst>
+              <a:defRPr/>
+            </a:pPr>
+            <a:r>
+              <a:rPr lang="en-US" altLang="zh-CN" kern="0" dirty="0"/>
+              <a:t>Node size is determined by dimensionality of data space and input parameter </a:t>
+            </a:r>
+            <a:r>
+              <a:rPr lang="en-US" altLang="zh-CN" b="1" kern="0" dirty="0"/>
+              <a:t>P</a:t>
+            </a:r>
+            <a:r>
+              <a:rPr lang="en-US" altLang="zh-CN" kern="0" dirty="0"/>
+              <a:t> (page size)</a:t>
+            </a:r>
+          </a:p>
+          <a:p>
+            <a:endParaRPr lang="en-US" dirty="0"/>
+          </a:p>
+        </p:txBody>
+      </p:sp>
+      <p:pic>
+        <p:nvPicPr>
+          <p:cNvPr id="4" name="Picture 2"/>
+          <p:cNvPicPr>
+            <a:picLocks noChangeAspect="1" noChangeArrowheads="1"/>
+          </p:cNvPicPr>
+          <p:nvPr/>
+        </p:nvPicPr>
+        <p:blipFill>
+          <a:blip r:embed="rId3">
+            <a:extLst>
+              <a:ext uri="{28A0092B-C50C-407E-A947-70E740481C1C}">
+                <a14:useLocalDpi xmlns:a14="http://schemas.microsoft.com/office/drawing/2010/main" val="0"/>
+              </a:ext>
+            </a:extLst>
+          </a:blip>
+          <a:srcRect/>
+          <a:stretch>
+            <a:fillRect/>
+          </a:stretch>
+        </p:blipFill>
+        <p:spPr bwMode="auto">
+          <a:xfrm>
+            <a:off x="5626863" y="1825625"/>
+            <a:ext cx="5726938" cy="4351338"/>
+          </a:xfrm>
+          <a:prstGeom prst="rect">
+            <a:avLst/>
+          </a:prstGeom>
+          <a:noFill/>
+          <a:ln>
+            <a:noFill/>
+          </a:ln>
+          <a:extLst>
+            <a:ext uri="{909E8E84-426E-40DD-AFC4-6F175D3DCCD1}">
+              <a14:hiddenFill xmlns:a14="http://schemas.microsoft.com/office/drawing/2010/main">
+                <a:solidFill>
+                  <a:srgbClr val="FFFFFF"/>
+                </a:solidFill>
+              </a14:hiddenFill>
+            </a:ext>
+            <a:ext uri="{91240B29-F687-4F45-9708-019B960494DF}">
+              <a14:hiddenLine xmlns:a14="http://schemas.microsoft.com/office/drawing/2010/main" w="25400">
+                <a:solidFill>
+                  <a:srgbClr val="000000"/>
+                </a:solidFill>
+                <a:miter lim="800000"/>
+                <a:headEnd/>
+                <a:tailEnd/>
+              </a14:hiddenLine>
+            </a:ext>
+          </a:extLst>
+        </p:spPr>
+      </p:pic>
+      <p:pic>
+        <p:nvPicPr>
+          <p:cNvPr id="5" name="Picture 7"/>
+          <p:cNvPicPr>
+            <a:picLocks noChangeAspect="1" noChangeArrowheads="1"/>
+          </p:cNvPicPr>
+          <p:nvPr/>
+        </p:nvPicPr>
+        <p:blipFill>
+          <a:blip r:embed="rId4">
+            <a:extLst>
+              <a:ext uri="{28A0092B-C50C-407E-A947-70E740481C1C}">
+                <a14:useLocalDpi xmlns:a14="http://schemas.microsoft.com/office/drawing/2010/main" val="0"/>
+              </a:ext>
+            </a:extLst>
+          </a:blip>
+          <a:srcRect/>
+          <a:stretch>
+            <a:fillRect/>
+          </a:stretch>
+        </p:blipFill>
+        <p:spPr bwMode="auto">
+          <a:xfrm>
+            <a:off x="838200" y="1825625"/>
+            <a:ext cx="4501010" cy="4433271"/>
+          </a:xfrm>
+          <a:prstGeom prst="rect">
+            <a:avLst/>
+          </a:prstGeom>
+          <a:noFill/>
+          <a:ln>
+            <a:noFill/>
+          </a:ln>
+          <a:extLst>
+            <a:ext uri="{909E8E84-426E-40DD-AFC4-6F175D3DCCD1}">
+              <a14:hiddenFill xmlns:a14="http://schemas.microsoft.com/office/drawing/2010/main">
+                <a:solidFill>
+                  <a:srgbClr val="FFFFFF"/>
+                </a:solidFill>
+              </a14:hiddenFill>
+            </a:ext>
+            <a:ext uri="{91240B29-F687-4F45-9708-019B960494DF}">
+              <a14:hiddenLine xmlns:a14="http://schemas.microsoft.com/office/drawing/2010/main" w="9525">
+                <a:solidFill>
+                  <a:srgbClr val="000000"/>
+                </a:solidFill>
+                <a:miter lim="800000"/>
+                <a:headEnd/>
+                <a:tailEnd/>
+              </a14:hiddenLine>
+            </a:ext>
+          </a:extLst>
+        </p:spPr>
+      </p:pic>
+      <p:sp>
+        <p:nvSpPr>
+          <p:cNvPr id="6" name="Title 1"/>
+          <p:cNvSpPr txBox="1">
+            <a:spLocks/>
+          </p:cNvSpPr>
+          <p:nvPr/>
+        </p:nvSpPr>
+        <p:spPr>
+          <a:xfrm>
+            <a:off x="838200" y="500062"/>
+            <a:ext cx="4501010" cy="1325563"/>
+          </a:xfrm>
+          <a:prstGeom prst="rect">
+            <a:avLst/>
+          </a:prstGeom>
+        </p:spPr>
+        <p:txBody>
+          <a:bodyPr vert="horz" lIns="91440" tIns="45720" rIns="91440" bIns="45720" rtlCol="0" anchor="ctr">
+            <a:normAutofit/>
+          </a:bodyPr>
+          <a:lstStyle>
+            <a:lvl1pPr algn="l" defTabSz="914400" rtl="0" eaLnBrk="1" latinLnBrk="0" hangingPunct="1">
+              <a:lnSpc>
+                <a:spcPct val="90000"/>
+              </a:lnSpc>
+              <a:spcBef>
+                <a:spcPct val="0"/>
+              </a:spcBef>
+              <a:buNone/>
+              <a:defRPr sz="4400" kern="1200">
+                <a:solidFill>
+                  <a:schemeClr val="tx1"/>
+                </a:solidFill>
+                <a:latin typeface="+mj-lt"/>
+                <a:ea typeface="+mj-ea"/>
+                <a:cs typeface="+mj-cs"/>
+              </a:defRPr>
+            </a:lvl1pPr>
+          </a:lstStyle>
+          <a:p>
+            <a:r>
+              <a:rPr lang="en-US" dirty="0" smtClean="0"/>
+              <a:t>BIRCH Algorithm</a:t>
+            </a:r>
+            <a:endParaRPr lang="en-US" dirty="0"/>
           </a:p>
         </p:txBody>
       </p:sp>
     </p:spTree>
     <p:extLst>
       <p:ext uri="{BB962C8B-B14F-4D97-AF65-F5344CB8AC3E}">
-        <p14:creationId xmlns:p14="http://schemas.microsoft.com/office/powerpoint/2010/main" val="3355904925"/>
+        <p14:creationId xmlns:p14="http://schemas.microsoft.com/office/powerpoint/2010/main" val="826899592"/>
       </p:ext>
     </p:extLst>
   </p:cSld>
@@ -3582,40 +3847,1147 @@
           <a:lstStyle/>
           <a:p>
             <a:r>
-              <a:rPr lang="en-US" dirty="0" err="1" smtClean="0"/>
-              <a:t>InvertedList</a:t>
-            </a:r>
-            <a:r>
               <a:rPr lang="en-US" dirty="0" smtClean="0"/>
-              <a:t> concepts</a:t>
+              <a:t>Difference Matrix</a:t>
             </a:r>
             <a:endParaRPr lang="en-US" dirty="0"/>
           </a:p>
         </p:txBody>
       </p:sp>
-      <p:sp>
-        <p:nvSpPr>
-          <p:cNvPr id="3" name="Content Placeholder 2"/>
-          <p:cNvSpPr>
-            <a:spLocks noGrp="1"/>
-          </p:cNvSpPr>
-          <p:nvPr>
-            <p:ph idx="1"/>
-          </p:nvPr>
-        </p:nvSpPr>
-        <p:spPr/>
-        <p:txBody>
-          <a:bodyPr/>
-          <a:lstStyle/>
-          <a:p>
-            <a:endParaRPr lang="en-US"/>
-          </a:p>
-        </p:txBody>
-      </p:sp>
+      <mc:AlternateContent xmlns:mc="http://schemas.openxmlformats.org/markup-compatibility/2006">
+        <mc:Choice xmlns:a14="http://schemas.microsoft.com/office/drawing/2010/main" Requires="a14">
+          <p:sp>
+            <p:nvSpPr>
+              <p:cNvPr id="3" name="Content Placeholder 2"/>
+              <p:cNvSpPr>
+                <a:spLocks noGrp="1"/>
+              </p:cNvSpPr>
+              <p:nvPr>
+                <p:ph idx="1"/>
+              </p:nvPr>
+            </p:nvSpPr>
+            <p:spPr>
+              <a:xfrm>
+                <a:off x="838200" y="1442434"/>
+                <a:ext cx="10515600" cy="4734529"/>
+              </a:xfrm>
+            </p:spPr>
+            <p:txBody>
+              <a:bodyPr>
+                <a:normAutofit lnSpcReduction="10000"/>
+              </a:bodyPr>
+              <a:lstStyle/>
+              <a:p>
+                <a:r>
+                  <a:rPr lang="en-US" dirty="0" smtClean="0"/>
+                  <a:t>LCS of every </a:t>
+                </a:r>
+                <a:r>
+                  <a:rPr lang="en-US" dirty="0" smtClean="0"/>
+                  <a:t>(</a:t>
+                </a:r>
+                <a14:m>
+                  <m:oMath xmlns:m="http://schemas.openxmlformats.org/officeDocument/2006/math">
+                    <m:sSub>
+                      <m:sSubPr>
+                        <m:ctrlPr>
+                          <a:rPr lang="en-US" i="1" smtClean="0">
+                            <a:latin typeface="Cambria Math" panose="02040503050406030204" pitchFamily="18" charset="0"/>
+                          </a:rPr>
+                        </m:ctrlPr>
+                      </m:sSubPr>
+                      <m:e>
+                        <m:r>
+                          <a:rPr lang="en-US" b="0" i="1" smtClean="0">
+                            <a:latin typeface="Cambria Math" panose="02040503050406030204" pitchFamily="18" charset="0"/>
+                          </a:rPr>
+                          <m:t>𝑠</m:t>
+                        </m:r>
+                      </m:e>
+                      <m:sub>
+                        <m:r>
+                          <a:rPr lang="en-US" b="0" i="1" smtClean="0">
+                            <a:latin typeface="Cambria Math" panose="02040503050406030204" pitchFamily="18" charset="0"/>
+                          </a:rPr>
+                          <m:t>𝑖</m:t>
+                        </m:r>
+                      </m:sub>
+                    </m:sSub>
+                    <m:r>
+                      <a:rPr lang="en-US" b="0" i="1" smtClean="0">
+                        <a:latin typeface="Cambria Math" panose="02040503050406030204" pitchFamily="18" charset="0"/>
+                      </a:rPr>
+                      <m:t>,</m:t>
+                    </m:r>
+                    <m:sSub>
+                      <m:sSubPr>
+                        <m:ctrlPr>
+                          <a:rPr lang="en-US" i="1">
+                            <a:latin typeface="Cambria Math" panose="02040503050406030204" pitchFamily="18" charset="0"/>
+                          </a:rPr>
+                        </m:ctrlPr>
+                      </m:sSubPr>
+                      <m:e>
+                        <m:r>
+                          <a:rPr lang="en-US" i="1">
+                            <a:latin typeface="Cambria Math" panose="02040503050406030204" pitchFamily="18" charset="0"/>
+                          </a:rPr>
+                          <m:t>𝑠</m:t>
+                        </m:r>
+                      </m:e>
+                      <m:sub>
+                        <m:r>
+                          <a:rPr lang="en-US" b="0" i="1" smtClean="0">
+                            <a:latin typeface="Cambria Math" panose="02040503050406030204" pitchFamily="18" charset="0"/>
+                          </a:rPr>
+                          <m:t>𝑗</m:t>
+                        </m:r>
+                      </m:sub>
+                    </m:sSub>
+                  </m:oMath>
+                </a14:m>
+                <a:r>
+                  <a:rPr lang="en-US" dirty="0" smtClean="0"/>
+                  <a:t>) in </a:t>
+                </a:r>
+                <a:r>
+                  <a:rPr lang="en-US" i="1" dirty="0" smtClean="0"/>
+                  <a:t>Join</a:t>
+                </a:r>
+                <a:r>
+                  <a:rPr lang="en-US" dirty="0" smtClean="0"/>
+                  <a:t>(</a:t>
+                </a:r>
+                <a:r>
+                  <a:rPr lang="en-US" i="1" dirty="0" smtClean="0"/>
+                  <a:t>S,S</a:t>
+                </a:r>
+                <a:r>
+                  <a:rPr lang="en-US" dirty="0" smtClean="0"/>
+                  <a:t>)</a:t>
+                </a:r>
+              </a:p>
+              <a:p>
+                <a:pPr lvl="1"/>
+                <a:r>
+                  <a:rPr lang="en-US" dirty="0"/>
+                  <a:t>I</a:t>
+                </a:r>
+                <a:r>
+                  <a:rPr lang="en-US" dirty="0" smtClean="0"/>
+                  <a:t>n cases of two LCS of equal length, use last occurring LCS (</a:t>
+                </a:r>
+                <a:r>
+                  <a:rPr lang="en-US" dirty="0" err="1" smtClean="0"/>
+                  <a:t>eg</a:t>
+                </a:r>
+                <a:r>
+                  <a:rPr lang="en-US" dirty="0" smtClean="0"/>
+                  <a:t>, LCS(‘</a:t>
+                </a:r>
+                <a:r>
+                  <a:rPr lang="en-US" dirty="0" err="1" smtClean="0"/>
+                  <a:t>abcdDabcc</a:t>
+                </a:r>
+                <a:r>
+                  <a:rPr lang="en-US" dirty="0" smtClean="0"/>
+                  <a:t>’,‘</a:t>
+                </a:r>
+                <a:r>
+                  <a:rPr lang="en-US" dirty="0" err="1" smtClean="0"/>
+                  <a:t>abcdCabcc</a:t>
+                </a:r>
+                <a:r>
+                  <a:rPr lang="en-US" dirty="0" smtClean="0"/>
+                  <a:t>’) = ‘</a:t>
+                </a:r>
+                <a:r>
+                  <a:rPr lang="en-US" dirty="0" err="1" smtClean="0"/>
+                  <a:t>abcc</a:t>
+                </a:r>
+                <a:r>
+                  <a:rPr lang="en-US" dirty="0" smtClean="0"/>
+                  <a:t>’)</a:t>
+                </a:r>
+              </a:p>
+              <a:p>
+                <a:r>
+                  <a:rPr lang="en-US" dirty="0" smtClean="0"/>
+                  <a:t>Can be compressed into Lower Triangular form</a:t>
+                </a:r>
+              </a:p>
+              <a:p>
+                <a:r>
+                  <a:rPr lang="en-US" dirty="0" smtClean="0"/>
+                  <a:t>Also create distance matrix, composed of Length(LCS)</a:t>
+                </a:r>
+              </a:p>
+              <a:p>
+                <a:pPr marL="0" indent="0">
+                  <a:buNone/>
+                </a:pPr>
+                <a:r>
+                  <a:rPr lang="en-US" dirty="0" smtClean="0"/>
+                  <a:t>Ex. S = (fun, run, dune, dog, lug)</a:t>
+                </a:r>
+              </a:p>
+              <a:p>
+                <a:pPr marL="0" indent="0">
+                  <a:buNone/>
+                </a:pPr>
+                <a:endParaRPr lang="en-US" dirty="0" smtClean="0"/>
+              </a:p>
+              <a:p>
+                <a:pPr marL="0" indent="0">
+                  <a:buNone/>
+                </a:pPr>
+                <a14:m>
+                  <m:oMathPara xmlns:m="http://schemas.openxmlformats.org/officeDocument/2006/math">
+                    <m:oMathParaPr>
+                      <m:jc m:val="left"/>
+                    </m:oMathParaPr>
+                    <m:oMath xmlns:m="http://schemas.openxmlformats.org/officeDocument/2006/math">
+                      <m:m>
+                        <m:mPr>
+                          <m:mcs>
+                            <m:mc>
+                              <m:mcPr>
+                                <m:count m:val="3"/>
+                                <m:mcJc m:val="center"/>
+                              </m:mcPr>
+                            </m:mc>
+                          </m:mcs>
+                          <m:ctrlPr>
+                            <a:rPr lang="en-US" i="1" smtClean="0">
+                              <a:latin typeface="Cambria Math" panose="02040503050406030204" pitchFamily="18" charset="0"/>
+                            </a:rPr>
+                          </m:ctrlPr>
+                        </m:mPr>
+                        <m:mr>
+                          <m:e>
+                            <m:r>
+                              <m:rPr>
+                                <m:brk m:alnAt="7"/>
+                              </m:rPr>
+                              <a:rPr lang="en-US" b="0" i="1" smtClean="0">
+                                <a:latin typeface="Cambria Math" panose="02040503050406030204" pitchFamily="18" charset="0"/>
+                              </a:rPr>
+                              <m:t>𝑓𝑢𝑛</m:t>
+                            </m:r>
+                          </m:e>
+                          <m:e>
+                            <m:r>
+                              <a:rPr lang="en-US" b="0" i="1" smtClean="0">
+                                <a:latin typeface="Cambria Math" panose="02040503050406030204" pitchFamily="18" charset="0"/>
+                              </a:rPr>
+                              <m:t> </m:t>
+                            </m:r>
+                          </m:e>
+                          <m:e>
+                            <m:m>
+                              <m:mPr>
+                                <m:mcs>
+                                  <m:mc>
+                                    <m:mcPr>
+                                      <m:count m:val="3"/>
+                                      <m:mcJc m:val="center"/>
+                                    </m:mcPr>
+                                  </m:mc>
+                                </m:mcs>
+                                <m:ctrlPr>
+                                  <a:rPr lang="en-US" i="1" smtClean="0">
+                                    <a:latin typeface="Cambria Math" panose="02040503050406030204" pitchFamily="18" charset="0"/>
+                                  </a:rPr>
+                                </m:ctrlPr>
+                              </m:mPr>
+                              <m:mr>
+                                <m:e>
+                                  <m:r>
+                                    <m:rPr>
+                                      <m:brk m:alnAt="7"/>
+                                    </m:rPr>
+                                    <a:rPr lang="en-US" b="0" i="1" smtClean="0">
+                                      <a:latin typeface="Cambria Math" panose="02040503050406030204" pitchFamily="18" charset="0"/>
+                                    </a:rPr>
+                                    <m:t> </m:t>
+                                  </m:r>
+                                </m:e>
+                                <m:e>
+                                  <m:r>
+                                    <a:rPr lang="en-US" b="0" i="1" smtClean="0">
+                                      <a:latin typeface="Cambria Math" panose="02040503050406030204" pitchFamily="18" charset="0"/>
+                                    </a:rPr>
+                                    <m:t> </m:t>
+                                  </m:r>
+                                </m:e>
+                                <m:e>
+                                  <m:r>
+                                    <a:rPr lang="en-US" b="0" i="1" smtClean="0">
+                                      <a:latin typeface="Cambria Math" panose="02040503050406030204" pitchFamily="18" charset="0"/>
+                                    </a:rPr>
+                                    <m:t> </m:t>
+                                  </m:r>
+                                </m:e>
+                              </m:mr>
+                            </m:m>
+                          </m:e>
+                        </m:mr>
+                        <m:mr>
+                          <m:e>
+                            <m:r>
+                              <a:rPr lang="en-US" b="0" i="1" smtClean="0">
+                                <a:latin typeface="Cambria Math" panose="02040503050406030204" pitchFamily="18" charset="0"/>
+                              </a:rPr>
+                              <m:t>𝑢𝑛</m:t>
+                            </m:r>
+                          </m:e>
+                          <m:e>
+                            <m:r>
+                              <a:rPr lang="en-US" b="0" i="1" smtClean="0">
+                                <a:latin typeface="Cambria Math" panose="02040503050406030204" pitchFamily="18" charset="0"/>
+                              </a:rPr>
+                              <m:t>𝑟𝑢𝑛</m:t>
+                            </m:r>
+                          </m:e>
+                          <m:e>
+                            <m:m>
+                              <m:mPr>
+                                <m:mcs>
+                                  <m:mc>
+                                    <m:mcPr>
+                                      <m:count m:val="3"/>
+                                      <m:mcJc m:val="center"/>
+                                    </m:mcPr>
+                                  </m:mc>
+                                </m:mcs>
+                                <m:ctrlPr>
+                                  <a:rPr lang="en-US" i="1">
+                                    <a:latin typeface="Cambria Math" panose="02040503050406030204" pitchFamily="18" charset="0"/>
+                                  </a:rPr>
+                                </m:ctrlPr>
+                              </m:mPr>
+                              <m:mr>
+                                <m:e>
+                                  <m:r>
+                                    <m:rPr>
+                                      <m:brk m:alnAt="7"/>
+                                    </m:rPr>
+                                    <a:rPr lang="en-US" b="0" i="1" smtClean="0">
+                                      <a:latin typeface="Cambria Math" panose="02040503050406030204" pitchFamily="18" charset="0"/>
+                                    </a:rPr>
+                                    <m:t> </m:t>
+                                  </m:r>
+                                </m:e>
+                                <m:e>
+                                  <m:r>
+                                    <a:rPr lang="en-US" b="0" i="1" smtClean="0">
+                                      <a:latin typeface="Cambria Math" panose="02040503050406030204" pitchFamily="18" charset="0"/>
+                                    </a:rPr>
+                                    <m:t> </m:t>
+                                  </m:r>
+                                </m:e>
+                                <m:e>
+                                  <m:r>
+                                    <a:rPr lang="en-US" b="0" i="1" smtClean="0">
+                                      <a:latin typeface="Cambria Math" panose="02040503050406030204" pitchFamily="18" charset="0"/>
+                                    </a:rPr>
+                                    <m:t> </m:t>
+                                  </m:r>
+                                </m:e>
+                              </m:mr>
+                            </m:m>
+                          </m:e>
+                        </m:mr>
+                        <m:mr>
+                          <m:e>
+                            <m:m>
+                              <m:mPr>
+                                <m:mcs>
+                                  <m:mc>
+                                    <m:mcPr>
+                                      <m:count m:val="1"/>
+                                      <m:mcJc m:val="center"/>
+                                    </m:mcPr>
+                                  </m:mc>
+                                </m:mcs>
+                                <m:ctrlPr>
+                                  <a:rPr lang="en-US" i="1">
+                                    <a:latin typeface="Cambria Math" panose="02040503050406030204" pitchFamily="18" charset="0"/>
+                                  </a:rPr>
+                                </m:ctrlPr>
+                              </m:mPr>
+                              <m:mr>
+                                <m:e>
+                                  <m:r>
+                                    <m:rPr>
+                                      <m:brk m:alnAt="7"/>
+                                    </m:rPr>
+                                    <a:rPr lang="en-US" b="0" i="1" smtClean="0">
+                                      <a:latin typeface="Cambria Math" panose="02040503050406030204" pitchFamily="18" charset="0"/>
+                                    </a:rPr>
+                                    <m:t>𝑢𝑛</m:t>
+                                  </m:r>
+                                </m:e>
+                              </m:mr>
+                              <m:mr>
+                                <m:e>
+                                  <m:r>
+                                    <a:rPr lang="en-US" b="0" i="1" smtClean="0">
+                                      <a:latin typeface="Cambria Math" panose="02040503050406030204" pitchFamily="18" charset="0"/>
+                                    </a:rPr>
+                                    <m:t> </m:t>
+                                  </m:r>
+                                </m:e>
+                              </m:mr>
+                              <m:mr>
+                                <m:e>
+                                  <m:r>
+                                    <a:rPr lang="en-US" b="0" i="1" smtClean="0">
+                                      <a:latin typeface="Cambria Math" panose="02040503050406030204" pitchFamily="18" charset="0"/>
+                                    </a:rPr>
+                                    <m:t>𝑢</m:t>
+                                  </m:r>
+                                </m:e>
+                              </m:mr>
+                            </m:m>
+                          </m:e>
+                          <m:e>
+                            <m:m>
+                              <m:mPr>
+                                <m:mcs>
+                                  <m:mc>
+                                    <m:mcPr>
+                                      <m:count m:val="1"/>
+                                      <m:mcJc m:val="center"/>
+                                    </m:mcPr>
+                                  </m:mc>
+                                </m:mcs>
+                                <m:ctrlPr>
+                                  <a:rPr lang="en-US" i="1">
+                                    <a:latin typeface="Cambria Math" panose="02040503050406030204" pitchFamily="18" charset="0"/>
+                                  </a:rPr>
+                                </m:ctrlPr>
+                              </m:mPr>
+                              <m:mr>
+                                <m:e>
+                                  <m:r>
+                                    <m:rPr>
+                                      <m:brk m:alnAt="7"/>
+                                    </m:rPr>
+                                    <a:rPr lang="en-US" b="0" i="1" smtClean="0">
+                                      <a:latin typeface="Cambria Math" panose="02040503050406030204" pitchFamily="18" charset="0"/>
+                                    </a:rPr>
+                                    <m:t>𝑢𝑛</m:t>
+                                  </m:r>
+                                </m:e>
+                              </m:mr>
+                              <m:mr>
+                                <m:e>
+                                  <m:r>
+                                    <a:rPr lang="en-US" b="0" i="1" smtClean="0">
+                                      <a:latin typeface="Cambria Math" panose="02040503050406030204" pitchFamily="18" charset="0"/>
+                                    </a:rPr>
+                                    <m:t> </m:t>
+                                  </m:r>
+                                </m:e>
+                              </m:mr>
+                              <m:mr>
+                                <m:e>
+                                  <m:r>
+                                    <a:rPr lang="en-US" b="0" i="1" smtClean="0">
+                                      <a:latin typeface="Cambria Math" panose="02040503050406030204" pitchFamily="18" charset="0"/>
+                                    </a:rPr>
+                                    <m:t>𝑢</m:t>
+                                  </m:r>
+                                </m:e>
+                              </m:mr>
+                            </m:m>
+                          </m:e>
+                          <m:e>
+                            <m:m>
+                              <m:mPr>
+                                <m:mcs>
+                                  <m:mc>
+                                    <m:mcPr>
+                                      <m:count m:val="3"/>
+                                      <m:mcJc m:val="center"/>
+                                    </m:mcPr>
+                                  </m:mc>
+                                </m:mcs>
+                                <m:ctrlPr>
+                                  <a:rPr lang="en-US" i="1">
+                                    <a:latin typeface="Cambria Math" panose="02040503050406030204" pitchFamily="18" charset="0"/>
+                                  </a:rPr>
+                                </m:ctrlPr>
+                              </m:mPr>
+                              <m:mr>
+                                <m:e>
+                                  <m:m>
+                                    <m:mPr>
+                                      <m:mcs>
+                                        <m:mc>
+                                          <m:mcPr>
+                                            <m:count m:val="1"/>
+                                            <m:mcJc m:val="center"/>
+                                          </m:mcPr>
+                                        </m:mc>
+                                      </m:mcs>
+                                      <m:ctrlPr>
+                                        <a:rPr lang="en-US" i="1">
+                                          <a:latin typeface="Cambria Math" panose="02040503050406030204" pitchFamily="18" charset="0"/>
+                                        </a:rPr>
+                                      </m:ctrlPr>
+                                    </m:mPr>
+                                    <m:mr>
+                                      <m:e>
+                                        <m:r>
+                                          <m:rPr>
+                                            <m:brk m:alnAt="7"/>
+                                          </m:rPr>
+                                          <a:rPr lang="en-US" b="0" i="1" smtClean="0">
+                                            <a:latin typeface="Cambria Math" panose="02040503050406030204" pitchFamily="18" charset="0"/>
+                                          </a:rPr>
+                                          <m:t>𝑑𝑢𝑛𝑒</m:t>
+                                        </m:r>
+                                      </m:e>
+                                    </m:mr>
+                                    <m:mr>
+                                      <m:e>
+                                        <m:r>
+                                          <a:rPr lang="en-US" b="0" i="1" smtClean="0">
+                                            <a:latin typeface="Cambria Math" panose="02040503050406030204" pitchFamily="18" charset="0"/>
+                                          </a:rPr>
+                                          <m:t>𝑑</m:t>
+                                        </m:r>
+                                      </m:e>
+                                    </m:mr>
+                                    <m:mr>
+                                      <m:e>
+                                        <m:r>
+                                          <a:rPr lang="en-US" b="0" i="1" smtClean="0">
+                                            <a:latin typeface="Cambria Math" panose="02040503050406030204" pitchFamily="18" charset="0"/>
+                                          </a:rPr>
+                                          <m:t>𝑢</m:t>
+                                        </m:r>
+                                      </m:e>
+                                    </m:mr>
+                                  </m:m>
+                                </m:e>
+                                <m:e>
+                                  <m:m>
+                                    <m:mPr>
+                                      <m:mcs>
+                                        <m:mc>
+                                          <m:mcPr>
+                                            <m:count m:val="1"/>
+                                            <m:mcJc m:val="center"/>
+                                          </m:mcPr>
+                                        </m:mc>
+                                      </m:mcs>
+                                      <m:ctrlPr>
+                                        <a:rPr lang="en-US" i="1">
+                                          <a:latin typeface="Cambria Math" panose="02040503050406030204" pitchFamily="18" charset="0"/>
+                                        </a:rPr>
+                                      </m:ctrlPr>
+                                    </m:mPr>
+                                    <m:mr>
+                                      <m:e>
+                                        <m:r>
+                                          <m:rPr>
+                                            <m:brk m:alnAt="7"/>
+                                          </m:rPr>
+                                          <a:rPr lang="en-US" b="0" i="1" smtClean="0">
+                                            <a:latin typeface="Cambria Math" panose="02040503050406030204" pitchFamily="18" charset="0"/>
+                                          </a:rPr>
+                                          <m:t> </m:t>
+                                        </m:r>
+                                      </m:e>
+                                    </m:mr>
+                                    <m:mr>
+                                      <m:e>
+                                        <m:r>
+                                          <a:rPr lang="en-US" b="0" i="1" smtClean="0">
+                                            <a:latin typeface="Cambria Math" panose="02040503050406030204" pitchFamily="18" charset="0"/>
+                                          </a:rPr>
+                                          <m:t>𝑑𝑜𝑔</m:t>
+                                        </m:r>
+                                      </m:e>
+                                    </m:mr>
+                                    <m:mr>
+                                      <m:e>
+                                        <m:r>
+                                          <a:rPr lang="en-US" b="0" i="1" smtClean="0">
+                                            <a:latin typeface="Cambria Math" panose="02040503050406030204" pitchFamily="18" charset="0"/>
+                                          </a:rPr>
+                                          <m:t>𝑔</m:t>
+                                        </m:r>
+                                      </m:e>
+                                    </m:mr>
+                                  </m:m>
+                                </m:e>
+                                <m:e>
+                                  <m:m>
+                                    <m:mPr>
+                                      <m:mcs>
+                                        <m:mc>
+                                          <m:mcPr>
+                                            <m:count m:val="1"/>
+                                            <m:mcJc m:val="center"/>
+                                          </m:mcPr>
+                                        </m:mc>
+                                      </m:mcs>
+                                      <m:ctrlPr>
+                                        <a:rPr lang="en-US" i="1" smtClean="0">
+                                          <a:latin typeface="Cambria Math" panose="02040503050406030204" pitchFamily="18" charset="0"/>
+                                        </a:rPr>
+                                      </m:ctrlPr>
+                                    </m:mPr>
+                                    <m:mr>
+                                      <m:e>
+                                        <m:r>
+                                          <m:rPr>
+                                            <m:brk m:alnAt="7"/>
+                                          </m:rPr>
+                                          <a:rPr lang="en-US" b="0" i="1" smtClean="0">
+                                            <a:latin typeface="Cambria Math" panose="02040503050406030204" pitchFamily="18" charset="0"/>
+                                          </a:rPr>
+                                          <m:t> </m:t>
+                                        </m:r>
+                                      </m:e>
+                                    </m:mr>
+                                    <m:mr>
+                                      <m:e>
+                                        <m:r>
+                                          <a:rPr lang="en-US" b="0" i="1" smtClean="0">
+                                            <a:latin typeface="Cambria Math" panose="02040503050406030204" pitchFamily="18" charset="0"/>
+                                          </a:rPr>
+                                          <m:t> </m:t>
+                                        </m:r>
+                                      </m:e>
+                                    </m:mr>
+                                    <m:mr>
+                                      <m:e>
+                                        <m:r>
+                                          <a:rPr lang="en-US" b="0" i="1" smtClean="0">
+                                            <a:latin typeface="Cambria Math" panose="02040503050406030204" pitchFamily="18" charset="0"/>
+                                          </a:rPr>
+                                          <m:t>𝑙𝑢𝑔</m:t>
+                                        </m:r>
+                                      </m:e>
+                                    </m:mr>
+                                  </m:m>
+                                </m:e>
+                              </m:mr>
+                            </m:m>
+                          </m:e>
+                        </m:mr>
+                      </m:m>
+                      <m:r>
+                        <a:rPr lang="en-US" b="0" i="1" smtClean="0">
+                          <a:latin typeface="Cambria Math" panose="02040503050406030204" pitchFamily="18" charset="0"/>
+                        </a:rPr>
+                        <m:t>              </m:t>
+                      </m:r>
+                      <m:m>
+                        <m:mPr>
+                          <m:mcs>
+                            <m:mc>
+                              <m:mcPr>
+                                <m:count m:val="3"/>
+                                <m:mcJc m:val="center"/>
+                              </m:mcPr>
+                            </m:mc>
+                          </m:mcs>
+                          <m:ctrlPr>
+                            <a:rPr lang="en-US" i="1" smtClean="0">
+                              <a:latin typeface="Cambria Math" panose="02040503050406030204" pitchFamily="18" charset="0"/>
+                            </a:rPr>
+                          </m:ctrlPr>
+                        </m:mPr>
+                        <m:mr>
+                          <m:e>
+                            <m:r>
+                              <a:rPr lang="en-US" b="0" i="1" smtClean="0">
+                                <a:latin typeface="Cambria Math" panose="02040503050406030204" pitchFamily="18" charset="0"/>
+                              </a:rPr>
+                              <m:t>3</m:t>
+                            </m:r>
+                          </m:e>
+                          <m:e>
+                            <m:r>
+                              <a:rPr lang="en-US" i="1">
+                                <a:latin typeface="Cambria Math" panose="02040503050406030204" pitchFamily="18" charset="0"/>
+                              </a:rPr>
+                              <m:t> </m:t>
+                            </m:r>
+                          </m:e>
+                          <m:e>
+                            <m:m>
+                              <m:mPr>
+                                <m:mcs>
+                                  <m:mc>
+                                    <m:mcPr>
+                                      <m:count m:val="3"/>
+                                      <m:mcJc m:val="center"/>
+                                    </m:mcPr>
+                                  </m:mc>
+                                </m:mcs>
+                                <m:ctrlPr>
+                                  <a:rPr lang="en-US" i="1">
+                                    <a:latin typeface="Cambria Math" panose="02040503050406030204" pitchFamily="18" charset="0"/>
+                                  </a:rPr>
+                                </m:ctrlPr>
+                              </m:mPr>
+                              <m:mr>
+                                <m:e>
+                                  <m:r>
+                                    <m:rPr>
+                                      <m:brk m:alnAt="7"/>
+                                    </m:rPr>
+                                    <a:rPr lang="en-US" i="1">
+                                      <a:latin typeface="Cambria Math" panose="02040503050406030204" pitchFamily="18" charset="0"/>
+                                    </a:rPr>
+                                    <m:t> </m:t>
+                                  </m:r>
+                                </m:e>
+                                <m:e>
+                                  <m:r>
+                                    <a:rPr lang="en-US" i="1">
+                                      <a:latin typeface="Cambria Math" panose="02040503050406030204" pitchFamily="18" charset="0"/>
+                                    </a:rPr>
+                                    <m:t> </m:t>
+                                  </m:r>
+                                </m:e>
+                                <m:e>
+                                  <m:r>
+                                    <a:rPr lang="en-US" i="1">
+                                      <a:latin typeface="Cambria Math" panose="02040503050406030204" pitchFamily="18" charset="0"/>
+                                    </a:rPr>
+                                    <m:t> </m:t>
+                                  </m:r>
+                                </m:e>
+                              </m:mr>
+                            </m:m>
+                          </m:e>
+                        </m:mr>
+                        <m:mr>
+                          <m:e>
+                            <m:r>
+                              <a:rPr lang="en-US" b="0" i="1" smtClean="0">
+                                <a:latin typeface="Cambria Math" panose="02040503050406030204" pitchFamily="18" charset="0"/>
+                              </a:rPr>
+                              <m:t>2</m:t>
+                            </m:r>
+                          </m:e>
+                          <m:e>
+                            <m:r>
+                              <a:rPr lang="en-US" b="0" i="1" smtClean="0">
+                                <a:latin typeface="Cambria Math" panose="02040503050406030204" pitchFamily="18" charset="0"/>
+                              </a:rPr>
+                              <m:t>3</m:t>
+                            </m:r>
+                          </m:e>
+                          <m:e>
+                            <m:m>
+                              <m:mPr>
+                                <m:mcs>
+                                  <m:mc>
+                                    <m:mcPr>
+                                      <m:count m:val="3"/>
+                                      <m:mcJc m:val="center"/>
+                                    </m:mcPr>
+                                  </m:mc>
+                                </m:mcs>
+                                <m:ctrlPr>
+                                  <a:rPr lang="en-US" i="1">
+                                    <a:latin typeface="Cambria Math" panose="02040503050406030204" pitchFamily="18" charset="0"/>
+                                  </a:rPr>
+                                </m:ctrlPr>
+                              </m:mPr>
+                              <m:mr>
+                                <m:e>
+                                  <m:r>
+                                    <m:rPr>
+                                      <m:brk m:alnAt="7"/>
+                                    </m:rPr>
+                                    <a:rPr lang="en-US" i="1">
+                                      <a:latin typeface="Cambria Math" panose="02040503050406030204" pitchFamily="18" charset="0"/>
+                                    </a:rPr>
+                                    <m:t> </m:t>
+                                  </m:r>
+                                </m:e>
+                                <m:e>
+                                  <m:r>
+                                    <a:rPr lang="en-US" i="1">
+                                      <a:latin typeface="Cambria Math" panose="02040503050406030204" pitchFamily="18" charset="0"/>
+                                    </a:rPr>
+                                    <m:t> </m:t>
+                                  </m:r>
+                                </m:e>
+                                <m:e>
+                                  <m:r>
+                                    <a:rPr lang="en-US" i="1">
+                                      <a:latin typeface="Cambria Math" panose="02040503050406030204" pitchFamily="18" charset="0"/>
+                                    </a:rPr>
+                                    <m:t> </m:t>
+                                  </m:r>
+                                </m:e>
+                              </m:mr>
+                            </m:m>
+                          </m:e>
+                        </m:mr>
+                        <m:mr>
+                          <m:e>
+                            <m:m>
+                              <m:mPr>
+                                <m:mcs>
+                                  <m:mc>
+                                    <m:mcPr>
+                                      <m:count m:val="1"/>
+                                      <m:mcJc m:val="center"/>
+                                    </m:mcPr>
+                                  </m:mc>
+                                </m:mcs>
+                                <m:ctrlPr>
+                                  <a:rPr lang="en-US" i="1">
+                                    <a:latin typeface="Cambria Math" panose="02040503050406030204" pitchFamily="18" charset="0"/>
+                                  </a:rPr>
+                                </m:ctrlPr>
+                              </m:mPr>
+                              <m:mr>
+                                <m:e>
+                                  <m:r>
+                                    <m:rPr>
+                                      <m:brk m:alnAt="7"/>
+                                    </m:rPr>
+                                    <a:rPr lang="en-US" b="0" i="1" smtClean="0">
+                                      <a:latin typeface="Cambria Math" panose="02040503050406030204" pitchFamily="18" charset="0"/>
+                                    </a:rPr>
+                                    <m:t>2</m:t>
+                                  </m:r>
+                                </m:e>
+                              </m:mr>
+                              <m:mr>
+                                <m:e>
+                                  <m:r>
+                                    <a:rPr lang="en-US" i="1">
+                                      <a:latin typeface="Cambria Math" panose="02040503050406030204" pitchFamily="18" charset="0"/>
+                                    </a:rPr>
+                                    <m:t> </m:t>
+                                  </m:r>
+                                  <m:r>
+                                    <a:rPr lang="en-US" b="0" i="1" smtClean="0">
+                                      <a:latin typeface="Cambria Math" panose="02040503050406030204" pitchFamily="18" charset="0"/>
+                                    </a:rPr>
+                                    <m:t>0</m:t>
+                                  </m:r>
+                                </m:e>
+                              </m:mr>
+                              <m:mr>
+                                <m:e>
+                                  <m:r>
+                                    <a:rPr lang="en-US" b="0" i="1" smtClean="0">
+                                      <a:latin typeface="Cambria Math" panose="02040503050406030204" pitchFamily="18" charset="0"/>
+                                    </a:rPr>
+                                    <m:t>1</m:t>
+                                  </m:r>
+                                </m:e>
+                              </m:mr>
+                            </m:m>
+                          </m:e>
+                          <m:e>
+                            <m:m>
+                              <m:mPr>
+                                <m:mcs>
+                                  <m:mc>
+                                    <m:mcPr>
+                                      <m:count m:val="1"/>
+                                      <m:mcJc m:val="center"/>
+                                    </m:mcPr>
+                                  </m:mc>
+                                </m:mcs>
+                                <m:ctrlPr>
+                                  <a:rPr lang="en-US" i="1">
+                                    <a:latin typeface="Cambria Math" panose="02040503050406030204" pitchFamily="18" charset="0"/>
+                                  </a:rPr>
+                                </m:ctrlPr>
+                              </m:mPr>
+                              <m:mr>
+                                <m:e>
+                                  <m:r>
+                                    <m:rPr>
+                                      <m:brk m:alnAt="7"/>
+                                    </m:rPr>
+                                    <a:rPr lang="en-US" b="0" i="1" smtClean="0">
+                                      <a:latin typeface="Cambria Math" panose="02040503050406030204" pitchFamily="18" charset="0"/>
+                                    </a:rPr>
+                                    <m:t>2</m:t>
+                                  </m:r>
+                                </m:e>
+                              </m:mr>
+                              <m:mr>
+                                <m:e>
+                                  <m:r>
+                                    <a:rPr lang="en-US" b="0" i="1" smtClean="0">
+                                      <a:latin typeface="Cambria Math" panose="02040503050406030204" pitchFamily="18" charset="0"/>
+                                    </a:rPr>
+                                    <m:t>0</m:t>
+                                  </m:r>
+                                  <m:r>
+                                    <a:rPr lang="en-US" i="1">
+                                      <a:latin typeface="Cambria Math" panose="02040503050406030204" pitchFamily="18" charset="0"/>
+                                    </a:rPr>
+                                    <m:t> </m:t>
+                                  </m:r>
+                                </m:e>
+                              </m:mr>
+                              <m:mr>
+                                <m:e>
+                                  <m:r>
+                                    <a:rPr lang="en-US" b="0" i="1" smtClean="0">
+                                      <a:latin typeface="Cambria Math" panose="02040503050406030204" pitchFamily="18" charset="0"/>
+                                    </a:rPr>
+                                    <m:t>1</m:t>
+                                  </m:r>
+                                </m:e>
+                              </m:mr>
+                            </m:m>
+                          </m:e>
+                          <m:e>
+                            <m:m>
+                              <m:mPr>
+                                <m:mcs>
+                                  <m:mc>
+                                    <m:mcPr>
+                                      <m:count m:val="3"/>
+                                      <m:mcJc m:val="center"/>
+                                    </m:mcPr>
+                                  </m:mc>
+                                </m:mcs>
+                                <m:ctrlPr>
+                                  <a:rPr lang="en-US" i="1">
+                                    <a:latin typeface="Cambria Math" panose="02040503050406030204" pitchFamily="18" charset="0"/>
+                                  </a:rPr>
+                                </m:ctrlPr>
+                              </m:mPr>
+                              <m:mr>
+                                <m:e>
+                                  <m:m>
+                                    <m:mPr>
+                                      <m:mcs>
+                                        <m:mc>
+                                          <m:mcPr>
+                                            <m:count m:val="1"/>
+                                            <m:mcJc m:val="center"/>
+                                          </m:mcPr>
+                                        </m:mc>
+                                      </m:mcs>
+                                      <m:ctrlPr>
+                                        <a:rPr lang="en-US" i="1">
+                                          <a:latin typeface="Cambria Math" panose="02040503050406030204" pitchFamily="18" charset="0"/>
+                                        </a:rPr>
+                                      </m:ctrlPr>
+                                    </m:mPr>
+                                    <m:mr>
+                                      <m:e>
+                                        <m:r>
+                                          <m:rPr>
+                                            <m:brk m:alnAt="7"/>
+                                          </m:rPr>
+                                          <a:rPr lang="en-US" b="0" i="1" smtClean="0">
+                                            <a:latin typeface="Cambria Math" panose="02040503050406030204" pitchFamily="18" charset="0"/>
+                                          </a:rPr>
+                                          <m:t>4</m:t>
+                                        </m:r>
+                                      </m:e>
+                                    </m:mr>
+                                    <m:mr>
+                                      <m:e>
+                                        <m:r>
+                                          <a:rPr lang="en-US" b="0" i="1" smtClean="0">
+                                            <a:latin typeface="Cambria Math" panose="02040503050406030204" pitchFamily="18" charset="0"/>
+                                          </a:rPr>
+                                          <m:t>1</m:t>
+                                        </m:r>
+                                      </m:e>
+                                    </m:mr>
+                                    <m:mr>
+                                      <m:e>
+                                        <m:r>
+                                          <a:rPr lang="en-US" b="0" i="1" smtClean="0">
+                                            <a:latin typeface="Cambria Math" panose="02040503050406030204" pitchFamily="18" charset="0"/>
+                                          </a:rPr>
+                                          <m:t>1</m:t>
+                                        </m:r>
+                                      </m:e>
+                                    </m:mr>
+                                  </m:m>
+                                </m:e>
+                                <m:e>
+                                  <m:m>
+                                    <m:mPr>
+                                      <m:mcs>
+                                        <m:mc>
+                                          <m:mcPr>
+                                            <m:count m:val="1"/>
+                                            <m:mcJc m:val="center"/>
+                                          </m:mcPr>
+                                        </m:mc>
+                                      </m:mcs>
+                                      <m:ctrlPr>
+                                        <a:rPr lang="en-US" i="1">
+                                          <a:latin typeface="Cambria Math" panose="02040503050406030204" pitchFamily="18" charset="0"/>
+                                        </a:rPr>
+                                      </m:ctrlPr>
+                                    </m:mPr>
+                                    <m:mr>
+                                      <m:e>
+                                        <m:r>
+                                          <m:rPr>
+                                            <m:brk m:alnAt="7"/>
+                                          </m:rPr>
+                                          <a:rPr lang="en-US" i="1">
+                                            <a:latin typeface="Cambria Math" panose="02040503050406030204" pitchFamily="18" charset="0"/>
+                                          </a:rPr>
+                                          <m:t> </m:t>
+                                        </m:r>
+                                      </m:e>
+                                    </m:mr>
+                                    <m:mr>
+                                      <m:e>
+                                        <m:r>
+                                          <a:rPr lang="en-US" b="0" i="1" smtClean="0">
+                                            <a:latin typeface="Cambria Math" panose="02040503050406030204" pitchFamily="18" charset="0"/>
+                                          </a:rPr>
+                                          <m:t>3</m:t>
+                                        </m:r>
+                                      </m:e>
+                                    </m:mr>
+                                    <m:mr>
+                                      <m:e>
+                                        <m:r>
+                                          <a:rPr lang="en-US" b="0" i="1" smtClean="0">
+                                            <a:latin typeface="Cambria Math" panose="02040503050406030204" pitchFamily="18" charset="0"/>
+                                          </a:rPr>
+                                          <m:t>1</m:t>
+                                        </m:r>
+                                      </m:e>
+                                    </m:mr>
+                                  </m:m>
+                                </m:e>
+                                <m:e>
+                                  <m:m>
+                                    <m:mPr>
+                                      <m:mcs>
+                                        <m:mc>
+                                          <m:mcPr>
+                                            <m:count m:val="1"/>
+                                            <m:mcJc m:val="center"/>
+                                          </m:mcPr>
+                                        </m:mc>
+                                      </m:mcs>
+                                      <m:ctrlPr>
+                                        <a:rPr lang="en-US" i="1">
+                                          <a:latin typeface="Cambria Math" panose="02040503050406030204" pitchFamily="18" charset="0"/>
+                                        </a:rPr>
+                                      </m:ctrlPr>
+                                    </m:mPr>
+                                    <m:mr>
+                                      <m:e>
+                                        <m:r>
+                                          <m:rPr>
+                                            <m:brk m:alnAt="7"/>
+                                          </m:rPr>
+                                          <a:rPr lang="en-US" i="1">
+                                            <a:latin typeface="Cambria Math" panose="02040503050406030204" pitchFamily="18" charset="0"/>
+                                          </a:rPr>
+                                          <m:t> </m:t>
+                                        </m:r>
+                                      </m:e>
+                                    </m:mr>
+                                    <m:mr>
+                                      <m:e>
+                                        <m:r>
+                                          <a:rPr lang="en-US" i="1">
+                                            <a:latin typeface="Cambria Math" panose="02040503050406030204" pitchFamily="18" charset="0"/>
+                                          </a:rPr>
+                                          <m:t> </m:t>
+                                        </m:r>
+                                      </m:e>
+                                    </m:mr>
+                                    <m:mr>
+                                      <m:e>
+                                        <m:r>
+                                          <a:rPr lang="en-US" b="0" i="1" smtClean="0">
+                                            <a:latin typeface="Cambria Math" panose="02040503050406030204" pitchFamily="18" charset="0"/>
+                                          </a:rPr>
+                                          <m:t>3</m:t>
+                                        </m:r>
+                                      </m:e>
+                                    </m:mr>
+                                  </m:m>
+                                </m:e>
+                              </m:mr>
+                            </m:m>
+                          </m:e>
+                        </m:mr>
+                      </m:m>
+                    </m:oMath>
+                  </m:oMathPara>
+                </a14:m>
+                <a:endParaRPr lang="en-US" dirty="0"/>
+              </a:p>
+              <a:p>
+                <a:pPr marL="0" indent="0">
+                  <a:buNone/>
+                </a:pPr>
+                <a:endParaRPr lang="en-US" b="0" dirty="0" smtClean="0"/>
+              </a:p>
+            </p:txBody>
+          </p:sp>
+        </mc:Choice>
+        <mc:Fallback>
+          <p:sp>
+            <p:nvSpPr>
+              <p:cNvPr id="3" name="Content Placeholder 2"/>
+              <p:cNvSpPr>
+                <a:spLocks noGrp="1" noRot="1" noChangeAspect="1" noMove="1" noResize="1" noEditPoints="1" noAdjustHandles="1" noChangeArrowheads="1" noChangeShapeType="1" noTextEdit="1"/>
+              </p:cNvSpPr>
+              <p:nvPr>
+                <p:ph idx="1"/>
+              </p:nvPr>
+            </p:nvSpPr>
+            <p:spPr>
+              <a:xfrm>
+                <a:off x="838200" y="1442434"/>
+                <a:ext cx="10515600" cy="4734529"/>
+              </a:xfrm>
+              <a:blipFill rotWithShape="0">
+                <a:blip r:embed="rId2"/>
+                <a:stretch>
+                  <a:fillRect l="-1217" t="-2706"/>
+                </a:stretch>
+              </a:blipFill>
+            </p:spPr>
+            <p:txBody>
+              <a:bodyPr/>
+              <a:lstStyle/>
+              <a:p>
+                <a:r>
+                  <a:rPr lang="en-US">
+                    <a:noFill/>
+                  </a:rPr>
+                  <a:t> </a:t>
+                </a:r>
+              </a:p>
+            </p:txBody>
+          </p:sp>
+        </mc:Fallback>
+      </mc:AlternateContent>
     </p:spTree>
     <p:extLst>
       <p:ext uri="{BB962C8B-B14F-4D97-AF65-F5344CB8AC3E}">
-        <p14:creationId xmlns:p14="http://schemas.microsoft.com/office/powerpoint/2010/main" val="2797137805"/>
+        <p14:creationId xmlns:p14="http://schemas.microsoft.com/office/powerpoint/2010/main" val="4242424418"/>
       </p:ext>
     </p:extLst>
   </p:cSld>
@@ -3658,40 +5030,226 @@
           <a:lstStyle/>
           <a:p>
             <a:r>
-              <a:rPr lang="en-US" dirty="0" err="1" smtClean="0"/>
-              <a:t>InvertedList</a:t>
-            </a:r>
-            <a:r>
               <a:rPr lang="en-US" dirty="0" smtClean="0"/>
-              <a:t> Implementation</a:t>
+              <a:t>Problems with Clustering Technique</a:t>
             </a:r>
             <a:endParaRPr lang="en-US" dirty="0"/>
           </a:p>
         </p:txBody>
       </p:sp>
-      <p:sp>
-        <p:nvSpPr>
-          <p:cNvPr id="3" name="Content Placeholder 2"/>
-          <p:cNvSpPr>
-            <a:spLocks noGrp="1"/>
-          </p:cNvSpPr>
-          <p:nvPr>
-            <p:ph idx="1"/>
-          </p:nvPr>
-        </p:nvSpPr>
-        <p:spPr/>
-        <p:txBody>
-          <a:bodyPr/>
-          <a:lstStyle/>
-          <a:p>
-            <a:endParaRPr lang="en-US"/>
-          </a:p>
-        </p:txBody>
-      </p:sp>
+      <mc:AlternateContent xmlns:mc="http://schemas.openxmlformats.org/markup-compatibility/2006">
+        <mc:Choice xmlns:a14="http://schemas.microsoft.com/office/drawing/2010/main" Requires="a14">
+          <p:sp>
+            <p:nvSpPr>
+              <p:cNvPr id="3" name="Content Placeholder 2"/>
+              <p:cNvSpPr>
+                <a:spLocks noGrp="1"/>
+              </p:cNvSpPr>
+              <p:nvPr>
+                <p:ph idx="1"/>
+              </p:nvPr>
+            </p:nvSpPr>
+            <p:spPr/>
+            <p:txBody>
+              <a:bodyPr/>
+              <a:lstStyle/>
+              <a:p>
+                <a:endParaRPr lang="en-US" dirty="0" smtClean="0"/>
+              </a:p>
+              <a:p>
+                <a:r>
+                  <a:rPr lang="en-US" dirty="0" smtClean="0"/>
+                  <a:t>Hierarchical clustering is </a:t>
+                </a:r>
+                <a14:m>
+                  <m:oMath xmlns:m="http://schemas.openxmlformats.org/officeDocument/2006/math">
+                    <m:r>
+                      <a:rPr lang="en-US" b="0" i="1" smtClean="0">
+                        <a:latin typeface="Cambria Math" panose="02040503050406030204" pitchFamily="18" charset="0"/>
+                      </a:rPr>
+                      <m:t>𝑂</m:t>
+                    </m:r>
+                    <m:r>
+                      <a:rPr lang="en-US" b="0" i="1" smtClean="0">
+                        <a:latin typeface="Cambria Math" panose="02040503050406030204" pitchFamily="18" charset="0"/>
+                      </a:rPr>
+                      <m:t>(</m:t>
+                    </m:r>
+                    <m:sSup>
+                      <m:sSupPr>
+                        <m:ctrlPr>
+                          <a:rPr lang="en-US" b="0" i="1" smtClean="0">
+                            <a:latin typeface="Cambria Math" panose="02040503050406030204" pitchFamily="18" charset="0"/>
+                          </a:rPr>
+                        </m:ctrlPr>
+                      </m:sSupPr>
+                      <m:e>
+                        <m:r>
+                          <a:rPr lang="en-US" b="0" i="1" smtClean="0">
+                            <a:latin typeface="Cambria Math" panose="02040503050406030204" pitchFamily="18" charset="0"/>
+                          </a:rPr>
+                          <m:t>𝑛</m:t>
+                        </m:r>
+                      </m:e>
+                      <m:sup>
+                        <m:r>
+                          <a:rPr lang="en-US" b="0" i="1" smtClean="0">
+                            <a:latin typeface="Cambria Math" panose="02040503050406030204" pitchFamily="18" charset="0"/>
+                          </a:rPr>
+                          <m:t>2</m:t>
+                        </m:r>
+                      </m:sup>
+                    </m:sSup>
+                    <m:func>
+                      <m:funcPr>
+                        <m:ctrlPr>
+                          <a:rPr lang="en-US" b="0" i="1" smtClean="0">
+                            <a:latin typeface="Cambria Math" panose="02040503050406030204" pitchFamily="18" charset="0"/>
+                          </a:rPr>
+                        </m:ctrlPr>
+                      </m:funcPr>
+                      <m:fName>
+                        <m:r>
+                          <m:rPr>
+                            <m:sty m:val="p"/>
+                          </m:rPr>
+                          <a:rPr lang="en-US" b="0" i="0" smtClean="0">
+                            <a:latin typeface="Cambria Math" panose="02040503050406030204" pitchFamily="18" charset="0"/>
+                          </a:rPr>
+                          <m:t>log</m:t>
+                        </m:r>
+                      </m:fName>
+                      <m:e>
+                        <m:r>
+                          <a:rPr lang="en-US" b="0" i="1" smtClean="0">
+                            <a:latin typeface="Cambria Math" panose="02040503050406030204" pitchFamily="18" charset="0"/>
+                          </a:rPr>
+                          <m:t>𝑛</m:t>
+                        </m:r>
+                      </m:e>
+                    </m:func>
+                    <m:r>
+                      <a:rPr lang="en-US" b="0" i="1" smtClean="0">
+                        <a:latin typeface="Cambria Math" panose="02040503050406030204" pitchFamily="18" charset="0"/>
+                      </a:rPr>
+                      <m:t>)</m:t>
+                    </m:r>
+                  </m:oMath>
+                </a14:m>
+                <a:r>
+                  <a:rPr lang="en-US" dirty="0" smtClean="0"/>
+                  <a:t> time complexity, after </a:t>
+                </a:r>
+                <a14:m>
+                  <m:oMath xmlns:m="http://schemas.openxmlformats.org/officeDocument/2006/math">
+                    <m:r>
+                      <a:rPr lang="en-US" i="1">
+                        <a:latin typeface="Cambria Math" panose="02040503050406030204" pitchFamily="18" charset="0"/>
+                      </a:rPr>
+                      <m:t>𝑂</m:t>
+                    </m:r>
+                    <m:r>
+                      <a:rPr lang="en-US" i="1">
+                        <a:latin typeface="Cambria Math" panose="02040503050406030204" pitchFamily="18" charset="0"/>
+                      </a:rPr>
+                      <m:t>(</m:t>
+                    </m:r>
+                    <m:sSup>
+                      <m:sSupPr>
+                        <m:ctrlPr>
+                          <a:rPr lang="en-US" i="1">
+                            <a:latin typeface="Cambria Math" panose="02040503050406030204" pitchFamily="18" charset="0"/>
+                          </a:rPr>
+                        </m:ctrlPr>
+                      </m:sSupPr>
+                      <m:e>
+                        <m:r>
+                          <a:rPr lang="en-US" i="1">
+                            <a:latin typeface="Cambria Math" panose="02040503050406030204" pitchFamily="18" charset="0"/>
+                          </a:rPr>
+                          <m:t>𝑛</m:t>
+                        </m:r>
+                      </m:e>
+                      <m:sup>
+                        <m:r>
+                          <a:rPr lang="en-US" i="1">
+                            <a:latin typeface="Cambria Math" panose="02040503050406030204" pitchFamily="18" charset="0"/>
+                          </a:rPr>
+                          <m:t>2</m:t>
+                        </m:r>
+                      </m:sup>
+                    </m:sSup>
+                    <m:r>
+                      <a:rPr lang="en-US" b="0" i="1" smtClean="0">
+                        <a:latin typeface="Cambria Math" panose="02040503050406030204" pitchFamily="18" charset="0"/>
+                      </a:rPr>
+                      <m:t>)</m:t>
+                    </m:r>
+                  </m:oMath>
+                </a14:m>
+                <a:r>
+                  <a:rPr lang="en-US" dirty="0" smtClean="0"/>
+                  <a:t> to computer Difference Matrix </a:t>
+                </a:r>
+              </a:p>
+              <a:p>
+                <a:pPr marL="0" indent="0">
+                  <a:buNone/>
+                </a:pPr>
+                <a:endParaRPr lang="en-US" dirty="0"/>
+              </a:p>
+              <a:p>
+                <a:r>
+                  <a:rPr lang="en-US" dirty="0"/>
+                  <a:t>All data must be stored in memory for </a:t>
+                </a:r>
+                <a:r>
+                  <a:rPr lang="en-US" dirty="0" smtClean="0"/>
+                  <a:t>computation during clustering</a:t>
+                </a:r>
+                <a:endParaRPr lang="en-US" dirty="0"/>
+              </a:p>
+            </p:txBody>
+          </p:sp>
+        </mc:Choice>
+        <mc:Fallback>
+          <p:sp>
+            <p:nvSpPr>
+              <p:cNvPr id="3" name="Content Placeholder 2"/>
+              <p:cNvSpPr>
+                <a:spLocks noGrp="1" noRot="1" noChangeAspect="1" noMove="1" noResize="1" noEditPoints="1" noAdjustHandles="1" noChangeArrowheads="1" noChangeShapeType="1" noTextEdit="1"/>
+              </p:cNvSpPr>
+              <p:nvPr>
+                <p:ph idx="1"/>
+              </p:nvPr>
+            </p:nvSpPr>
+            <p:spPr>
+              <a:blipFill rotWithShape="0">
+                <a:blip r:embed="rId2"/>
+                <a:stretch>
+                  <a:fillRect l="-1043"/>
+                </a:stretch>
+              </a:blipFill>
+            </p:spPr>
+            <p:txBody>
+              <a:bodyPr/>
+              <a:lstStyle/>
+              <a:p>
+                <a:r>
+                  <a:rPr lang="en-US">
+                    <a:noFill/>
+                  </a:rPr>
+                  <a:t> </a:t>
+                </a:r>
+              </a:p>
+            </p:txBody>
+          </p:sp>
+        </mc:Fallback>
+      </mc:AlternateContent>
     </p:spTree>
     <p:extLst>
       <p:ext uri="{BB962C8B-B14F-4D97-AF65-F5344CB8AC3E}">
-        <p14:creationId xmlns:p14="http://schemas.microsoft.com/office/powerpoint/2010/main" val="1647062735"/>
+        <p14:creationId xmlns:p14="http://schemas.microsoft.com/office/powerpoint/2010/main" val="125370481"/>
       </p:ext>
     </p:extLst>
   </p:cSld>
@@ -3720,6 +5278,108 @@
       </p:grpSpPr>
       <p:sp>
         <p:nvSpPr>
+          <p:cNvPr id="30" name="Oval 29"/>
+          <p:cNvSpPr/>
+          <p:nvPr/>
+        </p:nvSpPr>
+        <p:spPr>
+          <a:xfrm>
+            <a:off x="5705341" y="4288665"/>
+            <a:ext cx="5380864" cy="2070147"/>
+          </a:xfrm>
+          <a:prstGeom prst="ellipse">
+            <a:avLst/>
+          </a:prstGeom>
+          <a:solidFill>
+            <a:schemeClr val="accent2">
+              <a:lumMod val="60000"/>
+              <a:lumOff val="40000"/>
+            </a:schemeClr>
+          </a:solidFill>
+          <a:ln>
+            <a:solidFill>
+              <a:schemeClr val="tx1"/>
+            </a:solidFill>
+          </a:ln>
+        </p:spPr>
+        <p:style>
+          <a:lnRef idx="2">
+            <a:schemeClr val="accent1">
+              <a:shade val="50000"/>
+            </a:schemeClr>
+          </a:lnRef>
+          <a:fillRef idx="1">
+            <a:schemeClr val="accent1"/>
+          </a:fillRef>
+          <a:effectRef idx="0">
+            <a:schemeClr val="accent1"/>
+          </a:effectRef>
+          <a:fontRef idx="minor">
+            <a:schemeClr val="lt1"/>
+          </a:fontRef>
+        </p:style>
+        <p:txBody>
+          <a:bodyPr rtlCol="0" anchor="ctr"/>
+          <a:lstStyle/>
+          <a:p>
+            <a:pPr algn="ctr"/>
+            <a:endParaRPr lang="en-US"/>
+          </a:p>
+        </p:txBody>
+      </p:sp>
+      <p:sp>
+        <p:nvSpPr>
+          <p:cNvPr id="29" name="Oval 28"/>
+          <p:cNvSpPr/>
+          <p:nvPr/>
+        </p:nvSpPr>
+        <p:spPr>
+          <a:xfrm>
+            <a:off x="6681989" y="4908396"/>
+            <a:ext cx="4226417" cy="1450416"/>
+          </a:xfrm>
+          <a:prstGeom prst="ellipse">
+            <a:avLst/>
+          </a:prstGeom>
+          <a:solidFill>
+            <a:schemeClr val="accent4">
+              <a:lumMod val="40000"/>
+              <a:lumOff val="60000"/>
+            </a:schemeClr>
+          </a:solidFill>
+          <a:ln>
+            <a:solidFill>
+              <a:schemeClr val="tx1"/>
+            </a:solidFill>
+          </a:ln>
+        </p:spPr>
+        <p:style>
+          <a:lnRef idx="2">
+            <a:schemeClr val="accent1">
+              <a:shade val="50000"/>
+            </a:schemeClr>
+          </a:lnRef>
+          <a:fillRef idx="1">
+            <a:schemeClr val="accent1"/>
+          </a:fillRef>
+          <a:effectRef idx="0">
+            <a:schemeClr val="accent1"/>
+          </a:effectRef>
+          <a:fontRef idx="minor">
+            <a:schemeClr val="lt1"/>
+          </a:fontRef>
+        </p:style>
+        <p:txBody>
+          <a:bodyPr rtlCol="0" anchor="ctr"/>
+          <a:lstStyle/>
+          <a:p>
+            <a:pPr algn="ctr"/>
+            <a:endParaRPr lang="en-US"/>
+          </a:p>
+        </p:txBody>
+      </p:sp>
+      <p:sp>
+        <p:nvSpPr>
           <p:cNvPr id="2" name="Title 1"/>
           <p:cNvSpPr>
             <a:spLocks noGrp="1"/>
@@ -3735,7 +5395,7 @@
           <a:p>
             <a:r>
               <a:rPr lang="en-US" dirty="0" smtClean="0"/>
-              <a:t>Experimental Setup</a:t>
+              <a:t>Solution: Inverted List</a:t>
             </a:r>
             <a:endParaRPr lang="en-US" dirty="0"/>
           </a:p>
@@ -3751,23 +5411,1516 @@
             <p:ph idx="1"/>
           </p:nvPr>
         </p:nvSpPr>
-        <p:spPr/>
+        <p:spPr>
+          <a:xfrm>
+            <a:off x="838200" y="1532586"/>
+            <a:ext cx="10515600" cy="4644377"/>
+          </a:xfrm>
+        </p:spPr>
         <p:txBody>
           <a:bodyPr/>
           <a:lstStyle/>
           <a:p>
             <a:r>
               <a:rPr lang="en-US" dirty="0" smtClean="0"/>
-              <a:t>C# to encode both Search Algorithms</a:t>
+              <a:t>Construct inverted lists from longest LCS to shortest LCS, will end up with tree-like structure</a:t>
             </a:r>
             <a:endParaRPr lang="en-US" dirty="0"/>
           </a:p>
-        </p:txBody>
-      </p:sp>
+          <a:p>
+            <a:pPr marL="0" indent="0">
+              <a:buNone/>
+            </a:pPr>
+            <a:endParaRPr lang="en-US" dirty="0" smtClean="0"/>
+          </a:p>
+          <a:p>
+            <a:pPr marL="0" indent="0">
+              <a:buNone/>
+            </a:pPr>
+            <a:r>
+              <a:rPr lang="en-US" i="1" dirty="0" smtClean="0"/>
+              <a:t>S = (fun, run, dune, dog, log)		S </a:t>
+            </a:r>
+            <a:r>
+              <a:rPr lang="en-US" i="1" dirty="0"/>
+              <a:t>= (fun, run, dune, dog, </a:t>
+            </a:r>
+            <a:endParaRPr lang="en-US" i="1" dirty="0" smtClean="0"/>
+          </a:p>
+          <a:p>
+            <a:pPr marL="0" indent="0">
+              <a:buNone/>
+            </a:pPr>
+            <a:r>
+              <a:rPr lang="en-US" i="1" dirty="0"/>
+              <a:t>	</a:t>
+            </a:r>
+            <a:r>
+              <a:rPr lang="en-US" i="1" dirty="0" smtClean="0"/>
+              <a:t>							log, doge, loge)</a:t>
+            </a:r>
+            <a:endParaRPr lang="en-US" i="1" dirty="0"/>
+          </a:p>
+          <a:p>
+            <a:pPr marL="0" indent="0">
+              <a:buNone/>
+            </a:pPr>
+            <a:endParaRPr lang="en-US" i="1" dirty="0" smtClean="0"/>
+          </a:p>
+          <a:p>
+            <a:pPr marL="0" indent="0">
+              <a:buNone/>
+            </a:pPr>
+            <a:endParaRPr lang="en-US" i="1" dirty="0"/>
+          </a:p>
+          <a:p>
+            <a:pPr marL="0" indent="0">
+              <a:buNone/>
+            </a:pPr>
+            <a:endParaRPr lang="en-US" i="1" dirty="0"/>
+          </a:p>
+        </p:txBody>
+      </p:sp>
+      <p:graphicFrame>
+        <p:nvGraphicFramePr>
+          <p:cNvPr id="4" name="Table 3"/>
+          <p:cNvGraphicFramePr>
+            <a:graphicFrameLocks noGrp="1"/>
+          </p:cNvGraphicFramePr>
+          <p:nvPr>
+            <p:extLst>
+              <p:ext uri="{D42A27DB-BD31-4B8C-83A1-F6EECF244321}">
+                <p14:modId xmlns:p14="http://schemas.microsoft.com/office/powerpoint/2010/main" val="307206326"/>
+              </p:ext>
+            </p:extLst>
+          </p:nvPr>
+        </p:nvGraphicFramePr>
+        <p:xfrm>
+          <a:off x="1778358" y="4570449"/>
+          <a:ext cx="565596" cy="741680"/>
+        </p:xfrm>
+        <a:graphic>
+          <a:graphicData uri="http://schemas.openxmlformats.org/drawingml/2006/table">
+            <a:tbl>
+              <a:tblPr>
+                <a:tableStyleId>{073A0DAA-6AF3-43AB-8588-CEC1D06C72B9}</a:tableStyleId>
+              </a:tblPr>
+              <a:tblGrid>
+                <a:gridCol w="565596"/>
+              </a:tblGrid>
+              <a:tr h="370840">
+                <a:tc>
+                  <a:txBody>
+                    <a:bodyPr/>
+                    <a:lstStyle/>
+                    <a:p>
+                      <a:pPr algn="ctr"/>
+                      <a:r>
+                        <a:rPr lang="en-US" dirty="0" smtClean="0"/>
+                        <a:t>un</a:t>
+                      </a:r>
+                      <a:endParaRPr lang="en-US" dirty="0"/>
+                    </a:p>
+                  </a:txBody>
+                  <a:tcPr>
+                    <a:lnL w="12700" cap="flat" cmpd="sng" algn="ctr">
+                      <a:solidFill>
+                        <a:schemeClr val="tx1"/>
+                      </a:solidFill>
+                      <a:prstDash val="solid"/>
+                      <a:round/>
+                      <a:headEnd type="none" w="med" len="med"/>
+                      <a:tailEnd type="none" w="med" len="med"/>
+                    </a:lnL>
+                    <a:lnR w="12700" cap="flat" cmpd="sng" algn="ctr">
+                      <a:solidFill>
+                        <a:schemeClr val="tx1"/>
+                      </a:solidFill>
+                      <a:prstDash val="solid"/>
+                      <a:round/>
+                      <a:headEnd type="none" w="med" len="med"/>
+                      <a:tailEnd type="none" w="med" len="med"/>
+                    </a:lnR>
+                    <a:lnT w="12700" cap="flat" cmpd="sng" algn="ctr">
+                      <a:solidFill>
+                        <a:schemeClr val="tx1"/>
+                      </a:solidFill>
+                      <a:prstDash val="solid"/>
+                      <a:round/>
+                      <a:headEnd type="none" w="med" len="med"/>
+                      <a:tailEnd type="none" w="med" len="med"/>
+                    </a:lnT>
+                    <a:lnB w="12700" cap="flat" cmpd="sng" algn="ctr">
+                      <a:solidFill>
+                        <a:schemeClr val="tx1"/>
+                      </a:solidFill>
+                      <a:prstDash val="solid"/>
+                      <a:round/>
+                      <a:headEnd type="none" w="med" len="med"/>
+                      <a:tailEnd type="none" w="med" len="med"/>
+                    </a:lnB>
+                    <a:noFill/>
+                  </a:tcPr>
+                </a:tc>
+              </a:tr>
+              <a:tr h="370840">
+                <a:tc>
+                  <a:txBody>
+                    <a:bodyPr/>
+                    <a:lstStyle/>
+                    <a:p>
+                      <a:pPr algn="ctr"/>
+                      <a:r>
+                        <a:rPr lang="en-US" dirty="0" err="1" smtClean="0"/>
+                        <a:t>og</a:t>
+                      </a:r>
+                      <a:endParaRPr lang="en-US" dirty="0"/>
+                    </a:p>
+                  </a:txBody>
+                  <a:tcPr>
+                    <a:lnL w="12700" cap="flat" cmpd="sng" algn="ctr">
+                      <a:solidFill>
+                        <a:schemeClr val="tx1"/>
+                      </a:solidFill>
+                      <a:prstDash val="solid"/>
+                      <a:round/>
+                      <a:headEnd type="none" w="med" len="med"/>
+                      <a:tailEnd type="none" w="med" len="med"/>
+                    </a:lnL>
+                    <a:lnR w="12700" cap="flat" cmpd="sng" algn="ctr">
+                      <a:solidFill>
+                        <a:schemeClr val="tx1"/>
+                      </a:solidFill>
+                      <a:prstDash val="solid"/>
+                      <a:round/>
+                      <a:headEnd type="none" w="med" len="med"/>
+                      <a:tailEnd type="none" w="med" len="med"/>
+                    </a:lnR>
+                    <a:lnT w="12700" cap="flat" cmpd="sng" algn="ctr">
+                      <a:solidFill>
+                        <a:schemeClr val="tx1"/>
+                      </a:solidFill>
+                      <a:prstDash val="solid"/>
+                      <a:round/>
+                      <a:headEnd type="none" w="med" len="med"/>
+                      <a:tailEnd type="none" w="med" len="med"/>
+                    </a:lnT>
+                    <a:lnB w="12700" cap="flat" cmpd="sng" algn="ctr">
+                      <a:solidFill>
+                        <a:schemeClr val="tx1"/>
+                      </a:solidFill>
+                      <a:prstDash val="solid"/>
+                      <a:round/>
+                      <a:headEnd type="none" w="med" len="med"/>
+                      <a:tailEnd type="none" w="med" len="med"/>
+                    </a:lnB>
+                    <a:noFill/>
+                  </a:tcPr>
+                </a:tc>
+              </a:tr>
+            </a:tbl>
+          </a:graphicData>
+        </a:graphic>
+      </p:graphicFrame>
+      <p:graphicFrame>
+        <p:nvGraphicFramePr>
+          <p:cNvPr id="8" name="Table 7"/>
+          <p:cNvGraphicFramePr>
+            <a:graphicFrameLocks noGrp="1"/>
+          </p:cNvGraphicFramePr>
+          <p:nvPr>
+            <p:extLst>
+              <p:ext uri="{D42A27DB-BD31-4B8C-83A1-F6EECF244321}">
+                <p14:modId xmlns:p14="http://schemas.microsoft.com/office/powerpoint/2010/main" val="4010138492"/>
+              </p:ext>
+            </p:extLst>
+          </p:nvPr>
+        </p:nvGraphicFramePr>
+        <p:xfrm>
+          <a:off x="2766096" y="4531812"/>
+          <a:ext cx="2333937" cy="370840"/>
+        </p:xfrm>
+        <a:graphic>
+          <a:graphicData uri="http://schemas.openxmlformats.org/drawingml/2006/table">
+            <a:tbl>
+              <a:tblPr>
+                <a:tableStyleId>{073A0DAA-6AF3-43AB-8588-CEC1D06C72B9}</a:tableStyleId>
+              </a:tblPr>
+              <a:tblGrid>
+                <a:gridCol w="777979"/>
+                <a:gridCol w="777979"/>
+                <a:gridCol w="777979"/>
+              </a:tblGrid>
+              <a:tr h="370840">
+                <a:tc>
+                  <a:txBody>
+                    <a:bodyPr/>
+                    <a:lstStyle/>
+                    <a:p>
+                      <a:pPr algn="ctr"/>
+                      <a:r>
+                        <a:rPr lang="en-US" dirty="0" smtClean="0"/>
+                        <a:t>fun</a:t>
+                      </a:r>
+                      <a:endParaRPr lang="en-US" dirty="0"/>
+                    </a:p>
+                  </a:txBody>
+                  <a:tcPr>
+                    <a:lnL w="12700" cap="flat" cmpd="sng" algn="ctr">
+                      <a:solidFill>
+                        <a:schemeClr val="tx1"/>
+                      </a:solidFill>
+                      <a:prstDash val="solid"/>
+                      <a:round/>
+                      <a:headEnd type="none" w="med" len="med"/>
+                      <a:tailEnd type="none" w="med" len="med"/>
+                    </a:lnL>
+                    <a:lnR w="12700" cap="flat" cmpd="sng" algn="ctr">
+                      <a:solidFill>
+                        <a:schemeClr val="tx1"/>
+                      </a:solidFill>
+                      <a:prstDash val="solid"/>
+                      <a:round/>
+                      <a:headEnd type="none" w="med" len="med"/>
+                      <a:tailEnd type="none" w="med" len="med"/>
+                    </a:lnR>
+                    <a:lnT w="12700" cap="flat" cmpd="sng" algn="ctr">
+                      <a:solidFill>
+                        <a:schemeClr val="tx1"/>
+                      </a:solidFill>
+                      <a:prstDash val="solid"/>
+                      <a:round/>
+                      <a:headEnd type="none" w="med" len="med"/>
+                      <a:tailEnd type="none" w="med" len="med"/>
+                    </a:lnT>
+                    <a:lnB w="12700" cap="flat" cmpd="sng" algn="ctr">
+                      <a:solidFill>
+                        <a:schemeClr val="tx1"/>
+                      </a:solidFill>
+                      <a:prstDash val="solid"/>
+                      <a:round/>
+                      <a:headEnd type="none" w="med" len="med"/>
+                      <a:tailEnd type="none" w="med" len="med"/>
+                    </a:lnB>
+                    <a:noFill/>
+                  </a:tcPr>
+                </a:tc>
+                <a:tc>
+                  <a:txBody>
+                    <a:bodyPr/>
+                    <a:lstStyle/>
+                    <a:p>
+                      <a:pPr algn="ctr"/>
+                      <a:r>
+                        <a:rPr lang="en-US" dirty="0" smtClean="0"/>
+                        <a:t>run</a:t>
+                      </a:r>
+                      <a:endParaRPr lang="en-US" dirty="0"/>
+                    </a:p>
+                  </a:txBody>
+                  <a:tcPr>
+                    <a:lnL w="12700" cap="flat" cmpd="sng" algn="ctr">
+                      <a:solidFill>
+                        <a:schemeClr val="tx1"/>
+                      </a:solidFill>
+                      <a:prstDash val="solid"/>
+                      <a:round/>
+                      <a:headEnd type="none" w="med" len="med"/>
+                      <a:tailEnd type="none" w="med" len="med"/>
+                    </a:lnL>
+                    <a:lnR w="12700" cap="flat" cmpd="sng" algn="ctr">
+                      <a:solidFill>
+                        <a:schemeClr val="tx1"/>
+                      </a:solidFill>
+                      <a:prstDash val="solid"/>
+                      <a:round/>
+                      <a:headEnd type="none" w="med" len="med"/>
+                      <a:tailEnd type="none" w="med" len="med"/>
+                    </a:lnR>
+                    <a:lnT w="12700" cap="flat" cmpd="sng" algn="ctr">
+                      <a:solidFill>
+                        <a:schemeClr val="tx1"/>
+                      </a:solidFill>
+                      <a:prstDash val="solid"/>
+                      <a:round/>
+                      <a:headEnd type="none" w="med" len="med"/>
+                      <a:tailEnd type="none" w="med" len="med"/>
+                    </a:lnT>
+                    <a:lnB w="12700" cap="flat" cmpd="sng" algn="ctr">
+                      <a:solidFill>
+                        <a:schemeClr val="tx1"/>
+                      </a:solidFill>
+                      <a:prstDash val="solid"/>
+                      <a:round/>
+                      <a:headEnd type="none" w="med" len="med"/>
+                      <a:tailEnd type="none" w="med" len="med"/>
+                    </a:lnB>
+                    <a:noFill/>
+                  </a:tcPr>
+                </a:tc>
+                <a:tc>
+                  <a:txBody>
+                    <a:bodyPr/>
+                    <a:lstStyle/>
+                    <a:p>
+                      <a:pPr algn="ctr"/>
+                      <a:r>
+                        <a:rPr lang="en-US" dirty="0" smtClean="0"/>
+                        <a:t>dune</a:t>
+                      </a:r>
+                      <a:endParaRPr lang="en-US" dirty="0"/>
+                    </a:p>
+                  </a:txBody>
+                  <a:tcPr>
+                    <a:lnL w="12700" cap="flat" cmpd="sng" algn="ctr">
+                      <a:solidFill>
+                        <a:schemeClr val="tx1"/>
+                      </a:solidFill>
+                      <a:prstDash val="solid"/>
+                      <a:round/>
+                      <a:headEnd type="none" w="med" len="med"/>
+                      <a:tailEnd type="none" w="med" len="med"/>
+                    </a:lnL>
+                    <a:lnR w="12700" cap="flat" cmpd="sng" algn="ctr">
+                      <a:solidFill>
+                        <a:schemeClr val="tx1"/>
+                      </a:solidFill>
+                      <a:prstDash val="solid"/>
+                      <a:round/>
+                      <a:headEnd type="none" w="med" len="med"/>
+                      <a:tailEnd type="none" w="med" len="med"/>
+                    </a:lnR>
+                    <a:lnT w="12700" cap="flat" cmpd="sng" algn="ctr">
+                      <a:solidFill>
+                        <a:schemeClr val="tx1"/>
+                      </a:solidFill>
+                      <a:prstDash val="solid"/>
+                      <a:round/>
+                      <a:headEnd type="none" w="med" len="med"/>
+                      <a:tailEnd type="none" w="med" len="med"/>
+                    </a:lnT>
+                    <a:lnB w="12700" cap="flat" cmpd="sng" algn="ctr">
+                      <a:solidFill>
+                        <a:schemeClr val="tx1"/>
+                      </a:solidFill>
+                      <a:prstDash val="solid"/>
+                      <a:round/>
+                      <a:headEnd type="none" w="med" len="med"/>
+                      <a:tailEnd type="none" w="med" len="med"/>
+                    </a:lnB>
+                    <a:noFill/>
+                  </a:tcPr>
+                </a:tc>
+              </a:tr>
+            </a:tbl>
+          </a:graphicData>
+        </a:graphic>
+      </p:graphicFrame>
+      <p:graphicFrame>
+        <p:nvGraphicFramePr>
+          <p:cNvPr id="9" name="Table 8"/>
+          <p:cNvGraphicFramePr>
+            <a:graphicFrameLocks noGrp="1"/>
+          </p:cNvGraphicFramePr>
+          <p:nvPr>
+            <p:extLst>
+              <p:ext uri="{D42A27DB-BD31-4B8C-83A1-F6EECF244321}">
+                <p14:modId xmlns:p14="http://schemas.microsoft.com/office/powerpoint/2010/main" val="1795392162"/>
+              </p:ext>
+            </p:extLst>
+          </p:nvPr>
+        </p:nvGraphicFramePr>
+        <p:xfrm>
+          <a:off x="2763950" y="5044821"/>
+          <a:ext cx="1555958" cy="370840"/>
+        </p:xfrm>
+        <a:graphic>
+          <a:graphicData uri="http://schemas.openxmlformats.org/drawingml/2006/table">
+            <a:tbl>
+              <a:tblPr>
+                <a:tableStyleId>{073A0DAA-6AF3-43AB-8588-CEC1D06C72B9}</a:tableStyleId>
+              </a:tblPr>
+              <a:tblGrid>
+                <a:gridCol w="777979"/>
+                <a:gridCol w="777979"/>
+              </a:tblGrid>
+              <a:tr h="370840">
+                <a:tc>
+                  <a:txBody>
+                    <a:bodyPr/>
+                    <a:lstStyle/>
+                    <a:p>
+                      <a:pPr algn="ctr"/>
+                      <a:r>
+                        <a:rPr lang="en-US" dirty="0" smtClean="0"/>
+                        <a:t>dog</a:t>
+                      </a:r>
+                      <a:endParaRPr lang="en-US" dirty="0"/>
+                    </a:p>
+                  </a:txBody>
+                  <a:tcPr>
+                    <a:lnL w="12700" cap="flat" cmpd="sng" algn="ctr">
+                      <a:solidFill>
+                        <a:schemeClr val="tx1"/>
+                      </a:solidFill>
+                      <a:prstDash val="solid"/>
+                      <a:round/>
+                      <a:headEnd type="none" w="med" len="med"/>
+                      <a:tailEnd type="none" w="med" len="med"/>
+                    </a:lnL>
+                    <a:lnR w="12700" cap="flat" cmpd="sng" algn="ctr">
+                      <a:solidFill>
+                        <a:schemeClr val="tx1"/>
+                      </a:solidFill>
+                      <a:prstDash val="solid"/>
+                      <a:round/>
+                      <a:headEnd type="none" w="med" len="med"/>
+                      <a:tailEnd type="none" w="med" len="med"/>
+                    </a:lnR>
+                    <a:lnT w="12700" cap="flat" cmpd="sng" algn="ctr">
+                      <a:solidFill>
+                        <a:schemeClr val="tx1"/>
+                      </a:solidFill>
+                      <a:prstDash val="solid"/>
+                      <a:round/>
+                      <a:headEnd type="none" w="med" len="med"/>
+                      <a:tailEnd type="none" w="med" len="med"/>
+                    </a:lnT>
+                    <a:lnB w="12700" cap="flat" cmpd="sng" algn="ctr">
+                      <a:solidFill>
+                        <a:schemeClr val="tx1"/>
+                      </a:solidFill>
+                      <a:prstDash val="solid"/>
+                      <a:round/>
+                      <a:headEnd type="none" w="med" len="med"/>
+                      <a:tailEnd type="none" w="med" len="med"/>
+                    </a:lnB>
+                    <a:noFill/>
+                  </a:tcPr>
+                </a:tc>
+                <a:tc>
+                  <a:txBody>
+                    <a:bodyPr/>
+                    <a:lstStyle/>
+                    <a:p>
+                      <a:pPr algn="ctr"/>
+                      <a:r>
+                        <a:rPr lang="en-US" dirty="0" smtClean="0"/>
+                        <a:t>log</a:t>
+                      </a:r>
+                      <a:endParaRPr lang="en-US" dirty="0"/>
+                    </a:p>
+                  </a:txBody>
+                  <a:tcPr>
+                    <a:lnL w="12700" cap="flat" cmpd="sng" algn="ctr">
+                      <a:solidFill>
+                        <a:schemeClr val="tx1"/>
+                      </a:solidFill>
+                      <a:prstDash val="solid"/>
+                      <a:round/>
+                      <a:headEnd type="none" w="med" len="med"/>
+                      <a:tailEnd type="none" w="med" len="med"/>
+                    </a:lnL>
+                    <a:lnR w="12700" cap="flat" cmpd="sng" algn="ctr">
+                      <a:solidFill>
+                        <a:schemeClr val="tx1"/>
+                      </a:solidFill>
+                      <a:prstDash val="solid"/>
+                      <a:round/>
+                      <a:headEnd type="none" w="med" len="med"/>
+                      <a:tailEnd type="none" w="med" len="med"/>
+                    </a:lnR>
+                    <a:lnT w="12700" cap="flat" cmpd="sng" algn="ctr">
+                      <a:solidFill>
+                        <a:schemeClr val="tx1"/>
+                      </a:solidFill>
+                      <a:prstDash val="solid"/>
+                      <a:round/>
+                      <a:headEnd type="none" w="med" len="med"/>
+                      <a:tailEnd type="none" w="med" len="med"/>
+                    </a:lnT>
+                    <a:lnB w="12700" cap="flat" cmpd="sng" algn="ctr">
+                      <a:solidFill>
+                        <a:schemeClr val="tx1"/>
+                      </a:solidFill>
+                      <a:prstDash val="solid"/>
+                      <a:round/>
+                      <a:headEnd type="none" w="med" len="med"/>
+                      <a:tailEnd type="none" w="med" len="med"/>
+                    </a:lnB>
+                    <a:noFill/>
+                  </a:tcPr>
+                </a:tc>
+              </a:tr>
+            </a:tbl>
+          </a:graphicData>
+        </a:graphic>
+      </p:graphicFrame>
+      <p:cxnSp>
+        <p:nvCxnSpPr>
+          <p:cNvPr id="11" name="Straight Arrow Connector 10"/>
+          <p:cNvCxnSpPr>
+            <a:endCxn id="8" idx="1"/>
+          </p:cNvCxnSpPr>
+          <p:nvPr/>
+        </p:nvCxnSpPr>
+        <p:spPr>
+          <a:xfrm flipV="1">
+            <a:off x="2343955" y="4717232"/>
+            <a:ext cx="422141" cy="9314"/>
+          </a:xfrm>
+          <a:prstGeom prst="straightConnector1">
+            <a:avLst/>
+          </a:prstGeom>
+          <a:ln>
+            <a:tailEnd type="triangle"/>
+          </a:ln>
+        </p:spPr>
+        <p:style>
+          <a:lnRef idx="1">
+            <a:schemeClr val="dk1"/>
+          </a:lnRef>
+          <a:fillRef idx="0">
+            <a:schemeClr val="dk1"/>
+          </a:fillRef>
+          <a:effectRef idx="0">
+            <a:schemeClr val="dk1"/>
+          </a:effectRef>
+          <a:fontRef idx="minor">
+            <a:schemeClr val="tx1"/>
+          </a:fontRef>
+        </p:style>
+      </p:cxnSp>
+      <p:cxnSp>
+        <p:nvCxnSpPr>
+          <p:cNvPr id="12" name="Straight Arrow Connector 11"/>
+          <p:cNvCxnSpPr>
+            <a:endCxn id="9" idx="1"/>
+          </p:cNvCxnSpPr>
+          <p:nvPr/>
+        </p:nvCxnSpPr>
+        <p:spPr>
+          <a:xfrm>
+            <a:off x="2343955" y="5151550"/>
+            <a:ext cx="419995" cy="78691"/>
+          </a:xfrm>
+          <a:prstGeom prst="straightConnector1">
+            <a:avLst/>
+          </a:prstGeom>
+          <a:ln>
+            <a:tailEnd type="triangle"/>
+          </a:ln>
+        </p:spPr>
+        <p:style>
+          <a:lnRef idx="1">
+            <a:schemeClr val="dk1"/>
+          </a:lnRef>
+          <a:fillRef idx="0">
+            <a:schemeClr val="dk1"/>
+          </a:fillRef>
+          <a:effectRef idx="0">
+            <a:schemeClr val="dk1"/>
+          </a:effectRef>
+          <a:fontRef idx="minor">
+            <a:schemeClr val="tx1"/>
+          </a:fontRef>
+        </p:style>
+      </p:cxnSp>
+      <p:graphicFrame>
+        <p:nvGraphicFramePr>
+          <p:cNvPr id="15" name="Table 14"/>
+          <p:cNvGraphicFramePr>
+            <a:graphicFrameLocks noGrp="1"/>
+          </p:cNvGraphicFramePr>
+          <p:nvPr>
+            <p:extLst>
+              <p:ext uri="{D42A27DB-BD31-4B8C-83A1-F6EECF244321}">
+                <p14:modId xmlns:p14="http://schemas.microsoft.com/office/powerpoint/2010/main" val="2780146123"/>
+              </p:ext>
+            </p:extLst>
+          </p:nvPr>
+        </p:nvGraphicFramePr>
+        <p:xfrm>
+          <a:off x="6116392" y="4570449"/>
+          <a:ext cx="565596" cy="741680"/>
+        </p:xfrm>
+        <a:graphic>
+          <a:graphicData uri="http://schemas.openxmlformats.org/drawingml/2006/table">
+            <a:tbl>
+              <a:tblPr>
+                <a:tableStyleId>{073A0DAA-6AF3-43AB-8588-CEC1D06C72B9}</a:tableStyleId>
+              </a:tblPr>
+              <a:tblGrid>
+                <a:gridCol w="565596"/>
+              </a:tblGrid>
+              <a:tr h="370840">
+                <a:tc>
+                  <a:txBody>
+                    <a:bodyPr/>
+                    <a:lstStyle/>
+                    <a:p>
+                      <a:pPr algn="ctr"/>
+                      <a:r>
+                        <a:rPr lang="en-US" dirty="0" smtClean="0"/>
+                        <a:t>un</a:t>
+                      </a:r>
+                      <a:endParaRPr lang="en-US" dirty="0"/>
+                    </a:p>
+                  </a:txBody>
+                  <a:tcPr>
+                    <a:lnL w="12700" cap="flat" cmpd="sng" algn="ctr">
+                      <a:solidFill>
+                        <a:schemeClr val="tx1"/>
+                      </a:solidFill>
+                      <a:prstDash val="solid"/>
+                      <a:round/>
+                      <a:headEnd type="none" w="med" len="med"/>
+                      <a:tailEnd type="none" w="med" len="med"/>
+                    </a:lnL>
+                    <a:lnR w="12700" cap="flat" cmpd="sng" algn="ctr">
+                      <a:solidFill>
+                        <a:schemeClr val="tx1"/>
+                      </a:solidFill>
+                      <a:prstDash val="solid"/>
+                      <a:round/>
+                      <a:headEnd type="none" w="med" len="med"/>
+                      <a:tailEnd type="none" w="med" len="med"/>
+                    </a:lnR>
+                    <a:lnT w="12700" cap="flat" cmpd="sng" algn="ctr">
+                      <a:solidFill>
+                        <a:schemeClr val="tx1"/>
+                      </a:solidFill>
+                      <a:prstDash val="solid"/>
+                      <a:round/>
+                      <a:headEnd type="none" w="med" len="med"/>
+                      <a:tailEnd type="none" w="med" len="med"/>
+                    </a:lnT>
+                    <a:lnB w="12700" cap="flat" cmpd="sng" algn="ctr">
+                      <a:solidFill>
+                        <a:schemeClr val="tx1"/>
+                      </a:solidFill>
+                      <a:prstDash val="solid"/>
+                      <a:round/>
+                      <a:headEnd type="none" w="med" len="med"/>
+                      <a:tailEnd type="none" w="med" len="med"/>
+                    </a:lnB>
+                    <a:noFill/>
+                  </a:tcPr>
+                </a:tc>
+              </a:tr>
+              <a:tr h="370840">
+                <a:tc>
+                  <a:txBody>
+                    <a:bodyPr/>
+                    <a:lstStyle/>
+                    <a:p>
+                      <a:pPr algn="ctr"/>
+                      <a:r>
+                        <a:rPr lang="en-US" dirty="0" err="1" smtClean="0"/>
+                        <a:t>og</a:t>
+                      </a:r>
+                      <a:endParaRPr lang="en-US" dirty="0"/>
+                    </a:p>
+                  </a:txBody>
+                  <a:tcPr>
+                    <a:lnL w="12700" cap="flat" cmpd="sng" algn="ctr">
+                      <a:solidFill>
+                        <a:schemeClr val="tx1"/>
+                      </a:solidFill>
+                      <a:prstDash val="solid"/>
+                      <a:round/>
+                      <a:headEnd type="none" w="med" len="med"/>
+                      <a:tailEnd type="none" w="med" len="med"/>
+                    </a:lnL>
+                    <a:lnR w="12700" cap="flat" cmpd="sng" algn="ctr">
+                      <a:solidFill>
+                        <a:schemeClr val="tx1"/>
+                      </a:solidFill>
+                      <a:prstDash val="solid"/>
+                      <a:round/>
+                      <a:headEnd type="none" w="med" len="med"/>
+                      <a:tailEnd type="none" w="med" len="med"/>
+                    </a:lnR>
+                    <a:lnT w="12700" cap="flat" cmpd="sng" algn="ctr">
+                      <a:solidFill>
+                        <a:schemeClr val="tx1"/>
+                      </a:solidFill>
+                      <a:prstDash val="solid"/>
+                      <a:round/>
+                      <a:headEnd type="none" w="med" len="med"/>
+                      <a:tailEnd type="none" w="med" len="med"/>
+                    </a:lnT>
+                    <a:lnB w="12700" cap="flat" cmpd="sng" algn="ctr">
+                      <a:solidFill>
+                        <a:schemeClr val="tx1"/>
+                      </a:solidFill>
+                      <a:prstDash val="solid"/>
+                      <a:round/>
+                      <a:headEnd type="none" w="med" len="med"/>
+                      <a:tailEnd type="none" w="med" len="med"/>
+                    </a:lnB>
+                    <a:noFill/>
+                  </a:tcPr>
+                </a:tc>
+              </a:tr>
+            </a:tbl>
+          </a:graphicData>
+        </a:graphic>
+      </p:graphicFrame>
+      <p:graphicFrame>
+        <p:nvGraphicFramePr>
+          <p:cNvPr id="16" name="Table 15"/>
+          <p:cNvGraphicFramePr>
+            <a:graphicFrameLocks noGrp="1"/>
+          </p:cNvGraphicFramePr>
+          <p:nvPr>
+            <p:extLst>
+              <p:ext uri="{D42A27DB-BD31-4B8C-83A1-F6EECF244321}">
+                <p14:modId xmlns:p14="http://schemas.microsoft.com/office/powerpoint/2010/main" val="1553158522"/>
+              </p:ext>
+            </p:extLst>
+          </p:nvPr>
+        </p:nvGraphicFramePr>
+        <p:xfrm>
+          <a:off x="7104130" y="4531812"/>
+          <a:ext cx="2333937" cy="370840"/>
+        </p:xfrm>
+        <a:graphic>
+          <a:graphicData uri="http://schemas.openxmlformats.org/drawingml/2006/table">
+            <a:tbl>
+              <a:tblPr>
+                <a:tableStyleId>{073A0DAA-6AF3-43AB-8588-CEC1D06C72B9}</a:tableStyleId>
+              </a:tblPr>
+              <a:tblGrid>
+                <a:gridCol w="777979"/>
+                <a:gridCol w="777979"/>
+                <a:gridCol w="777979"/>
+              </a:tblGrid>
+              <a:tr h="370840">
+                <a:tc>
+                  <a:txBody>
+                    <a:bodyPr/>
+                    <a:lstStyle/>
+                    <a:p>
+                      <a:pPr algn="ctr"/>
+                      <a:r>
+                        <a:rPr lang="en-US" dirty="0" smtClean="0"/>
+                        <a:t>fun</a:t>
+                      </a:r>
+                      <a:endParaRPr lang="en-US" dirty="0"/>
+                    </a:p>
+                  </a:txBody>
+                  <a:tcPr>
+                    <a:lnL w="12700" cap="flat" cmpd="sng" algn="ctr">
+                      <a:solidFill>
+                        <a:schemeClr val="tx1"/>
+                      </a:solidFill>
+                      <a:prstDash val="solid"/>
+                      <a:round/>
+                      <a:headEnd type="none" w="med" len="med"/>
+                      <a:tailEnd type="none" w="med" len="med"/>
+                    </a:lnL>
+                    <a:lnR w="12700" cap="flat" cmpd="sng" algn="ctr">
+                      <a:solidFill>
+                        <a:schemeClr val="tx1"/>
+                      </a:solidFill>
+                      <a:prstDash val="solid"/>
+                      <a:round/>
+                      <a:headEnd type="none" w="med" len="med"/>
+                      <a:tailEnd type="none" w="med" len="med"/>
+                    </a:lnR>
+                    <a:lnT w="12700" cap="flat" cmpd="sng" algn="ctr">
+                      <a:solidFill>
+                        <a:schemeClr val="tx1"/>
+                      </a:solidFill>
+                      <a:prstDash val="solid"/>
+                      <a:round/>
+                      <a:headEnd type="none" w="med" len="med"/>
+                      <a:tailEnd type="none" w="med" len="med"/>
+                    </a:lnT>
+                    <a:lnB w="12700" cap="flat" cmpd="sng" algn="ctr">
+                      <a:solidFill>
+                        <a:schemeClr val="tx1"/>
+                      </a:solidFill>
+                      <a:prstDash val="solid"/>
+                      <a:round/>
+                      <a:headEnd type="none" w="med" len="med"/>
+                      <a:tailEnd type="none" w="med" len="med"/>
+                    </a:lnB>
+                    <a:noFill/>
+                  </a:tcPr>
+                </a:tc>
+                <a:tc>
+                  <a:txBody>
+                    <a:bodyPr/>
+                    <a:lstStyle/>
+                    <a:p>
+                      <a:pPr algn="ctr"/>
+                      <a:r>
+                        <a:rPr lang="en-US" dirty="0" smtClean="0"/>
+                        <a:t>run</a:t>
+                      </a:r>
+                      <a:endParaRPr lang="en-US" dirty="0"/>
+                    </a:p>
+                  </a:txBody>
+                  <a:tcPr>
+                    <a:lnL w="12700" cap="flat" cmpd="sng" algn="ctr">
+                      <a:solidFill>
+                        <a:schemeClr val="tx1"/>
+                      </a:solidFill>
+                      <a:prstDash val="solid"/>
+                      <a:round/>
+                      <a:headEnd type="none" w="med" len="med"/>
+                      <a:tailEnd type="none" w="med" len="med"/>
+                    </a:lnL>
+                    <a:lnR w="12700" cap="flat" cmpd="sng" algn="ctr">
+                      <a:solidFill>
+                        <a:schemeClr val="tx1"/>
+                      </a:solidFill>
+                      <a:prstDash val="solid"/>
+                      <a:round/>
+                      <a:headEnd type="none" w="med" len="med"/>
+                      <a:tailEnd type="none" w="med" len="med"/>
+                    </a:lnR>
+                    <a:lnT w="12700" cap="flat" cmpd="sng" algn="ctr">
+                      <a:solidFill>
+                        <a:schemeClr val="tx1"/>
+                      </a:solidFill>
+                      <a:prstDash val="solid"/>
+                      <a:round/>
+                      <a:headEnd type="none" w="med" len="med"/>
+                      <a:tailEnd type="none" w="med" len="med"/>
+                    </a:lnT>
+                    <a:lnB w="12700" cap="flat" cmpd="sng" algn="ctr">
+                      <a:solidFill>
+                        <a:schemeClr val="tx1"/>
+                      </a:solidFill>
+                      <a:prstDash val="solid"/>
+                      <a:round/>
+                      <a:headEnd type="none" w="med" len="med"/>
+                      <a:tailEnd type="none" w="med" len="med"/>
+                    </a:lnB>
+                    <a:noFill/>
+                  </a:tcPr>
+                </a:tc>
+                <a:tc>
+                  <a:txBody>
+                    <a:bodyPr/>
+                    <a:lstStyle/>
+                    <a:p>
+                      <a:pPr algn="ctr"/>
+                      <a:r>
+                        <a:rPr lang="en-US" dirty="0" smtClean="0"/>
+                        <a:t>dune</a:t>
+                      </a:r>
+                      <a:endParaRPr lang="en-US" dirty="0"/>
+                    </a:p>
+                  </a:txBody>
+                  <a:tcPr>
+                    <a:lnL w="12700" cap="flat" cmpd="sng" algn="ctr">
+                      <a:solidFill>
+                        <a:schemeClr val="tx1"/>
+                      </a:solidFill>
+                      <a:prstDash val="solid"/>
+                      <a:round/>
+                      <a:headEnd type="none" w="med" len="med"/>
+                      <a:tailEnd type="none" w="med" len="med"/>
+                    </a:lnL>
+                    <a:lnR w="12700" cap="flat" cmpd="sng" algn="ctr">
+                      <a:solidFill>
+                        <a:schemeClr val="tx1"/>
+                      </a:solidFill>
+                      <a:prstDash val="solid"/>
+                      <a:round/>
+                      <a:headEnd type="none" w="med" len="med"/>
+                      <a:tailEnd type="none" w="med" len="med"/>
+                    </a:lnR>
+                    <a:lnT w="12700" cap="flat" cmpd="sng" algn="ctr">
+                      <a:solidFill>
+                        <a:schemeClr val="tx1"/>
+                      </a:solidFill>
+                      <a:prstDash val="solid"/>
+                      <a:round/>
+                      <a:headEnd type="none" w="med" len="med"/>
+                      <a:tailEnd type="none" w="med" len="med"/>
+                    </a:lnT>
+                    <a:lnB w="12700" cap="flat" cmpd="sng" algn="ctr">
+                      <a:solidFill>
+                        <a:schemeClr val="tx1"/>
+                      </a:solidFill>
+                      <a:prstDash val="solid"/>
+                      <a:round/>
+                      <a:headEnd type="none" w="med" len="med"/>
+                      <a:tailEnd type="none" w="med" len="med"/>
+                    </a:lnB>
+                    <a:noFill/>
+                  </a:tcPr>
+                </a:tc>
+              </a:tr>
+            </a:tbl>
+          </a:graphicData>
+        </a:graphic>
+      </p:graphicFrame>
+      <p:graphicFrame>
+        <p:nvGraphicFramePr>
+          <p:cNvPr id="17" name="Table 16"/>
+          <p:cNvGraphicFramePr>
+            <a:graphicFrameLocks noGrp="1"/>
+          </p:cNvGraphicFramePr>
+          <p:nvPr>
+            <p:extLst>
+              <p:ext uri="{D42A27DB-BD31-4B8C-83A1-F6EECF244321}">
+                <p14:modId xmlns:p14="http://schemas.microsoft.com/office/powerpoint/2010/main" val="960949341"/>
+              </p:ext>
+            </p:extLst>
+          </p:nvPr>
+        </p:nvGraphicFramePr>
+        <p:xfrm>
+          <a:off x="7101984" y="5044821"/>
+          <a:ext cx="1555958" cy="370840"/>
+        </p:xfrm>
+        <a:graphic>
+          <a:graphicData uri="http://schemas.openxmlformats.org/drawingml/2006/table">
+            <a:tbl>
+              <a:tblPr>
+                <a:tableStyleId>{073A0DAA-6AF3-43AB-8588-CEC1D06C72B9}</a:tableStyleId>
+              </a:tblPr>
+              <a:tblGrid>
+                <a:gridCol w="777979"/>
+                <a:gridCol w="777979"/>
+              </a:tblGrid>
+              <a:tr h="370840">
+                <a:tc>
+                  <a:txBody>
+                    <a:bodyPr/>
+                    <a:lstStyle/>
+                    <a:p>
+                      <a:pPr algn="ctr"/>
+                      <a:r>
+                        <a:rPr lang="en-US" dirty="0" smtClean="0"/>
+                        <a:t>dog</a:t>
+                      </a:r>
+                      <a:endParaRPr lang="en-US" dirty="0"/>
+                    </a:p>
+                  </a:txBody>
+                  <a:tcPr>
+                    <a:lnL w="12700" cap="flat" cmpd="sng" algn="ctr">
+                      <a:solidFill>
+                        <a:schemeClr val="tx1"/>
+                      </a:solidFill>
+                      <a:prstDash val="solid"/>
+                      <a:round/>
+                      <a:headEnd type="none" w="med" len="med"/>
+                      <a:tailEnd type="none" w="med" len="med"/>
+                    </a:lnL>
+                    <a:lnR w="12700" cap="flat" cmpd="sng" algn="ctr">
+                      <a:solidFill>
+                        <a:schemeClr val="tx1"/>
+                      </a:solidFill>
+                      <a:prstDash val="solid"/>
+                      <a:round/>
+                      <a:headEnd type="none" w="med" len="med"/>
+                      <a:tailEnd type="none" w="med" len="med"/>
+                    </a:lnR>
+                    <a:lnT w="12700" cap="flat" cmpd="sng" algn="ctr">
+                      <a:solidFill>
+                        <a:schemeClr val="tx1"/>
+                      </a:solidFill>
+                      <a:prstDash val="solid"/>
+                      <a:round/>
+                      <a:headEnd type="none" w="med" len="med"/>
+                      <a:tailEnd type="none" w="med" len="med"/>
+                    </a:lnT>
+                    <a:lnB w="12700" cap="flat" cmpd="sng" algn="ctr">
+                      <a:solidFill>
+                        <a:schemeClr val="tx1"/>
+                      </a:solidFill>
+                      <a:prstDash val="solid"/>
+                      <a:round/>
+                      <a:headEnd type="none" w="med" len="med"/>
+                      <a:tailEnd type="none" w="med" len="med"/>
+                    </a:lnB>
+                    <a:noFill/>
+                  </a:tcPr>
+                </a:tc>
+                <a:tc>
+                  <a:txBody>
+                    <a:bodyPr/>
+                    <a:lstStyle/>
+                    <a:p>
+                      <a:pPr algn="ctr"/>
+                      <a:r>
+                        <a:rPr lang="en-US" dirty="0" smtClean="0"/>
+                        <a:t>log</a:t>
+                      </a:r>
+                      <a:endParaRPr lang="en-US" dirty="0"/>
+                    </a:p>
+                  </a:txBody>
+                  <a:tcPr>
+                    <a:lnL w="12700" cap="flat" cmpd="sng" algn="ctr">
+                      <a:solidFill>
+                        <a:schemeClr val="tx1"/>
+                      </a:solidFill>
+                      <a:prstDash val="solid"/>
+                      <a:round/>
+                      <a:headEnd type="none" w="med" len="med"/>
+                      <a:tailEnd type="none" w="med" len="med"/>
+                    </a:lnL>
+                    <a:lnR w="12700" cap="flat" cmpd="sng" algn="ctr">
+                      <a:solidFill>
+                        <a:schemeClr val="tx1"/>
+                      </a:solidFill>
+                      <a:prstDash val="solid"/>
+                      <a:round/>
+                      <a:headEnd type="none" w="med" len="med"/>
+                      <a:tailEnd type="none" w="med" len="med"/>
+                    </a:lnR>
+                    <a:lnT w="12700" cap="flat" cmpd="sng" algn="ctr">
+                      <a:solidFill>
+                        <a:schemeClr val="tx1"/>
+                      </a:solidFill>
+                      <a:prstDash val="solid"/>
+                      <a:round/>
+                      <a:headEnd type="none" w="med" len="med"/>
+                      <a:tailEnd type="none" w="med" len="med"/>
+                    </a:lnT>
+                    <a:lnB w="12700" cap="flat" cmpd="sng" algn="ctr">
+                      <a:solidFill>
+                        <a:schemeClr val="tx1"/>
+                      </a:solidFill>
+                      <a:prstDash val="solid"/>
+                      <a:round/>
+                      <a:headEnd type="none" w="med" len="med"/>
+                      <a:tailEnd type="none" w="med" len="med"/>
+                    </a:lnB>
+                    <a:noFill/>
+                  </a:tcPr>
+                </a:tc>
+              </a:tr>
+            </a:tbl>
+          </a:graphicData>
+        </a:graphic>
+      </p:graphicFrame>
+      <p:cxnSp>
+        <p:nvCxnSpPr>
+          <p:cNvPr id="18" name="Straight Arrow Connector 17"/>
+          <p:cNvCxnSpPr>
+            <a:endCxn id="16" idx="1"/>
+          </p:cNvCxnSpPr>
+          <p:nvPr/>
+        </p:nvCxnSpPr>
+        <p:spPr>
+          <a:xfrm flipV="1">
+            <a:off x="6681989" y="4717232"/>
+            <a:ext cx="422141" cy="9314"/>
+          </a:xfrm>
+          <a:prstGeom prst="straightConnector1">
+            <a:avLst/>
+          </a:prstGeom>
+          <a:ln>
+            <a:tailEnd type="triangle"/>
+          </a:ln>
+        </p:spPr>
+        <p:style>
+          <a:lnRef idx="1">
+            <a:schemeClr val="dk1"/>
+          </a:lnRef>
+          <a:fillRef idx="0">
+            <a:schemeClr val="dk1"/>
+          </a:fillRef>
+          <a:effectRef idx="0">
+            <a:schemeClr val="dk1"/>
+          </a:effectRef>
+          <a:fontRef idx="minor">
+            <a:schemeClr val="tx1"/>
+          </a:fontRef>
+        </p:style>
+      </p:cxnSp>
+      <p:cxnSp>
+        <p:nvCxnSpPr>
+          <p:cNvPr id="19" name="Straight Arrow Connector 18"/>
+          <p:cNvCxnSpPr>
+            <a:endCxn id="17" idx="1"/>
+          </p:cNvCxnSpPr>
+          <p:nvPr/>
+        </p:nvCxnSpPr>
+        <p:spPr>
+          <a:xfrm>
+            <a:off x="6681989" y="5151550"/>
+            <a:ext cx="419995" cy="78691"/>
+          </a:xfrm>
+          <a:prstGeom prst="straightConnector1">
+            <a:avLst/>
+          </a:prstGeom>
+          <a:ln>
+            <a:tailEnd type="triangle"/>
+          </a:ln>
+        </p:spPr>
+        <p:style>
+          <a:lnRef idx="1">
+            <a:schemeClr val="dk1"/>
+          </a:lnRef>
+          <a:fillRef idx="0">
+            <a:schemeClr val="dk1"/>
+          </a:fillRef>
+          <a:effectRef idx="0">
+            <a:schemeClr val="dk1"/>
+          </a:effectRef>
+          <a:fontRef idx="minor">
+            <a:schemeClr val="tx1"/>
+          </a:fontRef>
+        </p:style>
+      </p:cxnSp>
+      <p:graphicFrame>
+        <p:nvGraphicFramePr>
+          <p:cNvPr id="20" name="Table 19"/>
+          <p:cNvGraphicFramePr>
+            <a:graphicFrameLocks noGrp="1"/>
+          </p:cNvGraphicFramePr>
+          <p:nvPr>
+            <p:extLst>
+              <p:ext uri="{D42A27DB-BD31-4B8C-83A1-F6EECF244321}">
+                <p14:modId xmlns:p14="http://schemas.microsoft.com/office/powerpoint/2010/main" val="1385862416"/>
+              </p:ext>
+            </p:extLst>
+          </p:nvPr>
+        </p:nvGraphicFramePr>
+        <p:xfrm>
+          <a:off x="7456868" y="5628068"/>
+          <a:ext cx="1555958" cy="370840"/>
+        </p:xfrm>
+        <a:graphic>
+          <a:graphicData uri="http://schemas.openxmlformats.org/drawingml/2006/table">
+            <a:tbl>
+              <a:tblPr>
+                <a:tableStyleId>{073A0DAA-6AF3-43AB-8588-CEC1D06C72B9}</a:tableStyleId>
+              </a:tblPr>
+              <a:tblGrid>
+                <a:gridCol w="777979"/>
+                <a:gridCol w="777979"/>
+              </a:tblGrid>
+              <a:tr h="370840">
+                <a:tc>
+                  <a:txBody>
+                    <a:bodyPr/>
+                    <a:lstStyle/>
+                    <a:p>
+                      <a:pPr algn="ctr"/>
+                      <a:r>
+                        <a:rPr lang="en-US" dirty="0" smtClean="0"/>
+                        <a:t>dog</a:t>
+                      </a:r>
+                      <a:endParaRPr lang="en-US" dirty="0"/>
+                    </a:p>
+                  </a:txBody>
+                  <a:tcPr>
+                    <a:lnL w="12700" cap="flat" cmpd="sng" algn="ctr">
+                      <a:solidFill>
+                        <a:schemeClr val="tx1"/>
+                      </a:solidFill>
+                      <a:prstDash val="solid"/>
+                      <a:round/>
+                      <a:headEnd type="none" w="med" len="med"/>
+                      <a:tailEnd type="none" w="med" len="med"/>
+                    </a:lnL>
+                    <a:lnR w="12700" cap="flat" cmpd="sng" algn="ctr">
+                      <a:solidFill>
+                        <a:schemeClr val="tx1"/>
+                      </a:solidFill>
+                      <a:prstDash val="solid"/>
+                      <a:round/>
+                      <a:headEnd type="none" w="med" len="med"/>
+                      <a:tailEnd type="none" w="med" len="med"/>
+                    </a:lnR>
+                    <a:lnT w="12700" cap="flat" cmpd="sng" algn="ctr">
+                      <a:solidFill>
+                        <a:schemeClr val="tx1"/>
+                      </a:solidFill>
+                      <a:prstDash val="solid"/>
+                      <a:round/>
+                      <a:headEnd type="none" w="med" len="med"/>
+                      <a:tailEnd type="none" w="med" len="med"/>
+                    </a:lnT>
+                    <a:lnB w="12700" cap="flat" cmpd="sng" algn="ctr">
+                      <a:solidFill>
+                        <a:schemeClr val="tx1"/>
+                      </a:solidFill>
+                      <a:prstDash val="solid"/>
+                      <a:round/>
+                      <a:headEnd type="none" w="med" len="med"/>
+                      <a:tailEnd type="none" w="med" len="med"/>
+                    </a:lnB>
+                    <a:noFill/>
+                  </a:tcPr>
+                </a:tc>
+                <a:tc>
+                  <a:txBody>
+                    <a:bodyPr/>
+                    <a:lstStyle/>
+                    <a:p>
+                      <a:pPr algn="ctr"/>
+                      <a:r>
+                        <a:rPr lang="en-US" dirty="0" smtClean="0"/>
+                        <a:t>doge</a:t>
+                      </a:r>
+                      <a:endParaRPr lang="en-US" dirty="0"/>
+                    </a:p>
+                  </a:txBody>
+                  <a:tcPr>
+                    <a:lnL w="12700" cap="flat" cmpd="sng" algn="ctr">
+                      <a:solidFill>
+                        <a:schemeClr val="tx1"/>
+                      </a:solidFill>
+                      <a:prstDash val="solid"/>
+                      <a:round/>
+                      <a:headEnd type="none" w="med" len="med"/>
+                      <a:tailEnd type="none" w="med" len="med"/>
+                    </a:lnL>
+                    <a:lnR w="12700" cap="flat" cmpd="sng" algn="ctr">
+                      <a:solidFill>
+                        <a:schemeClr val="tx1"/>
+                      </a:solidFill>
+                      <a:prstDash val="solid"/>
+                      <a:round/>
+                      <a:headEnd type="none" w="med" len="med"/>
+                      <a:tailEnd type="none" w="med" len="med"/>
+                    </a:lnR>
+                    <a:lnT w="12700" cap="flat" cmpd="sng" algn="ctr">
+                      <a:solidFill>
+                        <a:schemeClr val="tx1"/>
+                      </a:solidFill>
+                      <a:prstDash val="solid"/>
+                      <a:round/>
+                      <a:headEnd type="none" w="med" len="med"/>
+                      <a:tailEnd type="none" w="med" len="med"/>
+                    </a:lnT>
+                    <a:lnB w="12700" cap="flat" cmpd="sng" algn="ctr">
+                      <a:solidFill>
+                        <a:schemeClr val="tx1"/>
+                      </a:solidFill>
+                      <a:prstDash val="solid"/>
+                      <a:round/>
+                      <a:headEnd type="none" w="med" len="med"/>
+                      <a:tailEnd type="none" w="med" len="med"/>
+                    </a:lnB>
+                    <a:noFill/>
+                  </a:tcPr>
+                </a:tc>
+              </a:tr>
+            </a:tbl>
+          </a:graphicData>
+        </a:graphic>
+      </p:graphicFrame>
+      <p:cxnSp>
+        <p:nvCxnSpPr>
+          <p:cNvPr id="21" name="Straight Arrow Connector 20"/>
+          <p:cNvCxnSpPr/>
+          <p:nvPr/>
+        </p:nvCxnSpPr>
+        <p:spPr>
+          <a:xfrm>
+            <a:off x="7456868" y="5396249"/>
+            <a:ext cx="64394" cy="231819"/>
+          </a:xfrm>
+          <a:prstGeom prst="straightConnector1">
+            <a:avLst/>
+          </a:prstGeom>
+          <a:ln>
+            <a:tailEnd type="triangle"/>
+          </a:ln>
+        </p:spPr>
+        <p:style>
+          <a:lnRef idx="1">
+            <a:schemeClr val="dk1"/>
+          </a:lnRef>
+          <a:fillRef idx="0">
+            <a:schemeClr val="dk1"/>
+          </a:fillRef>
+          <a:effectRef idx="0">
+            <a:schemeClr val="dk1"/>
+          </a:effectRef>
+          <a:fontRef idx="minor">
+            <a:schemeClr val="tx1"/>
+          </a:fontRef>
+        </p:style>
+      </p:cxnSp>
+      <p:graphicFrame>
+        <p:nvGraphicFramePr>
+          <p:cNvPr id="25" name="Table 24"/>
+          <p:cNvGraphicFramePr>
+            <a:graphicFrameLocks noGrp="1"/>
+          </p:cNvGraphicFramePr>
+          <p:nvPr>
+            <p:extLst>
+              <p:ext uri="{D42A27DB-BD31-4B8C-83A1-F6EECF244321}">
+                <p14:modId xmlns:p14="http://schemas.microsoft.com/office/powerpoint/2010/main" val="418561056"/>
+              </p:ext>
+            </p:extLst>
+          </p:nvPr>
+        </p:nvGraphicFramePr>
+        <p:xfrm>
+          <a:off x="9360795" y="5628068"/>
+          <a:ext cx="1555958" cy="370840"/>
+        </p:xfrm>
+        <a:graphic>
+          <a:graphicData uri="http://schemas.openxmlformats.org/drawingml/2006/table">
+            <a:tbl>
+              <a:tblPr>
+                <a:tableStyleId>{073A0DAA-6AF3-43AB-8588-CEC1D06C72B9}</a:tableStyleId>
+              </a:tblPr>
+              <a:tblGrid>
+                <a:gridCol w="777979"/>
+                <a:gridCol w="777979"/>
+              </a:tblGrid>
+              <a:tr h="370840">
+                <a:tc>
+                  <a:txBody>
+                    <a:bodyPr/>
+                    <a:lstStyle/>
+                    <a:p>
+                      <a:pPr algn="ctr"/>
+                      <a:r>
+                        <a:rPr lang="en-US" dirty="0" smtClean="0"/>
+                        <a:t>log</a:t>
+                      </a:r>
+                      <a:endParaRPr lang="en-US" dirty="0"/>
+                    </a:p>
+                  </a:txBody>
+                  <a:tcPr>
+                    <a:lnL w="12700" cap="flat" cmpd="sng" algn="ctr">
+                      <a:solidFill>
+                        <a:schemeClr val="tx1"/>
+                      </a:solidFill>
+                      <a:prstDash val="solid"/>
+                      <a:round/>
+                      <a:headEnd type="none" w="med" len="med"/>
+                      <a:tailEnd type="none" w="med" len="med"/>
+                    </a:lnL>
+                    <a:lnR w="12700" cap="flat" cmpd="sng" algn="ctr">
+                      <a:solidFill>
+                        <a:schemeClr val="tx1"/>
+                      </a:solidFill>
+                      <a:prstDash val="solid"/>
+                      <a:round/>
+                      <a:headEnd type="none" w="med" len="med"/>
+                      <a:tailEnd type="none" w="med" len="med"/>
+                    </a:lnR>
+                    <a:lnT w="12700" cap="flat" cmpd="sng" algn="ctr">
+                      <a:solidFill>
+                        <a:schemeClr val="tx1"/>
+                      </a:solidFill>
+                      <a:prstDash val="solid"/>
+                      <a:round/>
+                      <a:headEnd type="none" w="med" len="med"/>
+                      <a:tailEnd type="none" w="med" len="med"/>
+                    </a:lnT>
+                    <a:lnB w="12700" cap="flat" cmpd="sng" algn="ctr">
+                      <a:solidFill>
+                        <a:schemeClr val="tx1"/>
+                      </a:solidFill>
+                      <a:prstDash val="solid"/>
+                      <a:round/>
+                      <a:headEnd type="none" w="med" len="med"/>
+                      <a:tailEnd type="none" w="med" len="med"/>
+                    </a:lnB>
+                    <a:noFill/>
+                  </a:tcPr>
+                </a:tc>
+                <a:tc>
+                  <a:txBody>
+                    <a:bodyPr/>
+                    <a:lstStyle/>
+                    <a:p>
+                      <a:pPr algn="ctr"/>
+                      <a:r>
+                        <a:rPr lang="en-US" dirty="0" smtClean="0"/>
+                        <a:t>loge</a:t>
+                      </a:r>
+                      <a:endParaRPr lang="en-US" dirty="0"/>
+                    </a:p>
+                  </a:txBody>
+                  <a:tcPr>
+                    <a:lnL w="12700" cap="flat" cmpd="sng" algn="ctr">
+                      <a:solidFill>
+                        <a:schemeClr val="tx1"/>
+                      </a:solidFill>
+                      <a:prstDash val="solid"/>
+                      <a:round/>
+                      <a:headEnd type="none" w="med" len="med"/>
+                      <a:tailEnd type="none" w="med" len="med"/>
+                    </a:lnL>
+                    <a:lnR w="12700" cap="flat" cmpd="sng" algn="ctr">
+                      <a:solidFill>
+                        <a:schemeClr val="tx1"/>
+                      </a:solidFill>
+                      <a:prstDash val="solid"/>
+                      <a:round/>
+                      <a:headEnd type="none" w="med" len="med"/>
+                      <a:tailEnd type="none" w="med" len="med"/>
+                    </a:lnR>
+                    <a:lnT w="12700" cap="flat" cmpd="sng" algn="ctr">
+                      <a:solidFill>
+                        <a:schemeClr val="tx1"/>
+                      </a:solidFill>
+                      <a:prstDash val="solid"/>
+                      <a:round/>
+                      <a:headEnd type="none" w="med" len="med"/>
+                      <a:tailEnd type="none" w="med" len="med"/>
+                    </a:lnT>
+                    <a:lnB w="12700" cap="flat" cmpd="sng" algn="ctr">
+                      <a:solidFill>
+                        <a:schemeClr val="tx1"/>
+                      </a:solidFill>
+                      <a:prstDash val="solid"/>
+                      <a:round/>
+                      <a:headEnd type="none" w="med" len="med"/>
+                      <a:tailEnd type="none" w="med" len="med"/>
+                    </a:lnB>
+                    <a:noFill/>
+                  </a:tcPr>
+                </a:tc>
+              </a:tr>
+            </a:tbl>
+          </a:graphicData>
+        </a:graphic>
+      </p:graphicFrame>
+      <p:cxnSp>
+        <p:nvCxnSpPr>
+          <p:cNvPr id="26" name="Straight Arrow Connector 25"/>
+          <p:cNvCxnSpPr/>
+          <p:nvPr/>
+        </p:nvCxnSpPr>
+        <p:spPr>
+          <a:xfrm>
+            <a:off x="8397025" y="5396249"/>
+            <a:ext cx="1028164" cy="231819"/>
+          </a:xfrm>
+          <a:prstGeom prst="straightConnector1">
+            <a:avLst/>
+          </a:prstGeom>
+          <a:ln>
+            <a:tailEnd type="triangle"/>
+          </a:ln>
+        </p:spPr>
+        <p:style>
+          <a:lnRef idx="1">
+            <a:schemeClr val="dk1"/>
+          </a:lnRef>
+          <a:fillRef idx="0">
+            <a:schemeClr val="dk1"/>
+          </a:fillRef>
+          <a:effectRef idx="0">
+            <a:schemeClr val="dk1"/>
+          </a:effectRef>
+          <a:fontRef idx="minor">
+            <a:schemeClr val="tx1"/>
+          </a:fontRef>
+        </p:style>
+      </p:cxnSp>
     </p:spTree>
     <p:extLst>
       <p:ext uri="{BB962C8B-B14F-4D97-AF65-F5344CB8AC3E}">
-        <p14:creationId xmlns:p14="http://schemas.microsoft.com/office/powerpoint/2010/main" val="661005115"/>
+        <p14:creationId xmlns:p14="http://schemas.microsoft.com/office/powerpoint/2010/main" val="2797137805"/>
       </p:ext>
     </p:extLst>
   </p:cSld>
@@ -3811,7 +6964,7 @@
           <a:p>
             <a:r>
               <a:rPr lang="en-US" dirty="0" smtClean="0"/>
-              <a:t>Testing and Evaluation</a:t>
+              <a:t>Problems with Inverted List</a:t>
             </a:r>
             <a:endParaRPr lang="en-US" dirty="0"/>
           </a:p>
@@ -3832,14 +6985,41 @@
           <a:bodyPr/>
           <a:lstStyle/>
           <a:p>
-            <a:endParaRPr lang="en-US"/>
+            <a:r>
+              <a:rPr lang="en-US" dirty="0" smtClean="0"/>
+              <a:t>Still requires difference matrix computation</a:t>
+            </a:r>
+          </a:p>
+          <a:p>
+            <a:endParaRPr lang="en-US" dirty="0"/>
+          </a:p>
+          <a:p>
+            <a:r>
+              <a:rPr lang="en-US" dirty="0" smtClean="0"/>
+              <a:t>Must enforce minimum query length to be useful, but minimum length is dependent </a:t>
+            </a:r>
+            <a:r>
+              <a:rPr lang="en-US" smtClean="0"/>
+              <a:t>upon data set</a:t>
+            </a:r>
+            <a:endParaRPr lang="en-US" dirty="0" smtClean="0"/>
+          </a:p>
+          <a:p>
+            <a:endParaRPr lang="en-US" dirty="0"/>
+          </a:p>
+          <a:p>
+            <a:r>
+              <a:rPr lang="en-US" dirty="0" smtClean="0"/>
+              <a:t>Most often will not be balanced!</a:t>
+            </a:r>
+            <a:endParaRPr lang="en-US" dirty="0"/>
           </a:p>
         </p:txBody>
       </p:sp>
     </p:spTree>
     <p:extLst>
       <p:ext uri="{BB962C8B-B14F-4D97-AF65-F5344CB8AC3E}">
-        <p14:creationId xmlns:p14="http://schemas.microsoft.com/office/powerpoint/2010/main" val="2981725681"/>
+        <p14:creationId xmlns:p14="http://schemas.microsoft.com/office/powerpoint/2010/main" val="2822259906"/>
       </p:ext>
     </p:extLst>
   </p:cSld>
@@ -3883,7 +7063,7 @@
           <a:p>
             <a:r>
               <a:rPr lang="en-US" dirty="0" smtClean="0"/>
-              <a:t>Results</a:t>
+              <a:t>Experimental Setup</a:t>
             </a:r>
             <a:endParaRPr lang="en-US" dirty="0"/>
           </a:p>
@@ -3904,7 +7084,232 @@
           <a:bodyPr/>
           <a:lstStyle/>
           <a:p>
-            <a:endParaRPr lang="en-US"/>
+            <a:pPr marL="0" indent="0">
+              <a:buNone/>
+            </a:pPr>
+            <a:r>
+              <a:rPr lang="en-US" dirty="0" smtClean="0"/>
+              <a:t>Data Sets: </a:t>
+            </a:r>
+          </a:p>
+          <a:p>
+            <a:pPr marL="0" indent="0">
+              <a:buNone/>
+            </a:pPr>
+            <a:r>
+              <a:rPr lang="en-US" dirty="0"/>
+              <a:t>	</a:t>
+            </a:r>
+            <a:r>
+              <a:rPr lang="en-US" dirty="0" smtClean="0"/>
+              <a:t>S1: Subset of IMDB movie titles — 55,000 entries</a:t>
+            </a:r>
+          </a:p>
+          <a:p>
+            <a:pPr marL="0" indent="0">
+              <a:buNone/>
+            </a:pPr>
+            <a:r>
+              <a:rPr lang="en-US" dirty="0"/>
+              <a:t>	</a:t>
+            </a:r>
+            <a:r>
+              <a:rPr lang="en-US" dirty="0" smtClean="0"/>
+              <a:t>S2: Subset of DBLP movie titles — 2.5 million entries</a:t>
+            </a:r>
+          </a:p>
+          <a:p>
+            <a:endParaRPr lang="en-US" dirty="0"/>
+          </a:p>
+          <a:p>
+            <a:r>
+              <a:rPr lang="en-US" dirty="0" smtClean="0"/>
+              <a:t>Testing run on Dell Latitude, i7 quad-core processor at 2.20GHz, 8 GB RAM</a:t>
+            </a:r>
+          </a:p>
+          <a:p>
+            <a:endParaRPr lang="en-US" dirty="0"/>
+          </a:p>
+          <a:p>
+            <a:endParaRPr lang="en-US" dirty="0"/>
+          </a:p>
+        </p:txBody>
+      </p:sp>
+    </p:spTree>
+    <p:extLst>
+      <p:ext uri="{BB962C8B-B14F-4D97-AF65-F5344CB8AC3E}">
+        <p14:creationId xmlns:p14="http://schemas.microsoft.com/office/powerpoint/2010/main" val="661005115"/>
+      </p:ext>
+    </p:extLst>
+  </p:cSld>
+  <p:clrMapOvr>
+    <a:masterClrMapping/>
+  </p:clrMapOvr>
+</p:sld>
+</file>
+
+<file path=ppt/slides/slide16.xml><?xml version="1.0" encoding="utf-8"?>
+<p:sld xmlns:a="http://schemas.openxmlformats.org/drawingml/2006/main" xmlns:r="http://schemas.openxmlformats.org/officeDocument/2006/relationships" xmlns:p="http://schemas.openxmlformats.org/presentationml/2006/main">
+  <p:cSld>
+    <p:spTree>
+      <p:nvGrpSpPr>
+        <p:cNvPr id="1" name=""/>
+        <p:cNvGrpSpPr/>
+        <p:nvPr/>
+      </p:nvGrpSpPr>
+      <p:grpSpPr>
+        <a:xfrm>
+          <a:off x="0" y="0"/>
+          <a:ext cx="0" cy="0"/>
+          <a:chOff x="0" y="0"/>
+          <a:chExt cx="0" cy="0"/>
+        </a:xfrm>
+      </p:grpSpPr>
+      <p:sp>
+        <p:nvSpPr>
+          <p:cNvPr id="2" name="Title 1"/>
+          <p:cNvSpPr>
+            <a:spLocks noGrp="1"/>
+          </p:cNvSpPr>
+          <p:nvPr>
+            <p:ph type="title"/>
+          </p:nvPr>
+        </p:nvSpPr>
+        <p:spPr/>
+        <p:txBody>
+          <a:bodyPr/>
+          <a:lstStyle/>
+          <a:p>
+            <a:r>
+              <a:rPr lang="en-US" dirty="0" smtClean="0"/>
+              <a:t>Preprocessing</a:t>
+            </a:r>
+            <a:endParaRPr lang="en-US" dirty="0"/>
+          </a:p>
+        </p:txBody>
+      </p:sp>
+      <p:sp>
+        <p:nvSpPr>
+          <p:cNvPr id="3" name="Content Placeholder 2"/>
+          <p:cNvSpPr>
+            <a:spLocks noGrp="1"/>
+          </p:cNvSpPr>
+          <p:nvPr>
+            <p:ph idx="1"/>
+          </p:nvPr>
+        </p:nvSpPr>
+        <p:spPr/>
+        <p:txBody>
+          <a:bodyPr/>
+          <a:lstStyle/>
+          <a:p>
+            <a:r>
+              <a:rPr lang="en-US" dirty="0" smtClean="0"/>
+              <a:t>S1 and S2 were cleansed to remove any non-ASCII entries (</a:t>
+            </a:r>
+            <a:r>
+              <a:rPr lang="en-US" dirty="0" err="1" smtClean="0"/>
+              <a:t>i.e</a:t>
+            </a:r>
+            <a:r>
+              <a:rPr lang="en-US" dirty="0" smtClean="0"/>
+              <a:t>, any string with a character outside of the [0,127] ASCII table)</a:t>
+            </a:r>
+          </a:p>
+          <a:p>
+            <a:endParaRPr lang="en-US" dirty="0"/>
+          </a:p>
+          <a:p>
+            <a:r>
+              <a:rPr lang="en-US" dirty="0" smtClean="0"/>
+              <a:t>Distance matrix for S1, S2 computed</a:t>
+            </a:r>
+          </a:p>
+          <a:p>
+            <a:pPr lvl="1"/>
+            <a:r>
+              <a:rPr lang="en-US" dirty="0" smtClean="0"/>
+              <a:t>S1 took approx. 2.5 hours to compute, 3.8 GB in size</a:t>
+            </a:r>
+          </a:p>
+          <a:p>
+            <a:pPr lvl="1"/>
+            <a:r>
+              <a:rPr lang="en-US" dirty="0" smtClean="0"/>
+              <a:t>S2 took approx. 10 hours to compute up to .5 million entries, ~7 GB in size</a:t>
+            </a:r>
+          </a:p>
+        </p:txBody>
+      </p:sp>
+    </p:spTree>
+    <p:extLst>
+      <p:ext uri="{BB962C8B-B14F-4D97-AF65-F5344CB8AC3E}">
+        <p14:creationId xmlns:p14="http://schemas.microsoft.com/office/powerpoint/2010/main" val="2981725681"/>
+      </p:ext>
+    </p:extLst>
+  </p:cSld>
+  <p:clrMapOvr>
+    <a:masterClrMapping/>
+  </p:clrMapOvr>
+</p:sld>
+</file>
+
+<file path=ppt/slides/slide17.xml><?xml version="1.0" encoding="utf-8"?>
+<p:sld xmlns:a="http://schemas.openxmlformats.org/drawingml/2006/main" xmlns:r="http://schemas.openxmlformats.org/officeDocument/2006/relationships" xmlns:p="http://schemas.openxmlformats.org/presentationml/2006/main">
+  <p:cSld>
+    <p:spTree>
+      <p:nvGrpSpPr>
+        <p:cNvPr id="1" name=""/>
+        <p:cNvGrpSpPr/>
+        <p:nvPr/>
+      </p:nvGrpSpPr>
+      <p:grpSpPr>
+        <a:xfrm>
+          <a:off x="0" y="0"/>
+          <a:ext cx="0" cy="0"/>
+          <a:chOff x="0" y="0"/>
+          <a:chExt cx="0" cy="0"/>
+        </a:xfrm>
+      </p:grpSpPr>
+      <p:sp>
+        <p:nvSpPr>
+          <p:cNvPr id="2" name="Title 1"/>
+          <p:cNvSpPr>
+            <a:spLocks noGrp="1"/>
+          </p:cNvSpPr>
+          <p:nvPr>
+            <p:ph type="title"/>
+          </p:nvPr>
+        </p:nvSpPr>
+        <p:spPr/>
+        <p:txBody>
+          <a:bodyPr/>
+          <a:lstStyle/>
+          <a:p>
+            <a:r>
+              <a:rPr lang="en-US" dirty="0" smtClean="0"/>
+              <a:t>Results</a:t>
+            </a:r>
+            <a:endParaRPr lang="en-US" dirty="0"/>
+          </a:p>
+        </p:txBody>
+      </p:sp>
+      <p:sp>
+        <p:nvSpPr>
+          <p:cNvPr id="3" name="Content Placeholder 2"/>
+          <p:cNvSpPr>
+            <a:spLocks noGrp="1"/>
+          </p:cNvSpPr>
+          <p:nvPr>
+            <p:ph idx="1"/>
+          </p:nvPr>
+        </p:nvSpPr>
+        <p:spPr/>
+        <p:txBody>
+          <a:bodyPr/>
+          <a:lstStyle/>
+          <a:p>
+            <a:endParaRPr lang="en-US" dirty="0"/>
           </a:p>
         </p:txBody>
       </p:sp>
@@ -3921,7 +7326,7 @@
 </p:sld>
 </file>
 
-<file path=ppt/slides/slide16.xml><?xml version="1.0" encoding="utf-8"?>
+<file path=ppt/slides/slide18.xml><?xml version="1.0" encoding="utf-8"?>
 <p:sld xmlns:a="http://schemas.openxmlformats.org/drawingml/2006/main" xmlns:r="http://schemas.openxmlformats.org/officeDocument/2006/relationships" xmlns:p="http://schemas.openxmlformats.org/presentationml/2006/main">
   <p:cSld>
     <p:spTree>
@@ -4037,7 +7442,7 @@
 </p:sld>
 </file>
 
-<file path=ppt/slides/slide17.xml><?xml version="1.0" encoding="utf-8"?>
+<file path=ppt/slides/slide19.xml><?xml version="1.0" encoding="utf-8"?>
 <p:sld xmlns:a="http://schemas.openxmlformats.org/drawingml/2006/main" xmlns:r="http://schemas.openxmlformats.org/officeDocument/2006/relationships" xmlns:p="http://schemas.openxmlformats.org/presentationml/2006/main">
   <p:cSld>
     <p:spTree>
@@ -4149,164 +7554,6 @@
 </p:sld>
 </file>
 
-<file path=ppt/slides/slide18.xml><?xml version="1.0" encoding="utf-8"?>
-<p:sld xmlns:a="http://schemas.openxmlformats.org/drawingml/2006/main" xmlns:r="http://schemas.openxmlformats.org/officeDocument/2006/relationships" xmlns:p="http://schemas.openxmlformats.org/presentationml/2006/main">
-  <p:cSld>
-    <p:spTree>
-      <p:nvGrpSpPr>
-        <p:cNvPr id="1" name=""/>
-        <p:cNvGrpSpPr/>
-        <p:nvPr/>
-      </p:nvGrpSpPr>
-      <p:grpSpPr>
-        <a:xfrm>
-          <a:off x="0" y="0"/>
-          <a:ext cx="0" cy="0"/>
-          <a:chOff x="0" y="0"/>
-          <a:chExt cx="0" cy="0"/>
-        </a:xfrm>
-      </p:grpSpPr>
-      <p:sp>
-        <p:nvSpPr>
-          <p:cNvPr id="2" name="Title 1"/>
-          <p:cNvSpPr>
-            <a:spLocks noGrp="1"/>
-          </p:cNvSpPr>
-          <p:nvPr>
-            <p:ph type="title"/>
-          </p:nvPr>
-        </p:nvSpPr>
-        <p:spPr/>
-        <p:txBody>
-          <a:bodyPr/>
-          <a:lstStyle/>
-          <a:p>
-            <a:r>
-              <a:rPr lang="en-US" dirty="0" smtClean="0"/>
-              <a:t>Something about pruning with </a:t>
-            </a:r>
-            <a:r>
-              <a:rPr lang="en-US" dirty="0" err="1" smtClean="0"/>
-              <a:t>InvertedList</a:t>
-            </a:r>
-            <a:endParaRPr lang="en-US" dirty="0"/>
-          </a:p>
-        </p:txBody>
-      </p:sp>
-      <p:sp>
-        <p:nvSpPr>
-          <p:cNvPr id="3" name="Content Placeholder 2"/>
-          <p:cNvSpPr>
-            <a:spLocks noGrp="1"/>
-          </p:cNvSpPr>
-          <p:nvPr>
-            <p:ph idx="1"/>
-          </p:nvPr>
-        </p:nvSpPr>
-        <p:spPr/>
-        <p:txBody>
-          <a:bodyPr/>
-          <a:lstStyle/>
-          <a:p>
-            <a:endParaRPr lang="en-US"/>
-          </a:p>
-        </p:txBody>
-      </p:sp>
-    </p:spTree>
-    <p:extLst>
-      <p:ext uri="{BB962C8B-B14F-4D97-AF65-F5344CB8AC3E}">
-        <p14:creationId xmlns:p14="http://schemas.microsoft.com/office/powerpoint/2010/main" val="2895239191"/>
-      </p:ext>
-    </p:extLst>
-  </p:cSld>
-  <p:clrMapOvr>
-    <a:masterClrMapping/>
-  </p:clrMapOvr>
-</p:sld>
-</file>
-
-<file path=ppt/slides/slide19.xml><?xml version="1.0" encoding="utf-8"?>
-<p:sld xmlns:a="http://schemas.openxmlformats.org/drawingml/2006/main" xmlns:r="http://schemas.openxmlformats.org/officeDocument/2006/relationships" xmlns:p="http://schemas.openxmlformats.org/presentationml/2006/main">
-  <p:cSld>
-    <p:spTree>
-      <p:nvGrpSpPr>
-        <p:cNvPr id="1" name=""/>
-        <p:cNvGrpSpPr/>
-        <p:nvPr/>
-      </p:nvGrpSpPr>
-      <p:grpSpPr>
-        <a:xfrm>
-          <a:off x="0" y="0"/>
-          <a:ext cx="0" cy="0"/>
-          <a:chOff x="0" y="0"/>
-          <a:chExt cx="0" cy="0"/>
-        </a:xfrm>
-      </p:grpSpPr>
-      <p:sp>
-        <p:nvSpPr>
-          <p:cNvPr id="2" name="Title 1"/>
-          <p:cNvSpPr>
-            <a:spLocks noGrp="1"/>
-          </p:cNvSpPr>
-          <p:nvPr>
-            <p:ph type="title"/>
-          </p:nvPr>
-        </p:nvSpPr>
-        <p:spPr/>
-        <p:txBody>
-          <a:bodyPr/>
-          <a:lstStyle/>
-          <a:p>
-            <a:r>
-              <a:rPr lang="en-US" dirty="0" smtClean="0"/>
-              <a:t>Conclusion</a:t>
-            </a:r>
-            <a:endParaRPr lang="en-US" dirty="0"/>
-          </a:p>
-        </p:txBody>
-      </p:sp>
-      <p:sp>
-        <p:nvSpPr>
-          <p:cNvPr id="3" name="Content Placeholder 2"/>
-          <p:cNvSpPr>
-            <a:spLocks noGrp="1"/>
-          </p:cNvSpPr>
-          <p:nvPr>
-            <p:ph idx="1"/>
-          </p:nvPr>
-        </p:nvSpPr>
-        <p:spPr/>
-        <p:txBody>
-          <a:bodyPr/>
-          <a:lstStyle/>
-          <a:p>
-            <a:r>
-              <a:rPr lang="en-US" dirty="0" smtClean="0"/>
-              <a:t>Clustering would probably be great, if it were less computationally expensive</a:t>
-            </a:r>
-          </a:p>
-          <a:p>
-            <a:r>
-              <a:rPr lang="en-US" dirty="0" smtClean="0"/>
-              <a:t>Inverted Lists are also great, but constructing based on LCS is very expensive</a:t>
-            </a:r>
-            <a:endParaRPr lang="en-US" dirty="0"/>
-          </a:p>
-        </p:txBody>
-      </p:sp>
-    </p:spTree>
-    <p:extLst>
-      <p:ext uri="{BB962C8B-B14F-4D97-AF65-F5344CB8AC3E}">
-        <p14:creationId xmlns:p14="http://schemas.microsoft.com/office/powerpoint/2010/main" val="1057073621"/>
-      </p:ext>
-    </p:extLst>
-  </p:cSld>
-  <p:clrMapOvr>
-    <a:masterClrMapping/>
-  </p:clrMapOvr>
-</p:sld>
-</file>
-
 <file path=ppt/slides/slide2.xml><?xml version="1.0" encoding="utf-8"?>
 <p:sld xmlns:a="http://schemas.openxmlformats.org/drawingml/2006/main" xmlns:r="http://schemas.openxmlformats.org/officeDocument/2006/relationships" xmlns:p="http://schemas.openxmlformats.org/presentationml/2006/main">
   <p:cSld>
@@ -4397,6 +7644,178 @@
     <p:extLst>
       <p:ext uri="{BB962C8B-B14F-4D97-AF65-F5344CB8AC3E}">
         <p14:creationId xmlns:p14="http://schemas.microsoft.com/office/powerpoint/2010/main" val="2147642121"/>
+      </p:ext>
+    </p:extLst>
+  </p:cSld>
+  <p:clrMapOvr>
+    <a:masterClrMapping/>
+  </p:clrMapOvr>
+</p:sld>
+</file>
+
+<file path=ppt/slides/slide20.xml><?xml version="1.0" encoding="utf-8"?>
+<p:sld xmlns:a="http://schemas.openxmlformats.org/drawingml/2006/main" xmlns:r="http://schemas.openxmlformats.org/officeDocument/2006/relationships" xmlns:p="http://schemas.openxmlformats.org/presentationml/2006/main">
+  <p:cSld>
+    <p:spTree>
+      <p:nvGrpSpPr>
+        <p:cNvPr id="1" name=""/>
+        <p:cNvGrpSpPr/>
+        <p:nvPr/>
+      </p:nvGrpSpPr>
+      <p:grpSpPr>
+        <a:xfrm>
+          <a:off x="0" y="0"/>
+          <a:ext cx="0" cy="0"/>
+          <a:chOff x="0" y="0"/>
+          <a:chExt cx="0" cy="0"/>
+        </a:xfrm>
+      </p:grpSpPr>
+      <p:sp>
+        <p:nvSpPr>
+          <p:cNvPr id="2" name="Title 1"/>
+          <p:cNvSpPr>
+            <a:spLocks noGrp="1"/>
+          </p:cNvSpPr>
+          <p:nvPr>
+            <p:ph type="title"/>
+          </p:nvPr>
+        </p:nvSpPr>
+        <p:spPr/>
+        <p:txBody>
+          <a:bodyPr/>
+          <a:lstStyle/>
+          <a:p>
+            <a:r>
+              <a:rPr lang="en-US" dirty="0" smtClean="0"/>
+              <a:t>Something about pruning with </a:t>
+            </a:r>
+            <a:r>
+              <a:rPr lang="en-US" dirty="0" err="1" smtClean="0"/>
+              <a:t>InvertedList</a:t>
+            </a:r>
+            <a:endParaRPr lang="en-US" dirty="0"/>
+          </a:p>
+        </p:txBody>
+      </p:sp>
+      <p:sp>
+        <p:nvSpPr>
+          <p:cNvPr id="3" name="Content Placeholder 2"/>
+          <p:cNvSpPr>
+            <a:spLocks noGrp="1"/>
+          </p:cNvSpPr>
+          <p:nvPr>
+            <p:ph idx="1"/>
+          </p:nvPr>
+        </p:nvSpPr>
+        <p:spPr/>
+        <p:txBody>
+          <a:bodyPr/>
+          <a:lstStyle/>
+          <a:p>
+            <a:endParaRPr lang="en-US"/>
+          </a:p>
+        </p:txBody>
+      </p:sp>
+    </p:spTree>
+    <p:extLst>
+      <p:ext uri="{BB962C8B-B14F-4D97-AF65-F5344CB8AC3E}">
+        <p14:creationId xmlns:p14="http://schemas.microsoft.com/office/powerpoint/2010/main" val="2895239191"/>
+      </p:ext>
+    </p:extLst>
+  </p:cSld>
+  <p:clrMapOvr>
+    <a:masterClrMapping/>
+  </p:clrMapOvr>
+</p:sld>
+</file>
+
+<file path=ppt/slides/slide21.xml><?xml version="1.0" encoding="utf-8"?>
+<p:sld xmlns:a="http://schemas.openxmlformats.org/drawingml/2006/main" xmlns:r="http://schemas.openxmlformats.org/officeDocument/2006/relationships" xmlns:p="http://schemas.openxmlformats.org/presentationml/2006/main">
+  <p:cSld>
+    <p:spTree>
+      <p:nvGrpSpPr>
+        <p:cNvPr id="1" name=""/>
+        <p:cNvGrpSpPr/>
+        <p:nvPr/>
+      </p:nvGrpSpPr>
+      <p:grpSpPr>
+        <a:xfrm>
+          <a:off x="0" y="0"/>
+          <a:ext cx="0" cy="0"/>
+          <a:chOff x="0" y="0"/>
+          <a:chExt cx="0" cy="0"/>
+        </a:xfrm>
+      </p:grpSpPr>
+      <p:sp>
+        <p:nvSpPr>
+          <p:cNvPr id="2" name="Title 1"/>
+          <p:cNvSpPr>
+            <a:spLocks noGrp="1"/>
+          </p:cNvSpPr>
+          <p:nvPr>
+            <p:ph type="title"/>
+          </p:nvPr>
+        </p:nvSpPr>
+        <p:spPr/>
+        <p:txBody>
+          <a:bodyPr/>
+          <a:lstStyle/>
+          <a:p>
+            <a:r>
+              <a:rPr lang="en-US" dirty="0" smtClean="0"/>
+              <a:t>Conclusion</a:t>
+            </a:r>
+            <a:endParaRPr lang="en-US" dirty="0"/>
+          </a:p>
+        </p:txBody>
+      </p:sp>
+      <p:sp>
+        <p:nvSpPr>
+          <p:cNvPr id="3" name="Content Placeholder 2"/>
+          <p:cNvSpPr>
+            <a:spLocks noGrp="1"/>
+          </p:cNvSpPr>
+          <p:nvPr>
+            <p:ph idx="1"/>
+          </p:nvPr>
+        </p:nvSpPr>
+        <p:spPr/>
+        <p:txBody>
+          <a:bodyPr/>
+          <a:lstStyle/>
+          <a:p>
+            <a:r>
+              <a:rPr lang="en-US" dirty="0" smtClean="0"/>
+              <a:t>Clustering would probably be great, if it were less computationally expensive</a:t>
+            </a:r>
+          </a:p>
+          <a:p>
+            <a:r>
+              <a:rPr lang="en-US" dirty="0" smtClean="0"/>
+              <a:t>Inverted Lists are also great, but constructing based on LCS is very </a:t>
+            </a:r>
+            <a:r>
+              <a:rPr lang="en-US" dirty="0" smtClean="0"/>
+              <a:t>expensive</a:t>
+            </a:r>
+          </a:p>
+          <a:p>
+            <a:r>
+              <a:rPr lang="en-US" dirty="0" smtClean="0"/>
+              <a:t>Running time cost of Inverted List could be reduced by sorting the data set according to LCS and storing memory pointers in the form </a:t>
+            </a:r>
+            <a:r>
+              <a:rPr lang="en-US" i="1" dirty="0" smtClean="0"/>
+              <a:t>[start, end]</a:t>
+            </a:r>
+            <a:endParaRPr lang="en-US" dirty="0"/>
+          </a:p>
+        </p:txBody>
+      </p:sp>
+    </p:spTree>
+    <p:extLst>
+      <p:ext uri="{BB962C8B-B14F-4D97-AF65-F5344CB8AC3E}">
+        <p14:creationId xmlns:p14="http://schemas.microsoft.com/office/powerpoint/2010/main" val="1057073621"/>
       </p:ext>
     </p:extLst>
   </p:cSld>
@@ -4489,8 +7908,21 @@
           <a:p>
             <a:r>
               <a:rPr lang="en-US" dirty="0" smtClean="0"/>
-              <a:t>Could be useful for situations with low amounts of memory, but it takes a long ass time to make</a:t>
-            </a:r>
+              <a:t>Could be useful for situations with low amounts of </a:t>
+            </a:r>
+            <a:r>
+              <a:rPr lang="en-US" dirty="0" smtClean="0"/>
+              <a:t>memory, </a:t>
+            </a:r>
+            <a:r>
+              <a:rPr lang="en-US" dirty="0" smtClean="0"/>
+              <a:t>but </a:t>
+            </a:r>
+            <a:r>
+              <a:rPr lang="en-US" dirty="0" smtClean="0"/>
+              <a:t>it’s computationally expensive to prepare</a:t>
+            </a:r>
+            <a:endParaRPr lang="en-US" dirty="0" smtClean="0"/>
           </a:p>
           <a:p>
             <a:endParaRPr lang="en-US" dirty="0"/>
@@ -5082,10 +8514,92 @@
         </p:nvSpPr>
         <p:spPr/>
         <p:txBody>
-          <a:bodyPr/>
+          <a:bodyPr>
+            <a:normAutofit/>
+          </a:bodyPr>
           <a:lstStyle/>
           <a:p>
-            <a:endParaRPr lang="en-US"/>
+            <a:r>
+              <a:rPr lang="en-US" dirty="0" smtClean="0"/>
+              <a:t>Data </a:t>
+            </a:r>
+            <a:r>
+              <a:rPr lang="en-US" dirty="0"/>
+              <a:t>clustering </a:t>
+            </a:r>
+            <a:r>
+              <a:rPr lang="en-US" dirty="0" smtClean="0"/>
+              <a:t>involves grouping a data set </a:t>
+            </a:r>
+            <a:r>
+              <a:rPr lang="en-US" dirty="0"/>
+              <a:t>based on </a:t>
+            </a:r>
+            <a:r>
+              <a:rPr lang="en-US" dirty="0" smtClean="0"/>
+              <a:t>similarity </a:t>
+            </a:r>
+            <a:r>
+              <a:rPr lang="en-US" dirty="0"/>
+              <a:t>of </a:t>
+            </a:r>
+            <a:r>
+              <a:rPr lang="en-US" dirty="0" smtClean="0"/>
+              <a:t>attributes</a:t>
+            </a:r>
+            <a:endParaRPr lang="en-US" dirty="0"/>
+          </a:p>
+          <a:p>
+            <a:pPr marL="0" indent="0">
+              <a:buNone/>
+            </a:pPr>
+            <a:endParaRPr lang="en-US" dirty="0" smtClean="0"/>
+          </a:p>
+          <a:p>
+            <a:pPr marL="0" indent="0">
+              <a:buNone/>
+            </a:pPr>
+            <a:r>
+              <a:rPr lang="en-US" dirty="0" smtClean="0"/>
+              <a:t>A </a:t>
+            </a:r>
+            <a:r>
+              <a:rPr lang="en-US" dirty="0"/>
+              <a:t>good clustering method will produce </a:t>
+            </a:r>
+            <a:r>
+              <a:rPr lang="en-US" dirty="0" smtClean="0"/>
+              <a:t>clusters </a:t>
+            </a:r>
+            <a:r>
+              <a:rPr lang="en-US" dirty="0"/>
+              <a:t>with</a:t>
+            </a:r>
+          </a:p>
+          <a:p>
+            <a:pPr lvl="1"/>
+            <a:r>
+              <a:rPr lang="en-US" dirty="0"/>
+              <a:t> </a:t>
+            </a:r>
+            <a:r>
+              <a:rPr lang="en-US" dirty="0" smtClean="0"/>
+              <a:t>high </a:t>
+            </a:r>
+            <a:r>
+              <a:rPr lang="en-US" dirty="0"/>
+              <a:t>intra-class similarity</a:t>
+            </a:r>
+          </a:p>
+          <a:p>
+            <a:pPr lvl="1"/>
+            <a:r>
+              <a:rPr lang="en-US" dirty="0"/>
+              <a:t> low inter-class similarity</a:t>
+            </a:r>
+          </a:p>
+          <a:p>
+            <a:endParaRPr lang="en-US" dirty="0"/>
           </a:p>
         </p:txBody>
       </p:sp>
@@ -5131,32 +8645,134 @@
         </p:nvSpPr>
         <p:spPr/>
         <p:txBody>
+          <a:bodyPr>
+            <a:normAutofit/>
+          </a:bodyPr>
+          <a:lstStyle/>
+          <a:p>
+            <a:r>
+              <a:rPr lang="en-US" b="1" dirty="0" smtClean="0"/>
+              <a:t>BIRCH: B</a:t>
+            </a:r>
+            <a:r>
+              <a:rPr lang="en-US" dirty="0" smtClean="0"/>
+              <a:t>alanced </a:t>
+            </a:r>
+            <a:r>
+              <a:rPr lang="en-US" b="1" dirty="0"/>
+              <a:t>I</a:t>
+            </a:r>
+            <a:r>
+              <a:rPr lang="en-US" dirty="0"/>
+              <a:t>terative </a:t>
+            </a:r>
+            <a:r>
+              <a:rPr lang="en-US" b="1" dirty="0"/>
+              <a:t>R</a:t>
+            </a:r>
+            <a:r>
+              <a:rPr lang="en-US" dirty="0"/>
+              <a:t>educing and </a:t>
+            </a:r>
+            <a:r>
+              <a:rPr lang="en-US" b="1" dirty="0"/>
+              <a:t>C</a:t>
+            </a:r>
+            <a:r>
+              <a:rPr lang="en-US" dirty="0"/>
+              <a:t>lustering Using </a:t>
+            </a:r>
+            <a:r>
+              <a:rPr lang="en-US" b="1" dirty="0" smtClean="0"/>
+              <a:t>H</a:t>
+            </a:r>
+            <a:r>
+              <a:rPr lang="en-US" dirty="0" smtClean="0"/>
+              <a:t>ierarchies</a:t>
+            </a:r>
+            <a:endParaRPr lang="en-US" dirty="0"/>
+          </a:p>
+        </p:txBody>
+      </p:sp>
+      <p:sp>
+        <p:nvSpPr>
+          <p:cNvPr id="3" name="Content Placeholder 2"/>
+          <p:cNvSpPr>
+            <a:spLocks noGrp="1"/>
+          </p:cNvSpPr>
+          <p:nvPr>
+            <p:ph idx="1"/>
+          </p:nvPr>
+        </p:nvSpPr>
+        <p:spPr/>
+        <p:txBody>
           <a:bodyPr/>
           <a:lstStyle/>
           <a:p>
+            <a:endParaRPr lang="en-US" dirty="0" smtClean="0"/>
+          </a:p>
+          <a:p>
             <a:r>
               <a:rPr lang="en-US" dirty="0" smtClean="0"/>
-              <a:t>Difference Matrix</a:t>
-            </a:r>
-            <a:endParaRPr lang="en-US" dirty="0"/>
-          </a:p>
-        </p:txBody>
-      </p:sp>
-      <p:sp>
-        <p:nvSpPr>
-          <p:cNvPr id="3" name="Content Placeholder 2"/>
-          <p:cNvSpPr>
-            <a:spLocks noGrp="1"/>
-          </p:cNvSpPr>
-          <p:nvPr>
-            <p:ph idx="1"/>
-          </p:nvPr>
-        </p:nvSpPr>
-        <p:spPr/>
-        <p:txBody>
-          <a:bodyPr/>
-          <a:lstStyle/>
-          <a:p>
+              <a:t>Designed </a:t>
+            </a:r>
+            <a:r>
+              <a:rPr lang="en-US" dirty="0"/>
+              <a:t>for very large data sets</a:t>
+            </a:r>
+          </a:p>
+          <a:p>
+            <a:r>
+              <a:rPr lang="en-US" dirty="0"/>
+              <a:t>Time and memory are limited</a:t>
+            </a:r>
+          </a:p>
+          <a:p>
+            <a:r>
+              <a:rPr lang="en-US" dirty="0" smtClean="0"/>
+              <a:t>Only </a:t>
+            </a:r>
+            <a:r>
+              <a:rPr lang="en-US" dirty="0"/>
+              <a:t>one scan of data is necessary</a:t>
+            </a:r>
+          </a:p>
+          <a:p>
+            <a:pPr marL="0" indent="0">
+              <a:buNone/>
+            </a:pPr>
+            <a:endParaRPr lang="en-US" dirty="0" smtClean="0"/>
+          </a:p>
+          <a:p>
+            <a:pPr marL="0" indent="0">
+              <a:buNone/>
+            </a:pPr>
+            <a:r>
+              <a:rPr lang="en-US" dirty="0" smtClean="0"/>
+              <a:t>Two </a:t>
+            </a:r>
+            <a:r>
+              <a:rPr lang="en-US" dirty="0"/>
+              <a:t>key phases:</a:t>
+            </a:r>
+          </a:p>
+          <a:p>
+            <a:pPr lvl="1"/>
+            <a:r>
+              <a:rPr lang="en-US" dirty="0"/>
+              <a:t>Scans the database to build an in-memory tree</a:t>
+            </a:r>
+          </a:p>
+          <a:p>
+            <a:pPr lvl="1"/>
+            <a:r>
+              <a:rPr lang="en-US" dirty="0"/>
+              <a:t>Applies clustering algorithm to cluster the leaf </a:t>
+            </a:r>
+            <a:r>
+              <a:rPr lang="en-US" dirty="0" smtClean="0"/>
+              <a:t>nodes</a:t>
+            </a:r>
             <a:endParaRPr lang="en-US" dirty="0"/>
           </a:p>
         </p:txBody>
@@ -5164,7 +8780,7 @@
     </p:spTree>
     <p:extLst>
       <p:ext uri="{BB962C8B-B14F-4D97-AF65-F5344CB8AC3E}">
-        <p14:creationId xmlns:p14="http://schemas.microsoft.com/office/powerpoint/2010/main" val="4242424418"/>
+        <p14:creationId xmlns:p14="http://schemas.microsoft.com/office/powerpoint/2010/main" val="403696438"/>
       </p:ext>
     </p:extLst>
   </p:cSld>

</xml_diff>

<commit_message>
Added slides for testing and experiment design
</commit_message>
<xml_diff>
--- a/Final Paper/presentation.pptx
+++ b/Final Paper/presentation.pptx
@@ -19,13 +19,14 @@
     <p:sldId id="278" r:id="rId13"/>
     <p:sldId id="268" r:id="rId14"/>
     <p:sldId id="279" r:id="rId15"/>
-    <p:sldId id="270" r:id="rId16"/>
-    <p:sldId id="271" r:id="rId17"/>
-    <p:sldId id="272" r:id="rId18"/>
-    <p:sldId id="260" r:id="rId19"/>
-    <p:sldId id="261" r:id="rId20"/>
-    <p:sldId id="273" r:id="rId21"/>
-    <p:sldId id="262" r:id="rId22"/>
+    <p:sldId id="280" r:id="rId16"/>
+    <p:sldId id="270" r:id="rId17"/>
+    <p:sldId id="271" r:id="rId18"/>
+    <p:sldId id="281" r:id="rId19"/>
+    <p:sldId id="260" r:id="rId20"/>
+    <p:sldId id="261" r:id="rId21"/>
+    <p:sldId id="273" r:id="rId22"/>
+    <p:sldId id="262" r:id="rId23"/>
   </p:sldIdLst>
   <p:sldSz cx="12192000" cy="6858000"/>
   <p:notesSz cx="6858000" cy="9144000"/>
@@ -6996,13 +6997,8 @@
           <a:p>
             <a:r>
               <a:rPr lang="en-US" dirty="0" smtClean="0"/>
-              <a:t>Must enforce minimum query length to be useful, but minimum length is dependent </a:t>
-            </a:r>
-            <a:r>
-              <a:rPr lang="en-US" smtClean="0"/>
-              <a:t>upon data set</a:t>
-            </a:r>
-            <a:endParaRPr lang="en-US" dirty="0" smtClean="0"/>
+              <a:t>Must enforce minimum query length to be useful, but minimum length is dependent upon data set</a:t>
+            </a:r>
           </a:p>
           <a:p>
             <a:endParaRPr lang="en-US" dirty="0"/>
@@ -7063,7 +7059,7 @@
           <a:p>
             <a:r>
               <a:rPr lang="en-US" dirty="0" smtClean="0"/>
-              <a:t>Experimental Setup</a:t>
+              <a:t>Experiment Design</a:t>
             </a:r>
             <a:endParaRPr lang="en-US" dirty="0"/>
           </a:p>
@@ -7079,7 +7075,12 @@
             <p:ph idx="1"/>
           </p:nvPr>
         </p:nvSpPr>
-        <p:spPr/>
+        <p:spPr>
+          <a:xfrm>
+            <a:off x="838200" y="1825625"/>
+            <a:ext cx="5240628" cy="4351338"/>
+          </a:xfrm>
+        </p:spPr>
         <p:txBody>
           <a:bodyPr/>
           <a:lstStyle/>
@@ -7089,48 +7090,330 @@
             </a:pPr>
             <a:r>
               <a:rPr lang="en-US" dirty="0" smtClean="0"/>
-              <a:t>Data Sets: </a:t>
+              <a:t>Naïve approach:</a:t>
             </a:r>
           </a:p>
           <a:p>
             <a:pPr marL="0" indent="0">
               <a:buNone/>
             </a:pPr>
-            <a:r>
-              <a:rPr lang="en-US" dirty="0"/>
-              <a:t>	</a:t>
-            </a:r>
-            <a:r>
-              <a:rPr lang="en-US" dirty="0" smtClean="0"/>
-              <a:t>S1: Subset of IMDB movie titles — 55,000 entries</a:t>
-            </a:r>
-          </a:p>
+            <a:endParaRPr lang="en-US" dirty="0" smtClean="0"/>
+          </a:p>
+          <a:p>
+            <a:pPr marL="514350" indent="-514350">
+              <a:buFont typeface="+mj-lt"/>
+              <a:buAutoNum type="arabicPeriod"/>
+            </a:pPr>
+            <a:r>
+              <a:rPr lang="en-US" dirty="0" smtClean="0"/>
+              <a:t>Construct </a:t>
+            </a:r>
+            <a:r>
+              <a:rPr lang="en-US" dirty="0" err="1" smtClean="0"/>
+              <a:t>Trie</a:t>
+            </a:r>
+            <a:endParaRPr lang="en-US" dirty="0" smtClean="0"/>
+          </a:p>
+          <a:p>
+            <a:pPr marL="514350" indent="-514350">
+              <a:buFont typeface="+mj-lt"/>
+              <a:buAutoNum type="arabicPeriod"/>
+            </a:pPr>
+            <a:r>
+              <a:rPr lang="en-US" dirty="0" smtClean="0"/>
+              <a:t>Read query</a:t>
+            </a:r>
+          </a:p>
+          <a:p>
+            <a:pPr marL="514350" indent="-514350">
+              <a:buFont typeface="+mj-lt"/>
+              <a:buAutoNum type="arabicPeriod"/>
+            </a:pPr>
+            <a:r>
+              <a:rPr lang="en-US" dirty="0" smtClean="0"/>
+              <a:t>Search </a:t>
+            </a:r>
+            <a:r>
+              <a:rPr lang="en-US" dirty="0" err="1" smtClean="0"/>
+              <a:t>Trie</a:t>
+            </a:r>
+            <a:endParaRPr lang="en-US" dirty="0" smtClean="0"/>
+          </a:p>
+          <a:p>
+            <a:pPr marL="514350" indent="-514350">
+              <a:buFont typeface="+mj-lt"/>
+              <a:buAutoNum type="arabicPeriod"/>
+            </a:pPr>
+            <a:r>
+              <a:rPr lang="en-US" dirty="0" smtClean="0"/>
+              <a:t>Return results</a:t>
+            </a:r>
+            <a:endParaRPr lang="en-US" dirty="0"/>
+          </a:p>
+        </p:txBody>
+      </p:sp>
+      <p:sp>
+        <p:nvSpPr>
+          <p:cNvPr id="4" name="Content Placeholder 2"/>
+          <p:cNvSpPr txBox="1">
+            <a:spLocks/>
+          </p:cNvSpPr>
+          <p:nvPr/>
+        </p:nvSpPr>
+        <p:spPr>
+          <a:xfrm>
+            <a:off x="5499279" y="1825625"/>
+            <a:ext cx="5854521" cy="4351338"/>
+          </a:xfrm>
+          <a:prstGeom prst="rect">
+            <a:avLst/>
+          </a:prstGeom>
+        </p:spPr>
+        <p:txBody>
+          <a:bodyPr vert="horz" lIns="91440" tIns="45720" rIns="91440" bIns="45720" rtlCol="0">
+            <a:normAutofit/>
+          </a:bodyPr>
+          <a:lstStyle>
+            <a:lvl1pPr marL="228600" indent="-228600" algn="l" defTabSz="914400" rtl="0" eaLnBrk="1" latinLnBrk="0" hangingPunct="1">
+              <a:lnSpc>
+                <a:spcPct val="90000"/>
+              </a:lnSpc>
+              <a:spcBef>
+                <a:spcPts val="1000"/>
+              </a:spcBef>
+              <a:buFont typeface="Arial" panose="020B0604020202020204" pitchFamily="34" charset="0"/>
+              <a:buChar char="•"/>
+              <a:defRPr sz="2800" kern="1200">
+                <a:solidFill>
+                  <a:schemeClr val="tx1"/>
+                </a:solidFill>
+                <a:latin typeface="+mn-lt"/>
+                <a:ea typeface="+mn-ea"/>
+                <a:cs typeface="+mn-cs"/>
+              </a:defRPr>
+            </a:lvl1pPr>
+            <a:lvl2pPr marL="685800" indent="-228600" algn="l" defTabSz="914400" rtl="0" eaLnBrk="1" latinLnBrk="0" hangingPunct="1">
+              <a:lnSpc>
+                <a:spcPct val="90000"/>
+              </a:lnSpc>
+              <a:spcBef>
+                <a:spcPts val="500"/>
+              </a:spcBef>
+              <a:buFont typeface="Arial" panose="020B0604020202020204" pitchFamily="34" charset="0"/>
+              <a:buChar char="•"/>
+              <a:defRPr sz="2400" kern="1200">
+                <a:solidFill>
+                  <a:schemeClr val="tx1"/>
+                </a:solidFill>
+                <a:latin typeface="+mn-lt"/>
+                <a:ea typeface="+mn-ea"/>
+                <a:cs typeface="+mn-cs"/>
+              </a:defRPr>
+            </a:lvl2pPr>
+            <a:lvl3pPr marL="1143000" indent="-228600" algn="l" defTabSz="914400" rtl="0" eaLnBrk="1" latinLnBrk="0" hangingPunct="1">
+              <a:lnSpc>
+                <a:spcPct val="90000"/>
+              </a:lnSpc>
+              <a:spcBef>
+                <a:spcPts val="500"/>
+              </a:spcBef>
+              <a:buFont typeface="Arial" panose="020B0604020202020204" pitchFamily="34" charset="0"/>
+              <a:buChar char="•"/>
+              <a:defRPr sz="2000" kern="1200">
+                <a:solidFill>
+                  <a:schemeClr val="tx1"/>
+                </a:solidFill>
+                <a:latin typeface="+mn-lt"/>
+                <a:ea typeface="+mn-ea"/>
+                <a:cs typeface="+mn-cs"/>
+              </a:defRPr>
+            </a:lvl3pPr>
+            <a:lvl4pPr marL="1600200" indent="-228600" algn="l" defTabSz="914400" rtl="0" eaLnBrk="1" latinLnBrk="0" hangingPunct="1">
+              <a:lnSpc>
+                <a:spcPct val="90000"/>
+              </a:lnSpc>
+              <a:spcBef>
+                <a:spcPts val="500"/>
+              </a:spcBef>
+              <a:buFont typeface="Arial" panose="020B0604020202020204" pitchFamily="34" charset="0"/>
+              <a:buChar char="•"/>
+              <a:defRPr sz="1800" kern="1200">
+                <a:solidFill>
+                  <a:schemeClr val="tx1"/>
+                </a:solidFill>
+                <a:latin typeface="+mn-lt"/>
+                <a:ea typeface="+mn-ea"/>
+                <a:cs typeface="+mn-cs"/>
+              </a:defRPr>
+            </a:lvl4pPr>
+            <a:lvl5pPr marL="2057400" indent="-228600" algn="l" defTabSz="914400" rtl="0" eaLnBrk="1" latinLnBrk="0" hangingPunct="1">
+              <a:lnSpc>
+                <a:spcPct val="90000"/>
+              </a:lnSpc>
+              <a:spcBef>
+                <a:spcPts val="500"/>
+              </a:spcBef>
+              <a:buFont typeface="Arial" panose="020B0604020202020204" pitchFamily="34" charset="0"/>
+              <a:buChar char="•"/>
+              <a:defRPr sz="1800" kern="1200">
+                <a:solidFill>
+                  <a:schemeClr val="tx1"/>
+                </a:solidFill>
+                <a:latin typeface="+mn-lt"/>
+                <a:ea typeface="+mn-ea"/>
+                <a:cs typeface="+mn-cs"/>
+              </a:defRPr>
+            </a:lvl5pPr>
+            <a:lvl6pPr marL="2514600" indent="-228600" algn="l" defTabSz="914400" rtl="0" eaLnBrk="1" latinLnBrk="0" hangingPunct="1">
+              <a:lnSpc>
+                <a:spcPct val="90000"/>
+              </a:lnSpc>
+              <a:spcBef>
+                <a:spcPts val="500"/>
+              </a:spcBef>
+              <a:buFont typeface="Arial" panose="020B0604020202020204" pitchFamily="34" charset="0"/>
+              <a:buChar char="•"/>
+              <a:defRPr sz="1800" kern="1200">
+                <a:solidFill>
+                  <a:schemeClr val="tx1"/>
+                </a:solidFill>
+                <a:latin typeface="+mn-lt"/>
+                <a:ea typeface="+mn-ea"/>
+                <a:cs typeface="+mn-cs"/>
+              </a:defRPr>
+            </a:lvl6pPr>
+            <a:lvl7pPr marL="2971800" indent="-228600" algn="l" defTabSz="914400" rtl="0" eaLnBrk="1" latinLnBrk="0" hangingPunct="1">
+              <a:lnSpc>
+                <a:spcPct val="90000"/>
+              </a:lnSpc>
+              <a:spcBef>
+                <a:spcPts val="500"/>
+              </a:spcBef>
+              <a:buFont typeface="Arial" panose="020B0604020202020204" pitchFamily="34" charset="0"/>
+              <a:buChar char="•"/>
+              <a:defRPr sz="1800" kern="1200">
+                <a:solidFill>
+                  <a:schemeClr val="tx1"/>
+                </a:solidFill>
+                <a:latin typeface="+mn-lt"/>
+                <a:ea typeface="+mn-ea"/>
+                <a:cs typeface="+mn-cs"/>
+              </a:defRPr>
+            </a:lvl7pPr>
+            <a:lvl8pPr marL="3429000" indent="-228600" algn="l" defTabSz="914400" rtl="0" eaLnBrk="1" latinLnBrk="0" hangingPunct="1">
+              <a:lnSpc>
+                <a:spcPct val="90000"/>
+              </a:lnSpc>
+              <a:spcBef>
+                <a:spcPts val="500"/>
+              </a:spcBef>
+              <a:buFont typeface="Arial" panose="020B0604020202020204" pitchFamily="34" charset="0"/>
+              <a:buChar char="•"/>
+              <a:defRPr sz="1800" kern="1200">
+                <a:solidFill>
+                  <a:schemeClr val="tx1"/>
+                </a:solidFill>
+                <a:latin typeface="+mn-lt"/>
+                <a:ea typeface="+mn-ea"/>
+                <a:cs typeface="+mn-cs"/>
+              </a:defRPr>
+            </a:lvl8pPr>
+            <a:lvl9pPr marL="3886200" indent="-228600" algn="l" defTabSz="914400" rtl="0" eaLnBrk="1" latinLnBrk="0" hangingPunct="1">
+              <a:lnSpc>
+                <a:spcPct val="90000"/>
+              </a:lnSpc>
+              <a:spcBef>
+                <a:spcPts val="500"/>
+              </a:spcBef>
+              <a:buFont typeface="Arial" panose="020B0604020202020204" pitchFamily="34" charset="0"/>
+              <a:buChar char="•"/>
+              <a:defRPr sz="1800" kern="1200">
+                <a:solidFill>
+                  <a:schemeClr val="tx1"/>
+                </a:solidFill>
+                <a:latin typeface="+mn-lt"/>
+                <a:ea typeface="+mn-ea"/>
+                <a:cs typeface="+mn-cs"/>
+              </a:defRPr>
+            </a:lvl9pPr>
+          </a:lstStyle>
           <a:p>
             <a:pPr marL="0" indent="0">
               <a:buNone/>
             </a:pPr>
             <a:r>
-              <a:rPr lang="en-US" dirty="0"/>
-              <a:t>	</a:t>
-            </a:r>
-            <a:r>
-              <a:rPr lang="en-US" dirty="0" smtClean="0"/>
-              <a:t>S2: Subset of DBLP movie titles — 2.5 million entries</a:t>
-            </a:r>
-          </a:p>
-          <a:p>
+              <a:rPr lang="en-US" dirty="0" smtClean="0"/>
+              <a:t>Experimental Approach:</a:t>
+            </a:r>
+          </a:p>
+          <a:p>
+            <a:pPr marL="0" indent="0">
+              <a:buNone/>
+            </a:pPr>
             <a:endParaRPr lang="en-US" dirty="0"/>
           </a:p>
           <a:p>
-            <a:r>
-              <a:rPr lang="en-US" dirty="0" smtClean="0"/>
-              <a:t>Testing run on Dell Latitude, i7 quad-core processor at 2.20GHz, 8 GB RAM</a:t>
-            </a:r>
-          </a:p>
-          <a:p>
-            <a:endParaRPr lang="en-US" dirty="0"/>
-          </a:p>
-          <a:p>
+            <a:pPr marL="514350" indent="-514350">
+              <a:buFont typeface="+mj-lt"/>
+              <a:buAutoNum type="arabicPeriod"/>
+            </a:pPr>
+            <a:r>
+              <a:rPr lang="en-US" dirty="0" smtClean="0"/>
+              <a:t>Read query</a:t>
+            </a:r>
+          </a:p>
+          <a:p>
+            <a:pPr marL="514350" indent="-514350">
+              <a:buFont typeface="+mj-lt"/>
+              <a:buAutoNum type="arabicPeriod"/>
+            </a:pPr>
+            <a:r>
+              <a:rPr lang="en-US" dirty="0" smtClean="0"/>
+              <a:t>Search Inverted List for LCS subset</a:t>
+            </a:r>
+          </a:p>
+          <a:p>
+            <a:pPr marL="514350" indent="-514350">
+              <a:buFont typeface="+mj-lt"/>
+              <a:buAutoNum type="arabicPeriod"/>
+            </a:pPr>
+            <a:r>
+              <a:rPr lang="en-US" dirty="0" smtClean="0"/>
+              <a:t>Construct </a:t>
+            </a:r>
+            <a:r>
+              <a:rPr lang="en-US" dirty="0" err="1" smtClean="0"/>
+              <a:t>Trie</a:t>
+            </a:r>
+            <a:r>
+              <a:rPr lang="en-US" dirty="0" smtClean="0"/>
+              <a:t> from subset</a:t>
+            </a:r>
+          </a:p>
+          <a:p>
+            <a:pPr marL="514350" indent="-514350">
+              <a:buFont typeface="+mj-lt"/>
+              <a:buAutoNum type="arabicPeriod"/>
+            </a:pPr>
+            <a:r>
+              <a:rPr lang="en-US" dirty="0" smtClean="0"/>
+              <a:t>Search </a:t>
+            </a:r>
+            <a:r>
+              <a:rPr lang="en-US" dirty="0" err="1" smtClean="0"/>
+              <a:t>Trie</a:t>
+            </a:r>
+            <a:endParaRPr lang="en-US" dirty="0" smtClean="0"/>
+          </a:p>
+          <a:p>
+            <a:pPr marL="514350" indent="-514350">
+              <a:buFont typeface="+mj-lt"/>
+              <a:buAutoNum type="arabicPeriod"/>
+            </a:pPr>
+            <a:r>
+              <a:rPr lang="en-US" dirty="0" smtClean="0"/>
+              <a:t>Return results</a:t>
+            </a:r>
             <a:endParaRPr lang="en-US" dirty="0"/>
           </a:p>
         </p:txBody>
@@ -7138,7 +7421,7 @@
     </p:spTree>
     <p:extLst>
       <p:ext uri="{BB962C8B-B14F-4D97-AF65-F5344CB8AC3E}">
-        <p14:creationId xmlns:p14="http://schemas.microsoft.com/office/powerpoint/2010/main" val="661005115"/>
+        <p14:creationId xmlns:p14="http://schemas.microsoft.com/office/powerpoint/2010/main" val="3269525906"/>
       </p:ext>
     </p:extLst>
   </p:cSld>
@@ -7182,7 +7465,7 @@
           <a:p>
             <a:r>
               <a:rPr lang="en-US" dirty="0" smtClean="0"/>
-              <a:t>Preprocessing</a:t>
+              <a:t>Experimental Setup</a:t>
             </a:r>
             <a:endParaRPr lang="en-US" dirty="0"/>
           </a:p>
@@ -7203,17 +7486,38 @@
           <a:bodyPr/>
           <a:lstStyle/>
           <a:p>
-            <a:r>
-              <a:rPr lang="en-US" dirty="0" smtClean="0"/>
-              <a:t>S1 and S2 were cleansed to remove any non-ASCII entries (</a:t>
-            </a:r>
-            <a:r>
-              <a:rPr lang="en-US" dirty="0" err="1" smtClean="0"/>
-              <a:t>i.e</a:t>
-            </a:r>
-            <a:r>
-              <a:rPr lang="en-US" dirty="0" smtClean="0"/>
-              <a:t>, any string with a character outside of the [0,127] ASCII table)</a:t>
+            <a:pPr marL="0" indent="0">
+              <a:buNone/>
+            </a:pPr>
+            <a:r>
+              <a:rPr lang="en-US" dirty="0" smtClean="0"/>
+              <a:t>Data Sets: </a:t>
+            </a:r>
+          </a:p>
+          <a:p>
+            <a:pPr marL="0" indent="0">
+              <a:buNone/>
+            </a:pPr>
+            <a:r>
+              <a:rPr lang="en-US" dirty="0"/>
+              <a:t>	</a:t>
+            </a:r>
+            <a:r>
+              <a:rPr lang="en-US" dirty="0" smtClean="0"/>
+              <a:t>S1: Subset of IMDB movie titles — 55,000 entries</a:t>
+            </a:r>
+          </a:p>
+          <a:p>
+            <a:pPr marL="0" indent="0">
+              <a:buNone/>
+            </a:pPr>
+            <a:r>
+              <a:rPr lang="en-US" dirty="0"/>
+              <a:t>	</a:t>
+            </a:r>
+            <a:r>
+              <a:rPr lang="en-US" dirty="0" smtClean="0"/>
+              <a:t>S2: Subset of DBLP movie titles — 2.5 million entries</a:t>
             </a:r>
           </a:p>
           <a:p>
@@ -7222,29 +7526,21 @@
           <a:p>
             <a:r>
               <a:rPr lang="en-US" dirty="0" smtClean="0"/>
-              <a:t>Distance matrix for S1, S2 computed</a:t>
-            </a:r>
-          </a:p>
-          <a:p>
-            <a:pPr lvl="1"/>
-            <a:r>
-              <a:rPr lang="en-US" dirty="0" smtClean="0"/>
-              <a:t>S1 took approx. 2.5 hours to compute, 3.8 GB in size</a:t>
-            </a:r>
-          </a:p>
-          <a:p>
-            <a:pPr lvl="1"/>
-            <a:r>
-              <a:rPr lang="en-US" dirty="0" smtClean="0"/>
-              <a:t>S2 took approx. 10 hours to compute up to .5 million entries, ~7 GB in size</a:t>
-            </a:r>
+              <a:t>Testing run on Dell Latitude, i7 quad-core processor at 2.20GHz, 8 GB RAM</a:t>
+            </a:r>
+          </a:p>
+          <a:p>
+            <a:endParaRPr lang="en-US" dirty="0"/>
+          </a:p>
+          <a:p>
+            <a:endParaRPr lang="en-US" dirty="0"/>
           </a:p>
         </p:txBody>
       </p:sp>
     </p:spTree>
     <p:extLst>
       <p:ext uri="{BB962C8B-B14F-4D97-AF65-F5344CB8AC3E}">
-        <p14:creationId xmlns:p14="http://schemas.microsoft.com/office/powerpoint/2010/main" val="2981725681"/>
+        <p14:creationId xmlns:p14="http://schemas.microsoft.com/office/powerpoint/2010/main" val="661005115"/>
       </p:ext>
     </p:extLst>
   </p:cSld>
@@ -7288,7 +7584,7 @@
           <a:p>
             <a:r>
               <a:rPr lang="en-US" dirty="0" smtClean="0"/>
-              <a:t>Results</a:t>
+              <a:t>Preprocessing</a:t>
             </a:r>
             <a:endParaRPr lang="en-US" dirty="0"/>
           </a:p>
@@ -7309,14 +7605,48 @@
           <a:bodyPr/>
           <a:lstStyle/>
           <a:p>
+            <a:r>
+              <a:rPr lang="en-US" dirty="0" smtClean="0"/>
+              <a:t>S1 and S2 were cleansed to remove any non-ASCII entries (</a:t>
+            </a:r>
+            <a:r>
+              <a:rPr lang="en-US" dirty="0" err="1" smtClean="0"/>
+              <a:t>i.e</a:t>
+            </a:r>
+            <a:r>
+              <a:rPr lang="en-US" dirty="0" smtClean="0"/>
+              <a:t>, any string with a character outside of the [0,127] ASCII table)</a:t>
+            </a:r>
+          </a:p>
+          <a:p>
             <a:endParaRPr lang="en-US" dirty="0"/>
+          </a:p>
+          <a:p>
+            <a:r>
+              <a:rPr lang="en-US" dirty="0" smtClean="0"/>
+              <a:t>Distance matrix for S1, S2 computed</a:t>
+            </a:r>
+          </a:p>
+          <a:p>
+            <a:pPr lvl="1"/>
+            <a:r>
+              <a:rPr lang="en-US" dirty="0" smtClean="0"/>
+              <a:t>S1 took approx. 2.5 hours to compute, 3.8 GB in size</a:t>
+            </a:r>
+          </a:p>
+          <a:p>
+            <a:pPr lvl="1"/>
+            <a:r>
+              <a:rPr lang="en-US" dirty="0" smtClean="0"/>
+              <a:t>S2 took approx. 10 hours to compute up to .5 million entries, ~7 GB in size</a:t>
+            </a:r>
           </a:p>
         </p:txBody>
       </p:sp>
     </p:spTree>
     <p:extLst>
       <p:ext uri="{BB962C8B-B14F-4D97-AF65-F5344CB8AC3E}">
-        <p14:creationId xmlns:p14="http://schemas.microsoft.com/office/powerpoint/2010/main" val="103902266"/>
+        <p14:creationId xmlns:p14="http://schemas.microsoft.com/office/powerpoint/2010/main" val="2981725681"/>
       </p:ext>
     </p:extLst>
   </p:cSld>
@@ -7327,6 +7657,166 @@
 </file>
 
 <file path=ppt/slides/slide18.xml><?xml version="1.0" encoding="utf-8"?>
+<p:sld xmlns:a="http://schemas.openxmlformats.org/drawingml/2006/main" xmlns:r="http://schemas.openxmlformats.org/officeDocument/2006/relationships" xmlns:p="http://schemas.openxmlformats.org/presentationml/2006/main">
+  <p:cSld>
+    <p:spTree>
+      <p:nvGrpSpPr>
+        <p:cNvPr id="1" name=""/>
+        <p:cNvGrpSpPr/>
+        <p:nvPr/>
+      </p:nvGrpSpPr>
+      <p:grpSpPr>
+        <a:xfrm>
+          <a:off x="0" y="0"/>
+          <a:ext cx="0" cy="0"/>
+          <a:chOff x="0" y="0"/>
+          <a:chExt cx="0" cy="0"/>
+        </a:xfrm>
+      </p:grpSpPr>
+      <p:sp>
+        <p:nvSpPr>
+          <p:cNvPr id="2" name="Title 1"/>
+          <p:cNvSpPr>
+            <a:spLocks noGrp="1"/>
+          </p:cNvSpPr>
+          <p:nvPr>
+            <p:ph type="title"/>
+          </p:nvPr>
+        </p:nvSpPr>
+        <p:spPr/>
+        <p:txBody>
+          <a:bodyPr/>
+          <a:lstStyle/>
+          <a:p>
+            <a:r>
+              <a:rPr lang="en-US" dirty="0" smtClean="0"/>
+              <a:t>Testing</a:t>
+            </a:r>
+            <a:endParaRPr lang="en-US" dirty="0"/>
+          </a:p>
+        </p:txBody>
+      </p:sp>
+      <p:sp>
+        <p:nvSpPr>
+          <p:cNvPr id="3" name="Content Placeholder 2"/>
+          <p:cNvSpPr>
+            <a:spLocks noGrp="1"/>
+          </p:cNvSpPr>
+          <p:nvPr>
+            <p:ph idx="1"/>
+          </p:nvPr>
+        </p:nvSpPr>
+        <p:spPr/>
+        <p:txBody>
+          <a:bodyPr>
+            <a:normAutofit/>
+          </a:bodyPr>
+          <a:lstStyle/>
+          <a:p>
+            <a:pPr marL="0" indent="0">
+              <a:buNone/>
+            </a:pPr>
+            <a:r>
+              <a:rPr lang="en-US" dirty="0" err="1" smtClean="0"/>
+              <a:t>Trie</a:t>
+            </a:r>
+            <a:r>
+              <a:rPr lang="en-US" dirty="0" smtClean="0"/>
+              <a:t> Construction Time:</a:t>
+            </a:r>
+          </a:p>
+          <a:p>
+            <a:pPr marL="514350" indent="-514350">
+              <a:buFont typeface="+mj-lt"/>
+              <a:buAutoNum type="arabicPeriod"/>
+            </a:pPr>
+            <a:r>
+              <a:rPr lang="en-US" dirty="0" smtClean="0"/>
+              <a:t>Randomly select subset of data in varying quantities</a:t>
+            </a:r>
+          </a:p>
+          <a:p>
+            <a:pPr marL="514350" indent="-514350">
+              <a:buFont typeface="+mj-lt"/>
+              <a:buAutoNum type="arabicPeriod"/>
+            </a:pPr>
+            <a:r>
+              <a:rPr lang="en-US" dirty="0" smtClean="0"/>
+              <a:t>Construct Tries</a:t>
+            </a:r>
+          </a:p>
+          <a:p>
+            <a:pPr marL="514350" indent="-514350">
+              <a:buFont typeface="+mj-lt"/>
+              <a:buAutoNum type="arabicPeriod"/>
+            </a:pPr>
+            <a:endParaRPr lang="en-US" dirty="0"/>
+          </a:p>
+          <a:p>
+            <a:pPr marL="0" indent="0">
+              <a:buNone/>
+            </a:pPr>
+            <a:r>
+              <a:rPr lang="en-US" dirty="0" smtClean="0"/>
+              <a:t>Query Execution Time:</a:t>
+            </a:r>
+            <a:endParaRPr lang="en-US" dirty="0"/>
+          </a:p>
+          <a:p>
+            <a:pPr marL="514350" indent="-514350">
+              <a:buFont typeface="+mj-lt"/>
+              <a:buAutoNum type="arabicPeriod"/>
+            </a:pPr>
+            <a:r>
+              <a:rPr lang="en-US" dirty="0" smtClean="0"/>
+              <a:t>Select random strings from data set</a:t>
+            </a:r>
+          </a:p>
+          <a:p>
+            <a:pPr marL="514350" indent="-514350">
+              <a:buFont typeface="+mj-lt"/>
+              <a:buAutoNum type="arabicPeriod"/>
+            </a:pPr>
+            <a:r>
+              <a:rPr lang="en-US" dirty="0" smtClean="0"/>
+              <a:t>Randomly edit selected strings within </a:t>
+            </a:r>
+            <a:r>
+              <a:rPr lang="en-US" i="1" dirty="0" smtClean="0"/>
+              <a:t>k</a:t>
+            </a:r>
+            <a:r>
+              <a:rPr lang="en-US" dirty="0" smtClean="0"/>
+              <a:t> edits</a:t>
+            </a:r>
+          </a:p>
+          <a:p>
+            <a:pPr marL="514350" indent="-514350">
+              <a:buFont typeface="+mj-lt"/>
+              <a:buAutoNum type="arabicPeriod"/>
+            </a:pPr>
+            <a:r>
+              <a:rPr lang="en-US" dirty="0" smtClean="0"/>
+              <a:t>Query for edited strings</a:t>
+            </a:r>
+            <a:endParaRPr lang="en-US" dirty="0"/>
+          </a:p>
+        </p:txBody>
+      </p:sp>
+    </p:spTree>
+    <p:extLst>
+      <p:ext uri="{BB962C8B-B14F-4D97-AF65-F5344CB8AC3E}">
+        <p14:creationId xmlns:p14="http://schemas.microsoft.com/office/powerpoint/2010/main" val="2413288091"/>
+      </p:ext>
+    </p:extLst>
+  </p:cSld>
+  <p:clrMapOvr>
+    <a:masterClrMapping/>
+  </p:clrMapOvr>
+</p:sld>
+</file>
+
+<file path=ppt/slides/slide19.xml><?xml version="1.0" encoding="utf-8"?>
 <p:sld xmlns:a="http://schemas.openxmlformats.org/drawingml/2006/main" xmlns:r="http://schemas.openxmlformats.org/officeDocument/2006/relationships" xmlns:p="http://schemas.openxmlformats.org/presentationml/2006/main">
   <p:cSld>
     <p:spTree>
@@ -7442,7 +7932,106 @@
 </p:sld>
 </file>
 
-<file path=ppt/slides/slide19.xml><?xml version="1.0" encoding="utf-8"?>
+<file path=ppt/slides/slide2.xml><?xml version="1.0" encoding="utf-8"?>
+<p:sld xmlns:a="http://schemas.openxmlformats.org/drawingml/2006/main" xmlns:r="http://schemas.openxmlformats.org/officeDocument/2006/relationships" xmlns:p="http://schemas.openxmlformats.org/presentationml/2006/main">
+  <p:cSld>
+    <p:spTree>
+      <p:nvGrpSpPr>
+        <p:cNvPr id="1" name=""/>
+        <p:cNvGrpSpPr/>
+        <p:nvPr/>
+      </p:nvGrpSpPr>
+      <p:grpSpPr>
+        <a:xfrm>
+          <a:off x="0" y="0"/>
+          <a:ext cx="0" cy="0"/>
+          <a:chOff x="0" y="0"/>
+          <a:chExt cx="0" cy="0"/>
+        </a:xfrm>
+      </p:grpSpPr>
+      <p:sp>
+        <p:nvSpPr>
+          <p:cNvPr id="2" name="Title 1"/>
+          <p:cNvSpPr>
+            <a:spLocks noGrp="1"/>
+          </p:cNvSpPr>
+          <p:nvPr>
+            <p:ph type="title"/>
+          </p:nvPr>
+        </p:nvSpPr>
+        <p:spPr/>
+        <p:txBody>
+          <a:bodyPr/>
+          <a:lstStyle/>
+          <a:p>
+            <a:r>
+              <a:rPr lang="en-US" dirty="0" smtClean="0"/>
+              <a:t>Original Idea</a:t>
+            </a:r>
+            <a:endParaRPr lang="en-US" dirty="0"/>
+          </a:p>
+        </p:txBody>
+      </p:sp>
+      <p:sp>
+        <p:nvSpPr>
+          <p:cNvPr id="3" name="Content Placeholder 2"/>
+          <p:cNvSpPr>
+            <a:spLocks noGrp="1"/>
+          </p:cNvSpPr>
+          <p:nvPr>
+            <p:ph idx="1"/>
+          </p:nvPr>
+        </p:nvSpPr>
+        <p:spPr/>
+        <p:txBody>
+          <a:bodyPr/>
+          <a:lstStyle/>
+          <a:p>
+            <a:r>
+              <a:rPr lang="en-US" dirty="0" smtClean="0"/>
+              <a:t>Comparing VGRAM and Top-K</a:t>
+            </a:r>
+          </a:p>
+          <a:p>
+            <a:r>
+              <a:rPr lang="en-US" dirty="0" smtClean="0"/>
+              <a:t>Build clusters on strings based on LCS</a:t>
+            </a:r>
+          </a:p>
+          <a:p>
+            <a:r>
+              <a:rPr lang="en-US" dirty="0" smtClean="0"/>
+              <a:t>Trim search space by clusters</a:t>
+            </a:r>
+          </a:p>
+          <a:p>
+            <a:r>
+              <a:rPr lang="en-US" dirty="0" smtClean="0"/>
+              <a:t>Compare Naïve VGRAM/Top-K versus trimmed search space</a:t>
+            </a:r>
+          </a:p>
+          <a:p>
+            <a:pPr marL="0" indent="0">
+              <a:buNone/>
+            </a:pPr>
+            <a:endParaRPr lang="en-US" dirty="0" smtClean="0"/>
+          </a:p>
+        </p:txBody>
+      </p:sp>
+    </p:spTree>
+    <p:extLst>
+      <p:ext uri="{BB962C8B-B14F-4D97-AF65-F5344CB8AC3E}">
+        <p14:creationId xmlns:p14="http://schemas.microsoft.com/office/powerpoint/2010/main" val="2147642121"/>
+      </p:ext>
+    </p:extLst>
+  </p:cSld>
+  <p:clrMapOvr>
+    <a:masterClrMapping/>
+  </p:clrMapOvr>
+</p:sld>
+</file>
+
+<file path=ppt/slides/slide20.xml><?xml version="1.0" encoding="utf-8"?>
 <p:sld xmlns:a="http://schemas.openxmlformats.org/drawingml/2006/main" xmlns:r="http://schemas.openxmlformats.org/officeDocument/2006/relationships" xmlns:p="http://schemas.openxmlformats.org/presentationml/2006/main">
   <p:cSld>
     <p:spTree>
@@ -7554,181 +8143,6 @@
 </p:sld>
 </file>
 
-<file path=ppt/slides/slide2.xml><?xml version="1.0" encoding="utf-8"?>
-<p:sld xmlns:a="http://schemas.openxmlformats.org/drawingml/2006/main" xmlns:r="http://schemas.openxmlformats.org/officeDocument/2006/relationships" xmlns:p="http://schemas.openxmlformats.org/presentationml/2006/main">
-  <p:cSld>
-    <p:spTree>
-      <p:nvGrpSpPr>
-        <p:cNvPr id="1" name=""/>
-        <p:cNvGrpSpPr/>
-        <p:nvPr/>
-      </p:nvGrpSpPr>
-      <p:grpSpPr>
-        <a:xfrm>
-          <a:off x="0" y="0"/>
-          <a:ext cx="0" cy="0"/>
-          <a:chOff x="0" y="0"/>
-          <a:chExt cx="0" cy="0"/>
-        </a:xfrm>
-      </p:grpSpPr>
-      <p:sp>
-        <p:nvSpPr>
-          <p:cNvPr id="2" name="Title 1"/>
-          <p:cNvSpPr>
-            <a:spLocks noGrp="1"/>
-          </p:cNvSpPr>
-          <p:nvPr>
-            <p:ph type="title"/>
-          </p:nvPr>
-        </p:nvSpPr>
-        <p:spPr/>
-        <p:txBody>
-          <a:bodyPr/>
-          <a:lstStyle/>
-          <a:p>
-            <a:r>
-              <a:rPr lang="en-US" dirty="0" smtClean="0"/>
-              <a:t>Original Idea</a:t>
-            </a:r>
-            <a:endParaRPr lang="en-US" dirty="0"/>
-          </a:p>
-        </p:txBody>
-      </p:sp>
-      <p:sp>
-        <p:nvSpPr>
-          <p:cNvPr id="3" name="Content Placeholder 2"/>
-          <p:cNvSpPr>
-            <a:spLocks noGrp="1"/>
-          </p:cNvSpPr>
-          <p:nvPr>
-            <p:ph idx="1"/>
-          </p:nvPr>
-        </p:nvSpPr>
-        <p:spPr/>
-        <p:txBody>
-          <a:bodyPr/>
-          <a:lstStyle/>
-          <a:p>
-            <a:r>
-              <a:rPr lang="en-US" dirty="0" smtClean="0"/>
-              <a:t>Comparing VGRAM and Top-K</a:t>
-            </a:r>
-          </a:p>
-          <a:p>
-            <a:r>
-              <a:rPr lang="en-US" dirty="0" smtClean="0"/>
-              <a:t>Build clusters on strings based on LCS</a:t>
-            </a:r>
-          </a:p>
-          <a:p>
-            <a:r>
-              <a:rPr lang="en-US" dirty="0" smtClean="0"/>
-              <a:t>Trim search space by clusters</a:t>
-            </a:r>
-          </a:p>
-          <a:p>
-            <a:r>
-              <a:rPr lang="en-US" dirty="0" smtClean="0"/>
-              <a:t>Compare Naïve VGRAM/Top-K versus trimmed search space</a:t>
-            </a:r>
-          </a:p>
-          <a:p>
-            <a:pPr marL="0" indent="0">
-              <a:buNone/>
-            </a:pPr>
-            <a:endParaRPr lang="en-US" dirty="0" smtClean="0"/>
-          </a:p>
-        </p:txBody>
-      </p:sp>
-    </p:spTree>
-    <p:extLst>
-      <p:ext uri="{BB962C8B-B14F-4D97-AF65-F5344CB8AC3E}">
-        <p14:creationId xmlns:p14="http://schemas.microsoft.com/office/powerpoint/2010/main" val="2147642121"/>
-      </p:ext>
-    </p:extLst>
-  </p:cSld>
-  <p:clrMapOvr>
-    <a:masterClrMapping/>
-  </p:clrMapOvr>
-</p:sld>
-</file>
-
-<file path=ppt/slides/slide20.xml><?xml version="1.0" encoding="utf-8"?>
-<p:sld xmlns:a="http://schemas.openxmlformats.org/drawingml/2006/main" xmlns:r="http://schemas.openxmlformats.org/officeDocument/2006/relationships" xmlns:p="http://schemas.openxmlformats.org/presentationml/2006/main">
-  <p:cSld>
-    <p:spTree>
-      <p:nvGrpSpPr>
-        <p:cNvPr id="1" name=""/>
-        <p:cNvGrpSpPr/>
-        <p:nvPr/>
-      </p:nvGrpSpPr>
-      <p:grpSpPr>
-        <a:xfrm>
-          <a:off x="0" y="0"/>
-          <a:ext cx="0" cy="0"/>
-          <a:chOff x="0" y="0"/>
-          <a:chExt cx="0" cy="0"/>
-        </a:xfrm>
-      </p:grpSpPr>
-      <p:sp>
-        <p:nvSpPr>
-          <p:cNvPr id="2" name="Title 1"/>
-          <p:cNvSpPr>
-            <a:spLocks noGrp="1"/>
-          </p:cNvSpPr>
-          <p:nvPr>
-            <p:ph type="title"/>
-          </p:nvPr>
-        </p:nvSpPr>
-        <p:spPr/>
-        <p:txBody>
-          <a:bodyPr/>
-          <a:lstStyle/>
-          <a:p>
-            <a:r>
-              <a:rPr lang="en-US" dirty="0" smtClean="0"/>
-              <a:t>Something about pruning with </a:t>
-            </a:r>
-            <a:r>
-              <a:rPr lang="en-US" dirty="0" err="1" smtClean="0"/>
-              <a:t>InvertedList</a:t>
-            </a:r>
-            <a:endParaRPr lang="en-US" dirty="0"/>
-          </a:p>
-        </p:txBody>
-      </p:sp>
-      <p:sp>
-        <p:nvSpPr>
-          <p:cNvPr id="3" name="Content Placeholder 2"/>
-          <p:cNvSpPr>
-            <a:spLocks noGrp="1"/>
-          </p:cNvSpPr>
-          <p:nvPr>
-            <p:ph idx="1"/>
-          </p:nvPr>
-        </p:nvSpPr>
-        <p:spPr/>
-        <p:txBody>
-          <a:bodyPr/>
-          <a:lstStyle/>
-          <a:p>
-            <a:endParaRPr lang="en-US"/>
-          </a:p>
-        </p:txBody>
-      </p:sp>
-    </p:spTree>
-    <p:extLst>
-      <p:ext uri="{BB962C8B-B14F-4D97-AF65-F5344CB8AC3E}">
-        <p14:creationId xmlns:p14="http://schemas.microsoft.com/office/powerpoint/2010/main" val="2895239191"/>
-      </p:ext>
-    </p:extLst>
-  </p:cSld>
-  <p:clrMapOvr>
-    <a:masterClrMapping/>
-  </p:clrMapOvr>
-</p:sld>
-</file>
-
 <file path=ppt/slides/slide21.xml><?xml version="1.0" encoding="utf-8"?>
 <p:sld xmlns:a="http://schemas.openxmlformats.org/drawingml/2006/main" xmlns:r="http://schemas.openxmlformats.org/officeDocument/2006/relationships" xmlns:p="http://schemas.openxmlformats.org/presentationml/2006/main">
   <p:cSld>
@@ -7763,7 +8177,7 @@
           <a:p>
             <a:r>
               <a:rPr lang="en-US" dirty="0" smtClean="0"/>
-              <a:t>Conclusion</a:t>
+              <a:t>Search time on Inverted List</a:t>
             </a:r>
             <a:endParaRPr lang="en-US" dirty="0"/>
           </a:p>
@@ -7784,6 +8198,78 @@
           <a:bodyPr/>
           <a:lstStyle/>
           <a:p>
+            <a:endParaRPr lang="en-US" dirty="0"/>
+          </a:p>
+        </p:txBody>
+      </p:sp>
+    </p:spTree>
+    <p:extLst>
+      <p:ext uri="{BB962C8B-B14F-4D97-AF65-F5344CB8AC3E}">
+        <p14:creationId xmlns:p14="http://schemas.microsoft.com/office/powerpoint/2010/main" val="2895239191"/>
+      </p:ext>
+    </p:extLst>
+  </p:cSld>
+  <p:clrMapOvr>
+    <a:masterClrMapping/>
+  </p:clrMapOvr>
+</p:sld>
+</file>
+
+<file path=ppt/slides/slide22.xml><?xml version="1.0" encoding="utf-8"?>
+<p:sld xmlns:a="http://schemas.openxmlformats.org/drawingml/2006/main" xmlns:r="http://schemas.openxmlformats.org/officeDocument/2006/relationships" xmlns:p="http://schemas.openxmlformats.org/presentationml/2006/main">
+  <p:cSld>
+    <p:spTree>
+      <p:nvGrpSpPr>
+        <p:cNvPr id="1" name=""/>
+        <p:cNvGrpSpPr/>
+        <p:nvPr/>
+      </p:nvGrpSpPr>
+      <p:grpSpPr>
+        <a:xfrm>
+          <a:off x="0" y="0"/>
+          <a:ext cx="0" cy="0"/>
+          <a:chOff x="0" y="0"/>
+          <a:chExt cx="0" cy="0"/>
+        </a:xfrm>
+      </p:grpSpPr>
+      <p:sp>
+        <p:nvSpPr>
+          <p:cNvPr id="2" name="Title 1"/>
+          <p:cNvSpPr>
+            <a:spLocks noGrp="1"/>
+          </p:cNvSpPr>
+          <p:nvPr>
+            <p:ph type="title"/>
+          </p:nvPr>
+        </p:nvSpPr>
+        <p:spPr/>
+        <p:txBody>
+          <a:bodyPr/>
+          <a:lstStyle/>
+          <a:p>
+            <a:r>
+              <a:rPr lang="en-US" dirty="0" smtClean="0"/>
+              <a:t>Conclusion</a:t>
+            </a:r>
+            <a:endParaRPr lang="en-US" dirty="0"/>
+          </a:p>
+        </p:txBody>
+      </p:sp>
+      <p:sp>
+        <p:nvSpPr>
+          <p:cNvPr id="3" name="Content Placeholder 2"/>
+          <p:cNvSpPr>
+            <a:spLocks noGrp="1"/>
+          </p:cNvSpPr>
+          <p:nvPr>
+            <p:ph idx="1"/>
+          </p:nvPr>
+        </p:nvSpPr>
+        <p:spPr/>
+        <p:txBody>
+          <a:bodyPr/>
+          <a:lstStyle/>
+          <a:p>
             <a:r>
               <a:rPr lang="en-US" dirty="0" smtClean="0"/>
               <a:t>Clustering would probably be great, if it were less computationally expensive</a:t>
@@ -7792,7 +8278,15 @@
           <a:p>
             <a:r>
               <a:rPr lang="en-US" dirty="0" smtClean="0"/>
-              <a:t>Inverted Lists are also great, but constructing based on LCS is very </a:t>
+              <a:t>Inverted Lists are also great, but constructing based on LCS </a:t>
+            </a:r>
+            <a:r>
+              <a:rPr lang="en-US" dirty="0" smtClean="0"/>
+              <a:t>is still </a:t>
+            </a:r>
+            <a:r>
+              <a:rPr lang="en-US" dirty="0" smtClean="0"/>
+              <a:t>very </a:t>
             </a:r>
             <a:r>
               <a:rPr lang="en-US" dirty="0" smtClean="0"/>
@@ -7802,7 +8296,7 @@
           <a:p>
             <a:r>
               <a:rPr lang="en-US" dirty="0" smtClean="0"/>
-              <a:t>Running time cost of Inverted List could be reduced by sorting the data set according to LCS and storing memory pointers in the form </a:t>
+              <a:t>Search time of Inverted List could be reduced by sorting the data set according to LCS and storing memory pointers in the form </a:t>
             </a:r>
             <a:r>
               <a:rPr lang="en-US" i="1" dirty="0" smtClean="0"/>

</xml_diff>

<commit_message>
Deleted last slide. Final commit
</commit_message>
<xml_diff>
--- a/Final Paper/presentation.pptx
+++ b/Final Paper/presentation.pptx
@@ -25,8 +25,7 @@
     <p:sldId id="281" r:id="rId19"/>
     <p:sldId id="260" r:id="rId20"/>
     <p:sldId id="261" r:id="rId21"/>
-    <p:sldId id="273" r:id="rId22"/>
-    <p:sldId id="262" r:id="rId23"/>
+    <p:sldId id="262" r:id="rId22"/>
   </p:sldIdLst>
   <p:sldSz cx="12192000" cy="6858000"/>
   <p:notesSz cx="6858000" cy="9144000"/>
@@ -3855,8 +3854,8 @@
           </a:p>
         </p:txBody>
       </p:sp>
-      <mc:AlternateContent xmlns:mc="http://schemas.openxmlformats.org/markup-compatibility/2006">
-        <mc:Choice xmlns:a14="http://schemas.microsoft.com/office/drawing/2010/main" Requires="a14">
+      <mc:AlternateContent xmlns:mc="http://schemas.openxmlformats.org/markup-compatibility/2006" xmlns:a14="http://schemas.microsoft.com/office/drawing/2010/main">
+        <mc:Choice Requires="a14">
           <p:sp>
             <p:nvSpPr>
               <p:cNvPr id="3" name="Content Placeholder 2"/>
@@ -3881,11 +3880,7 @@
               <a:p>
                 <a:r>
                   <a:rPr lang="en-US" dirty="0" smtClean="0"/>
-                  <a:t>LCS of every </a:t>
-                </a:r>
-                <a:r>
-                  <a:rPr lang="en-US" dirty="0" smtClean="0"/>
-                  <a:t>(</a:t>
+                  <a:t>LCS of every (</a:t>
                 </a:r>
                 <a14:m>
                   <m:oMath xmlns:m="http://schemas.openxmlformats.org/officeDocument/2006/math">
@@ -4073,7 +4068,13 @@
                               <a:rPr lang="en-US" b="0" i="1" smtClean="0">
                                 <a:latin typeface="Cambria Math" panose="02040503050406030204" pitchFamily="18" charset="0"/>
                               </a:rPr>
-                              <m:t>𝑓𝑢𝑛</m:t>
+                              <m:t>𝑓</m:t>
+                            </m:r>
+                            <m:r>
+                              <a:rPr lang="en-US" b="0" i="1" smtClean="0">
+                                <a:latin typeface="Cambria Math" panose="02040503050406030204" pitchFamily="18" charset="0"/>
+                              </a:rPr>
+                              <m:t>𝑢𝑛</m:t>
                             </m:r>
                           </m:e>
                           <m:e>
@@ -4226,7 +4227,13 @@
                                     <a:rPr lang="en-US" b="0" i="1" smtClean="0">
                                       <a:latin typeface="Cambria Math" panose="02040503050406030204" pitchFamily="18" charset="0"/>
                                     </a:rPr>
-                                    <m:t>𝑢𝑛</m:t>
+                                    <m:t>𝑢</m:t>
+                                  </m:r>
+                                  <m:r>
+                                    <a:rPr lang="en-US" b="0" i="1" smtClean="0">
+                                      <a:latin typeface="Cambria Math" panose="02040503050406030204" pitchFamily="18" charset="0"/>
+                                    </a:rPr>
+                                    <m:t>𝑛</m:t>
                                   </m:r>
                                 </m:e>
                               </m:mr>
@@ -4278,7 +4285,13 @@
                                     <a:rPr lang="en-US" b="0" i="1" smtClean="0">
                                       <a:latin typeface="Cambria Math" panose="02040503050406030204" pitchFamily="18" charset="0"/>
                                     </a:rPr>
-                                    <m:t>𝑢𝑛</m:t>
+                                    <m:t>𝑢</m:t>
+                                  </m:r>
+                                  <m:r>
+                                    <a:rPr lang="en-US" b="0" i="1" smtClean="0">
+                                      <a:latin typeface="Cambria Math" panose="02040503050406030204" pitchFamily="18" charset="0"/>
+                                    </a:rPr>
+                                    <m:t>𝑛</m:t>
                                   </m:r>
                                 </m:e>
                               </m:mr>
@@ -4348,7 +4361,13 @@
                                           <a:rPr lang="en-US" b="0" i="1" smtClean="0">
                                             <a:latin typeface="Cambria Math" panose="02040503050406030204" pitchFamily="18" charset="0"/>
                                           </a:rPr>
-                                          <m:t>𝑑𝑢𝑛𝑒</m:t>
+                                          <m:t>𝑑</m:t>
+                                        </m:r>
+                                        <m:r>
+                                          <a:rPr lang="en-US" b="0" i="1" smtClean="0">
+                                            <a:latin typeface="Cambria Math" panose="02040503050406030204" pitchFamily="18" charset="0"/>
+                                          </a:rPr>
+                                          <m:t>𝑢𝑛𝑒</m:t>
                                         </m:r>
                                       </m:e>
                                     </m:mr>
@@ -4947,7 +4966,7 @@
             </p:txBody>
           </p:sp>
         </mc:Choice>
-        <mc:Fallback>
+        <mc:Fallback xmlns="">
           <p:sp>
             <p:nvSpPr>
               <p:cNvPr id="3" name="Content Placeholder 2"/>
@@ -5038,8 +5057,8 @@
           </a:p>
         </p:txBody>
       </p:sp>
-      <mc:AlternateContent xmlns:mc="http://schemas.openxmlformats.org/markup-compatibility/2006">
-        <mc:Choice xmlns:a14="http://schemas.microsoft.com/office/drawing/2010/main" Requires="a14">
+      <mc:AlternateContent xmlns:mc="http://schemas.openxmlformats.org/markup-compatibility/2006" xmlns:a14="http://schemas.microsoft.com/office/drawing/2010/main">
+        <mc:Choice Requires="a14">
           <p:sp>
             <p:nvSpPr>
               <p:cNvPr id="3" name="Content Placeholder 2"/>
@@ -5213,7 +5232,7 @@
             </p:txBody>
           </p:sp>
         </mc:Choice>
-        <mc:Fallback>
+        <mc:Fallback xmlns="">
           <p:sp>
             <p:nvSpPr>
               <p:cNvPr id="3" name="Content Placeholder 2"/>
@@ -8177,7 +8196,7 @@
           <a:p>
             <a:r>
               <a:rPr lang="en-US" dirty="0" smtClean="0"/>
-              <a:t>Search time on Inverted List</a:t>
+              <a:t>Conclusion</a:t>
             </a:r>
             <a:endParaRPr lang="en-US" dirty="0"/>
           </a:p>
@@ -8198,78 +8217,6 @@
           <a:bodyPr/>
           <a:lstStyle/>
           <a:p>
-            <a:endParaRPr lang="en-US" dirty="0"/>
-          </a:p>
-        </p:txBody>
-      </p:sp>
-    </p:spTree>
-    <p:extLst>
-      <p:ext uri="{BB962C8B-B14F-4D97-AF65-F5344CB8AC3E}">
-        <p14:creationId xmlns:p14="http://schemas.microsoft.com/office/powerpoint/2010/main" val="2895239191"/>
-      </p:ext>
-    </p:extLst>
-  </p:cSld>
-  <p:clrMapOvr>
-    <a:masterClrMapping/>
-  </p:clrMapOvr>
-</p:sld>
-</file>
-
-<file path=ppt/slides/slide22.xml><?xml version="1.0" encoding="utf-8"?>
-<p:sld xmlns:a="http://schemas.openxmlformats.org/drawingml/2006/main" xmlns:r="http://schemas.openxmlformats.org/officeDocument/2006/relationships" xmlns:p="http://schemas.openxmlformats.org/presentationml/2006/main">
-  <p:cSld>
-    <p:spTree>
-      <p:nvGrpSpPr>
-        <p:cNvPr id="1" name=""/>
-        <p:cNvGrpSpPr/>
-        <p:nvPr/>
-      </p:nvGrpSpPr>
-      <p:grpSpPr>
-        <a:xfrm>
-          <a:off x="0" y="0"/>
-          <a:ext cx="0" cy="0"/>
-          <a:chOff x="0" y="0"/>
-          <a:chExt cx="0" cy="0"/>
-        </a:xfrm>
-      </p:grpSpPr>
-      <p:sp>
-        <p:nvSpPr>
-          <p:cNvPr id="2" name="Title 1"/>
-          <p:cNvSpPr>
-            <a:spLocks noGrp="1"/>
-          </p:cNvSpPr>
-          <p:nvPr>
-            <p:ph type="title"/>
-          </p:nvPr>
-        </p:nvSpPr>
-        <p:spPr/>
-        <p:txBody>
-          <a:bodyPr/>
-          <a:lstStyle/>
-          <a:p>
-            <a:r>
-              <a:rPr lang="en-US" dirty="0" smtClean="0"/>
-              <a:t>Conclusion</a:t>
-            </a:r>
-            <a:endParaRPr lang="en-US" dirty="0"/>
-          </a:p>
-        </p:txBody>
-      </p:sp>
-      <p:sp>
-        <p:nvSpPr>
-          <p:cNvPr id="3" name="Content Placeholder 2"/>
-          <p:cNvSpPr>
-            <a:spLocks noGrp="1"/>
-          </p:cNvSpPr>
-          <p:nvPr>
-            <p:ph idx="1"/>
-          </p:nvPr>
-        </p:nvSpPr>
-        <p:spPr/>
-        <p:txBody>
-          <a:bodyPr/>
-          <a:lstStyle/>
-          <a:p>
             <a:r>
               <a:rPr lang="en-US" dirty="0" smtClean="0"/>
               <a:t>Clustering would probably be great, if it were less computationally expensive</a:t>
@@ -8278,19 +8225,7 @@
           <a:p>
             <a:r>
               <a:rPr lang="en-US" dirty="0" smtClean="0"/>
-              <a:t>Inverted Lists are also great, but constructing based on LCS </a:t>
-            </a:r>
-            <a:r>
-              <a:rPr lang="en-US" dirty="0" smtClean="0"/>
-              <a:t>is still </a:t>
-            </a:r>
-            <a:r>
-              <a:rPr lang="en-US" dirty="0" smtClean="0"/>
-              <a:t>very </a:t>
-            </a:r>
-            <a:r>
-              <a:rPr lang="en-US" dirty="0" smtClean="0"/>
-              <a:t>expensive</a:t>
+              <a:t>Inverted Lists are also great, but constructing based on LCS is still very expensive</a:t>
             </a:r>
           </a:p>
           <a:p>
@@ -8402,21 +8337,8 @@
           <a:p>
             <a:r>
               <a:rPr lang="en-US" dirty="0" smtClean="0"/>
-              <a:t>Could be useful for situations with low amounts of </a:t>
-            </a:r>
-            <a:r>
-              <a:rPr lang="en-US" dirty="0" smtClean="0"/>
-              <a:t>memory, </a:t>
-            </a:r>
-            <a:r>
-              <a:rPr lang="en-US" dirty="0" smtClean="0"/>
-              <a:t>but </a:t>
-            </a:r>
-            <a:r>
-              <a:rPr lang="en-US" dirty="0" smtClean="0"/>
-              <a:t>it’s computationally expensive to prepare</a:t>
-            </a:r>
-            <a:endParaRPr lang="en-US" dirty="0" smtClean="0"/>
+              <a:t>Could be useful for situations with low amounts of memory, but it’s computationally expensive to prepare</a:t>
+            </a:r>
           </a:p>
           <a:p>
             <a:endParaRPr lang="en-US" dirty="0"/>

</xml_diff>